<commit_message>
Add some code for stateless and stateful ALU
</commit_message>
<xml_diff>
--- a/HotNets_talk.pptx
+++ b/HotNets_talk.pptx
@@ -5,7 +5,7 @@
     <p:sldMasterId id="2147483648" r:id="rId1"/>
   </p:sldMasterIdLst>
   <p:notesMasterIdLst>
-    <p:notesMasterId r:id="rId18"/>
+    <p:notesMasterId r:id="rId19"/>
   </p:notesMasterIdLst>
   <p:sldIdLst>
     <p:sldId id="256" r:id="rId2"/>
@@ -15,15 +15,16 @@
     <p:sldId id="271" r:id="rId6"/>
     <p:sldId id="267" r:id="rId7"/>
     <p:sldId id="274" r:id="rId8"/>
-    <p:sldId id="261" r:id="rId9"/>
-    <p:sldId id="269" r:id="rId10"/>
-    <p:sldId id="270" r:id="rId11"/>
-    <p:sldId id="268" r:id="rId12"/>
-    <p:sldId id="264" r:id="rId13"/>
-    <p:sldId id="262" r:id="rId14"/>
-    <p:sldId id="272" r:id="rId15"/>
-    <p:sldId id="273" r:id="rId16"/>
-    <p:sldId id="263" r:id="rId17"/>
+    <p:sldId id="275" r:id="rId9"/>
+    <p:sldId id="261" r:id="rId10"/>
+    <p:sldId id="269" r:id="rId11"/>
+    <p:sldId id="270" r:id="rId12"/>
+    <p:sldId id="268" r:id="rId13"/>
+    <p:sldId id="264" r:id="rId14"/>
+    <p:sldId id="262" r:id="rId15"/>
+    <p:sldId id="272" r:id="rId16"/>
+    <p:sldId id="273" r:id="rId17"/>
+    <p:sldId id="263" r:id="rId18"/>
   </p:sldIdLst>
   <p:sldSz cx="12192000" cy="6858000"/>
   <p:notesSz cx="6858000" cy="9144000"/>
@@ -3936,6 +3937,509 @@
         <p:spPr>
           <a:xfrm>
             <a:off x="601100" y="379773"/>
+            <a:ext cx="3080843" cy="369332"/>
+          </a:xfrm>
+          <a:prstGeom prst="rect">
+            <a:avLst/>
+          </a:prstGeom>
+        </p:spPr>
+        <p:txBody>
+          <a:bodyPr wrap="none">
+            <a:spAutoFit/>
+          </a:bodyPr>
+          <a:lstStyle/>
+          <a:p>
+            <a:pPr marL="285750" indent="-285750">
+              <a:buFont typeface="Arial" panose="020B0604020202020204" pitchFamily="34" charset="0"/>
+              <a:buChar char="•"/>
+            </a:pPr>
+            <a:r>
+              <a:rPr lang="en-US" b="1"/>
+              <a:t>Reduce the constant values</a:t>
+            </a:r>
+          </a:p>
+        </p:txBody>
+      </p:sp>
+      <p:sp>
+        <p:nvSpPr>
+          <p:cNvPr id="4" name="TextBox 3">
+            <a:extLst>
+              <a:ext uri="{FF2B5EF4-FFF2-40B4-BE49-F238E27FC236}">
+                <a16:creationId xmlns:a16="http://schemas.microsoft.com/office/drawing/2014/main" id="{73E19AE6-FFF2-A346-86F2-916172BD3661}"/>
+              </a:ext>
+            </a:extLst>
+          </p:cNvPr>
+          <p:cNvSpPr txBox="1"/>
+          <p:nvPr/>
+        </p:nvSpPr>
+        <p:spPr>
+          <a:xfrm>
+            <a:off x="771525" y="791969"/>
+            <a:ext cx="4429126" cy="5078313"/>
+          </a:xfrm>
+          <a:prstGeom prst="rect">
+            <a:avLst/>
+          </a:prstGeom>
+          <a:noFill/>
+        </p:spPr>
+        <p:txBody>
+          <a:bodyPr wrap="square" rtlCol="0">
+            <a:spAutoFit/>
+          </a:bodyPr>
+          <a:lstStyle/>
+          <a:p>
+            <a:r>
+              <a:rPr lang="en-US"/>
+              <a:t>#define FREEZE_TIME 10</a:t>
+            </a:r>
+          </a:p>
+          <a:p>
+            <a:r>
+              <a:rPr lang="en-US"/>
+              <a:t>#define DELTA2 2</a:t>
+            </a:r>
+          </a:p>
+          <a:p>
+            <a:endParaRPr lang="en-US"/>
+          </a:p>
+          <a:p>
+            <a:r>
+              <a:rPr lang="en-US"/>
+              <a:t>struct Packet {</a:t>
+            </a:r>
+          </a:p>
+          <a:p>
+            <a:r>
+              <a:rPr lang="zh-CN" altLang="en-US"/>
+              <a:t>  </a:t>
+            </a:r>
+            <a:r>
+              <a:rPr lang="en-US"/>
+              <a:t>int now;</a:t>
+            </a:r>
+          </a:p>
+          <a:p>
+            <a:r>
+              <a:rPr lang="zh-CN" altLang="en-US"/>
+              <a:t>  </a:t>
+            </a:r>
+            <a:r>
+              <a:rPr lang="en-US"/>
+              <a:t>int now_plus_free;</a:t>
+            </a:r>
+          </a:p>
+          <a:p>
+            <a:r>
+              <a:rPr lang="en-US"/>
+              <a:t>};</a:t>
+            </a:r>
+          </a:p>
+          <a:p>
+            <a:r>
+              <a:rPr lang="en-US"/>
+              <a:t>int last_update;</a:t>
+            </a:r>
+          </a:p>
+          <a:p>
+            <a:r>
+              <a:rPr lang="en-US"/>
+              <a:t>int p_mark;</a:t>
+            </a:r>
+          </a:p>
+          <a:p>
+            <a:endParaRPr lang="en-US"/>
+          </a:p>
+          <a:p>
+            <a:r>
+              <a:rPr lang="en-US"/>
+              <a:t>void func(struct Packet p) {</a:t>
+            </a:r>
+          </a:p>
+          <a:p>
+            <a:r>
+              <a:rPr lang="en-US"/>
+              <a:t>    p.now_plus_free = p.now - FREEZE_TIME;</a:t>
+            </a:r>
+          </a:p>
+          <a:p>
+            <a:r>
+              <a:rPr lang="zh-CN" altLang="en-US"/>
+              <a:t>    </a:t>
+            </a:r>
+            <a:r>
+              <a:rPr lang="en-US"/>
+              <a:t>if (p.now_plus_free &gt; last_update) {</a:t>
+            </a:r>
+          </a:p>
+          <a:p>
+            <a:r>
+              <a:rPr lang="en-US"/>
+              <a:t>      p_mark = p_mark - DELTA2;</a:t>
+            </a:r>
+          </a:p>
+          <a:p>
+            <a:r>
+              <a:rPr lang="en-US"/>
+              <a:t>      last_update = p.now;</a:t>
+            </a:r>
+          </a:p>
+          <a:p>
+            <a:r>
+              <a:rPr lang="en-US"/>
+              <a:t>    }</a:t>
+            </a:r>
+          </a:p>
+          <a:p>
+            <a:r>
+              <a:rPr lang="en-US"/>
+              <a:t>}</a:t>
+            </a:r>
+          </a:p>
+          <a:p>
+            <a:endParaRPr lang="en-US"/>
+          </a:p>
+        </p:txBody>
+      </p:sp>
+      <p:sp>
+        <p:nvSpPr>
+          <p:cNvPr id="47" name="TextBox 46">
+            <a:extLst>
+              <a:ext uri="{FF2B5EF4-FFF2-40B4-BE49-F238E27FC236}">
+                <a16:creationId xmlns:a16="http://schemas.microsoft.com/office/drawing/2014/main" id="{5C73DE75-D0E0-E542-BF1B-6AB1CF1E696E}"/>
+              </a:ext>
+            </a:extLst>
+          </p:cNvPr>
+          <p:cNvSpPr txBox="1"/>
+          <p:nvPr/>
+        </p:nvSpPr>
+        <p:spPr>
+          <a:xfrm>
+            <a:off x="6096000" y="763393"/>
+            <a:ext cx="4429126" cy="5078313"/>
+          </a:xfrm>
+          <a:prstGeom prst="rect">
+            <a:avLst/>
+          </a:prstGeom>
+          <a:noFill/>
+        </p:spPr>
+        <p:txBody>
+          <a:bodyPr wrap="square" rtlCol="0">
+            <a:spAutoFit/>
+          </a:bodyPr>
+          <a:lstStyle/>
+          <a:p>
+            <a:r>
+              <a:rPr lang="en-US"/>
+              <a:t>#define FREEZE_TIME </a:t>
+            </a:r>
+            <a:r>
+              <a:rPr lang="en-US" altLang="zh-CN"/>
+              <a:t>2</a:t>
+            </a:r>
+            <a:endParaRPr lang="en-US"/>
+          </a:p>
+          <a:p>
+            <a:r>
+              <a:rPr lang="en-US"/>
+              <a:t>#define DELTA2 2</a:t>
+            </a:r>
+          </a:p>
+          <a:p>
+            <a:endParaRPr lang="en-US"/>
+          </a:p>
+          <a:p>
+            <a:r>
+              <a:rPr lang="en-US"/>
+              <a:t>struct Packet {</a:t>
+            </a:r>
+          </a:p>
+          <a:p>
+            <a:r>
+              <a:rPr lang="zh-CN" altLang="en-US"/>
+              <a:t>  </a:t>
+            </a:r>
+            <a:r>
+              <a:rPr lang="en-US"/>
+              <a:t>int now;</a:t>
+            </a:r>
+          </a:p>
+          <a:p>
+            <a:r>
+              <a:rPr lang="zh-CN" altLang="en-US"/>
+              <a:t>  </a:t>
+            </a:r>
+            <a:r>
+              <a:rPr lang="en-US"/>
+              <a:t>int now_plus_free;</a:t>
+            </a:r>
+          </a:p>
+          <a:p>
+            <a:r>
+              <a:rPr lang="en-US"/>
+              <a:t>};</a:t>
+            </a:r>
+          </a:p>
+          <a:p>
+            <a:r>
+              <a:rPr lang="en-US"/>
+              <a:t>int last_update;</a:t>
+            </a:r>
+          </a:p>
+          <a:p>
+            <a:r>
+              <a:rPr lang="en-US"/>
+              <a:t>int p_mark;</a:t>
+            </a:r>
+          </a:p>
+          <a:p>
+            <a:endParaRPr lang="en-US"/>
+          </a:p>
+          <a:p>
+            <a:r>
+              <a:rPr lang="en-US"/>
+              <a:t>void func(struct Packet p) {</a:t>
+            </a:r>
+          </a:p>
+          <a:p>
+            <a:r>
+              <a:rPr lang="en-US"/>
+              <a:t>    p.now_plus_free = p.now - FREEZE_TIME;</a:t>
+            </a:r>
+          </a:p>
+          <a:p>
+            <a:r>
+              <a:rPr lang="zh-CN" altLang="en-US"/>
+              <a:t>    </a:t>
+            </a:r>
+            <a:r>
+              <a:rPr lang="en-US"/>
+              <a:t>if (p.now_plus_free &gt; last_update) {</a:t>
+            </a:r>
+          </a:p>
+          <a:p>
+            <a:r>
+              <a:rPr lang="en-US"/>
+              <a:t>      p_mark = p_mark - DELTA2;</a:t>
+            </a:r>
+          </a:p>
+          <a:p>
+            <a:r>
+              <a:rPr lang="en-US"/>
+              <a:t>      last_update = p.now;</a:t>
+            </a:r>
+          </a:p>
+          <a:p>
+            <a:r>
+              <a:rPr lang="en-US"/>
+              <a:t>    }</a:t>
+            </a:r>
+          </a:p>
+          <a:p>
+            <a:r>
+              <a:rPr lang="en-US"/>
+              <a:t>}</a:t>
+            </a:r>
+          </a:p>
+          <a:p>
+            <a:endParaRPr lang="en-US"/>
+          </a:p>
+        </p:txBody>
+      </p:sp>
+      <p:sp>
+        <p:nvSpPr>
+          <p:cNvPr id="5" name="Oval 4">
+            <a:extLst>
+              <a:ext uri="{FF2B5EF4-FFF2-40B4-BE49-F238E27FC236}">
+                <a16:creationId xmlns:a16="http://schemas.microsoft.com/office/drawing/2014/main" id="{3DB9B386-9A61-3747-BFD9-508CBA2B4F04}"/>
+              </a:ext>
+            </a:extLst>
+          </p:cNvPr>
+          <p:cNvSpPr/>
+          <p:nvPr/>
+        </p:nvSpPr>
+        <p:spPr>
+          <a:xfrm>
+            <a:off x="2825063" y="676470"/>
+            <a:ext cx="614363" cy="622495"/>
+          </a:xfrm>
+          <a:prstGeom prst="ellipse">
+            <a:avLst/>
+          </a:prstGeom>
+          <a:noFill/>
+          <a:ln w="28575">
+            <a:solidFill>
+              <a:srgbClr val="FF0000"/>
+            </a:solidFill>
+          </a:ln>
+        </p:spPr>
+        <p:style>
+          <a:lnRef idx="2">
+            <a:schemeClr val="accent1">
+              <a:shade val="50000"/>
+            </a:schemeClr>
+          </a:lnRef>
+          <a:fillRef idx="1">
+            <a:schemeClr val="accent1"/>
+          </a:fillRef>
+          <a:effectRef idx="0">
+            <a:schemeClr val="accent1"/>
+          </a:effectRef>
+          <a:fontRef idx="minor">
+            <a:schemeClr val="lt1"/>
+          </a:fontRef>
+        </p:style>
+        <p:txBody>
+          <a:bodyPr rtlCol="0" anchor="ctr"/>
+          <a:lstStyle/>
+          <a:p>
+            <a:pPr algn="ctr"/>
+            <a:endParaRPr lang="en-US"/>
+          </a:p>
+        </p:txBody>
+      </p:sp>
+      <p:sp>
+        <p:nvSpPr>
+          <p:cNvPr id="48" name="Oval 47">
+            <a:extLst>
+              <a:ext uri="{FF2B5EF4-FFF2-40B4-BE49-F238E27FC236}">
+                <a16:creationId xmlns:a16="http://schemas.microsoft.com/office/drawing/2014/main" id="{539B1558-0ACA-9745-814F-D18D6D53BE67}"/>
+              </a:ext>
+            </a:extLst>
+          </p:cNvPr>
+          <p:cNvSpPr/>
+          <p:nvPr/>
+        </p:nvSpPr>
+        <p:spPr>
+          <a:xfrm>
+            <a:off x="8138213" y="628180"/>
+            <a:ext cx="614363" cy="622495"/>
+          </a:xfrm>
+          <a:prstGeom prst="ellipse">
+            <a:avLst/>
+          </a:prstGeom>
+          <a:noFill/>
+          <a:ln w="28575">
+            <a:solidFill>
+              <a:srgbClr val="FF0000"/>
+            </a:solidFill>
+          </a:ln>
+        </p:spPr>
+        <p:style>
+          <a:lnRef idx="2">
+            <a:schemeClr val="accent1">
+              <a:shade val="50000"/>
+            </a:schemeClr>
+          </a:lnRef>
+          <a:fillRef idx="1">
+            <a:schemeClr val="accent1"/>
+          </a:fillRef>
+          <a:effectRef idx="0">
+            <a:schemeClr val="accent1"/>
+          </a:effectRef>
+          <a:fontRef idx="minor">
+            <a:schemeClr val="lt1"/>
+          </a:fontRef>
+        </p:style>
+        <p:txBody>
+          <a:bodyPr rtlCol="0" anchor="ctr"/>
+          <a:lstStyle/>
+          <a:p>
+            <a:pPr algn="ctr"/>
+            <a:endParaRPr lang="en-US"/>
+          </a:p>
+        </p:txBody>
+      </p:sp>
+      <p:sp>
+        <p:nvSpPr>
+          <p:cNvPr id="11" name="Right Arrow 10">
+            <a:extLst>
+              <a:ext uri="{FF2B5EF4-FFF2-40B4-BE49-F238E27FC236}">
+                <a16:creationId xmlns:a16="http://schemas.microsoft.com/office/drawing/2014/main" id="{0F36B8CE-63E3-C348-BD97-9F36033E7926}"/>
+              </a:ext>
+            </a:extLst>
+          </p:cNvPr>
+          <p:cNvSpPr/>
+          <p:nvPr/>
+        </p:nvSpPr>
+        <p:spPr>
+          <a:xfrm>
+            <a:off x="3681943" y="791969"/>
+            <a:ext cx="2138089" cy="357209"/>
+          </a:xfrm>
+          <a:prstGeom prst="rightArrow">
+            <a:avLst/>
+          </a:prstGeom>
+        </p:spPr>
+        <p:style>
+          <a:lnRef idx="2">
+            <a:schemeClr val="accent1">
+              <a:shade val="50000"/>
+            </a:schemeClr>
+          </a:lnRef>
+          <a:fillRef idx="1">
+            <a:schemeClr val="accent1"/>
+          </a:fillRef>
+          <a:effectRef idx="0">
+            <a:schemeClr val="accent1"/>
+          </a:effectRef>
+          <a:fontRef idx="minor">
+            <a:schemeClr val="lt1"/>
+          </a:fontRef>
+        </p:style>
+        <p:txBody>
+          <a:bodyPr rtlCol="0" anchor="ctr"/>
+          <a:lstStyle/>
+          <a:p>
+            <a:pPr algn="ctr"/>
+            <a:endParaRPr lang="en-US"/>
+          </a:p>
+        </p:txBody>
+      </p:sp>
+    </p:spTree>
+    <p:extLst>
+      <p:ext uri="{BB962C8B-B14F-4D97-AF65-F5344CB8AC3E}">
+        <p14:creationId xmlns:p14="http://schemas.microsoft.com/office/powerpoint/2010/main" val="3641746540"/>
+      </p:ext>
+    </p:extLst>
+  </p:cSld>
+  <p:clrMapOvr>
+    <a:masterClrMapping/>
+  </p:clrMapOvr>
+</p:sld>
+</file>
+
+<file path=ppt/slides/slide11.xml><?xml version="1.0" encoding="utf-8"?>
+<p:sld xmlns:a="http://schemas.openxmlformats.org/drawingml/2006/main" xmlns:r="http://schemas.openxmlformats.org/officeDocument/2006/relationships" xmlns:p="http://schemas.openxmlformats.org/presentationml/2006/main">
+  <p:cSld>
+    <p:spTree>
+      <p:nvGrpSpPr>
+        <p:cNvPr id="1" name=""/>
+        <p:cNvGrpSpPr/>
+        <p:nvPr/>
+      </p:nvGrpSpPr>
+      <p:grpSpPr>
+        <a:xfrm>
+          <a:off x="0" y="0"/>
+          <a:ext cx="0" cy="0"/>
+          <a:chOff x="0" y="0"/>
+          <a:chExt cx="0" cy="0"/>
+        </a:xfrm>
+      </p:grpSpPr>
+      <p:sp>
+        <p:nvSpPr>
+          <p:cNvPr id="3" name="Rectangle 2">
+            <a:extLst>
+              <a:ext uri="{FF2B5EF4-FFF2-40B4-BE49-F238E27FC236}">
+                <a16:creationId xmlns:a16="http://schemas.microsoft.com/office/drawing/2014/main" id="{D7B2C905-1C57-3A49-9FCA-CBA37FDA671F}"/>
+              </a:ext>
+            </a:extLst>
+          </p:cNvPr>
+          <p:cNvSpPr/>
+          <p:nvPr/>
+        </p:nvSpPr>
+        <p:spPr>
+          <a:xfrm>
+            <a:off x="601100" y="379773"/>
             <a:ext cx="5946821" cy="369332"/>
           </a:xfrm>
           <a:prstGeom prst="rect">
@@ -3972,7 +4476,7 @@
 </p:sld>
 </file>
 
-<file path=ppt/slides/slide11.xml><?xml version="1.0" encoding="utf-8"?>
+<file path=ppt/slides/slide12.xml><?xml version="1.0" encoding="utf-8"?>
 <p:sld xmlns:a="http://schemas.openxmlformats.org/drawingml/2006/main" xmlns:r="http://schemas.openxmlformats.org/officeDocument/2006/relationships" xmlns:p="http://schemas.openxmlformats.org/presentationml/2006/main">
   <p:cSld>
     <p:spTree>
@@ -6568,7 +7072,7 @@
 </p:sld>
 </file>
 
-<file path=ppt/slides/slide12.xml><?xml version="1.0" encoding="utf-8"?>
+<file path=ppt/slides/slide13.xml><?xml version="1.0" encoding="utf-8"?>
 <p:sld xmlns:a="http://schemas.openxmlformats.org/drawingml/2006/main" xmlns:r="http://schemas.openxmlformats.org/officeDocument/2006/relationships" xmlns:p="http://schemas.openxmlformats.org/presentationml/2006/main">
   <p:cSld>
     <p:spTree>
@@ -7021,7 +7525,7 @@
 </p:sld>
 </file>
 
-<file path=ppt/slides/slide13.xml><?xml version="1.0" encoding="utf-8"?>
+<file path=ppt/slides/slide14.xml><?xml version="1.0" encoding="utf-8"?>
 <p:sld xmlns:a="http://schemas.openxmlformats.org/drawingml/2006/main" xmlns:r="http://schemas.openxmlformats.org/officeDocument/2006/relationships" xmlns:p="http://schemas.openxmlformats.org/presentationml/2006/main">
   <p:cSld>
     <p:spTree>
@@ -7240,7 +7744,7 @@
 </p:sld>
 </file>
 
-<file path=ppt/slides/slide14.xml><?xml version="1.0" encoding="utf-8"?>
+<file path=ppt/slides/slide15.xml><?xml version="1.0" encoding="utf-8"?>
 <p:sld xmlns:a="http://schemas.openxmlformats.org/drawingml/2006/main" xmlns:r="http://schemas.openxmlformats.org/officeDocument/2006/relationships" xmlns:p="http://schemas.openxmlformats.org/presentationml/2006/main">
   <p:cSld>
     <p:spTree>
@@ -8148,7 +8652,7 @@
 </p:sld>
 </file>
 
-<file path=ppt/slides/slide15.xml><?xml version="1.0" encoding="utf-8"?>
+<file path=ppt/slides/slide16.xml><?xml version="1.0" encoding="utf-8"?>
 <p:sld xmlns:a="http://schemas.openxmlformats.org/drawingml/2006/main" xmlns:r="http://schemas.openxmlformats.org/officeDocument/2006/relationships" xmlns:p="http://schemas.openxmlformats.org/presentationml/2006/main">
   <p:cSld>
     <p:spTree>
@@ -8584,7 +9088,7 @@
 </p:sld>
 </file>
 
-<file path=ppt/slides/slide16.xml><?xml version="1.0" encoding="utf-8"?>
+<file path=ppt/slides/slide17.xml><?xml version="1.0" encoding="utf-8"?>
 <p:sld xmlns:a="http://schemas.openxmlformats.org/drawingml/2006/main" xmlns:r="http://schemas.openxmlformats.org/officeDocument/2006/relationships" xmlns:p="http://schemas.openxmlformats.org/presentationml/2006/main">
   <p:cSld>
     <p:spTree>
@@ -9769,8 +10273,8 @@
           </a:p>
         </p:txBody>
       </p:sp>
-      <mc:AlternateContent xmlns:mc="http://schemas.openxmlformats.org/markup-compatibility/2006">
-        <mc:Choice xmlns:a14="http://schemas.microsoft.com/office/drawing/2010/main" Requires="a14">
+      <mc:AlternateContent xmlns:mc="http://schemas.openxmlformats.org/markup-compatibility/2006" xmlns:a14="http://schemas.microsoft.com/office/drawing/2010/main">
+        <mc:Choice Requires="a14">
           <p:sp>
             <p:nvSpPr>
               <p:cNvPr id="13" name="TextBox 12">
@@ -9822,7 +10326,7 @@
             </p:txBody>
           </p:sp>
         </mc:Choice>
-        <mc:Fallback>
+        <mc:Fallback xmlns="">
           <p:sp>
             <p:nvSpPr>
               <p:cNvPr id="13" name="TextBox 12">
@@ -9867,8 +10371,8 @@
           </p:sp>
         </mc:Fallback>
       </mc:AlternateContent>
-      <mc:AlternateContent xmlns:mc="http://schemas.openxmlformats.org/markup-compatibility/2006">
-        <mc:Choice xmlns:a14="http://schemas.microsoft.com/office/drawing/2010/main" Requires="a14">
+      <mc:AlternateContent xmlns:mc="http://schemas.openxmlformats.org/markup-compatibility/2006" xmlns:a14="http://schemas.microsoft.com/office/drawing/2010/main">
+        <mc:Choice Requires="a14">
           <p:sp>
             <p:nvSpPr>
               <p:cNvPr id="15" name="TextBox 14">
@@ -9917,7 +10421,7 @@
             </p:txBody>
           </p:sp>
         </mc:Choice>
-        <mc:Fallback>
+        <mc:Fallback xmlns="">
           <p:sp>
             <p:nvSpPr>
               <p:cNvPr id="15" name="TextBox 14">
@@ -14381,6 +14885,170 @@
           </a:p>
         </p:txBody>
       </p:sp>
+      <p:sp>
+        <p:nvSpPr>
+          <p:cNvPr id="2" name="Rectangle 1">
+            <a:extLst>
+              <a:ext uri="{FF2B5EF4-FFF2-40B4-BE49-F238E27FC236}">
+                <a16:creationId xmlns:a16="http://schemas.microsoft.com/office/drawing/2014/main" id="{3A26461C-3C9F-3445-8A8C-1A1225A90B41}"/>
+              </a:ext>
+            </a:extLst>
+          </p:cNvPr>
+          <p:cNvSpPr/>
+          <p:nvPr/>
+        </p:nvSpPr>
+        <p:spPr>
+          <a:xfrm>
+            <a:off x="7039232" y="2756287"/>
+            <a:ext cx="4996249" cy="1754326"/>
+          </a:xfrm>
+          <a:prstGeom prst="rect">
+            <a:avLst/>
+          </a:prstGeom>
+        </p:spPr>
+        <p:txBody>
+          <a:bodyPr wrap="square">
+            <a:spAutoFit/>
+          </a:bodyPr>
+          <a:lstStyle/>
+          <a:p>
+            <a:r>
+              <a:rPr lang="en-US"/>
+              <a:t>state_0</a:t>
+            </a:r>
+          </a:p>
+          <a:p>
+            <a:r>
+              <a:rPr lang="en-US"/>
+              <a:t>pkt_0, pkt_1</a:t>
+            </a:r>
+          </a:p>
+          <a:p>
+            <a:endParaRPr lang="en-US"/>
+          </a:p>
+          <a:p>
+            <a:r>
+              <a:rPr lang="en-US"/>
+              <a:t>if (rel_op(Opt(state_0), Mux3(pkt_0, pkt_1, C()))) {</a:t>
+            </a:r>
+          </a:p>
+          <a:p>
+            <a:r>
+              <a:rPr lang="en-US"/>
+              <a:t>    state_0 = Opt(state_0) + Mux3(pkt_0, pkt_1, C());</a:t>
+            </a:r>
+          </a:p>
+          <a:p>
+            <a:r>
+              <a:rPr lang="en-US"/>
+              <a:t>}</a:t>
+            </a:r>
+          </a:p>
+        </p:txBody>
+      </p:sp>
+      <p:sp>
+        <p:nvSpPr>
+          <p:cNvPr id="4" name="Rectangle 3">
+            <a:extLst>
+              <a:ext uri="{FF2B5EF4-FFF2-40B4-BE49-F238E27FC236}">
+                <a16:creationId xmlns:a16="http://schemas.microsoft.com/office/drawing/2014/main" id="{FD336703-AD8E-AC4E-A4B9-FE9A0D2C377F}"/>
+              </a:ext>
+            </a:extLst>
+          </p:cNvPr>
+          <p:cNvSpPr/>
+          <p:nvPr/>
+        </p:nvSpPr>
+        <p:spPr>
+          <a:xfrm>
+            <a:off x="543699" y="1938111"/>
+            <a:ext cx="6096000" cy="3970318"/>
+          </a:xfrm>
+          <a:prstGeom prst="rect">
+            <a:avLst/>
+          </a:prstGeom>
+        </p:spPr>
+        <p:txBody>
+          <a:bodyPr>
+            <a:spAutoFit/>
+          </a:bodyPr>
+          <a:lstStyle/>
+          <a:p>
+            <a:r>
+              <a:rPr lang="en-US"/>
+              <a:t>include "muxes.sk";</a:t>
+            </a:r>
+          </a:p>
+          <a:p>
+            <a:r>
+              <a:rPr lang="en-US"/>
+              <a:t>include "rel_ops.sk";</a:t>
+            </a:r>
+          </a:p>
+          <a:p>
+            <a:r>
+              <a:rPr lang="en-US"/>
+              <a:t>include "constants.sk";</a:t>
+            </a:r>
+          </a:p>
+          <a:p>
+            <a:endParaRPr lang="en-US"/>
+          </a:p>
+          <a:p>
+            <a:r>
+              <a:rPr lang="en-US"/>
+              <a:t>StateResult atom_template(int state_1, int state_2, int pkt_1, int pkt_2, int pkt_3, int pkt_4, int pkt_5) {</a:t>
+            </a:r>
+          </a:p>
+          <a:p>
+            <a:r>
+              <a:rPr lang="en-US"/>
+              <a:t>  if (rel_op(Opt(state_1), Mux3(pkt_1, pkt_2, C()))) {</a:t>
+            </a:r>
+          </a:p>
+          <a:p>
+            <a:r>
+              <a:rPr lang="en-US"/>
+              <a:t>    state_1 = Opt(state_1) + Mux3(pkt_1, pkt_2, C());</a:t>
+            </a:r>
+          </a:p>
+          <a:p>
+            <a:r>
+              <a:rPr lang="en-US"/>
+              <a:t>  }</a:t>
+            </a:r>
+          </a:p>
+          <a:p>
+            <a:r>
+              <a:rPr lang="en-US"/>
+              <a:t>  StateResult ret = new StateResult();</a:t>
+            </a:r>
+          </a:p>
+          <a:p>
+            <a:r>
+              <a:rPr lang="en-US"/>
+              <a:t>  ret.result_state_1 = state_1;</a:t>
+            </a:r>
+          </a:p>
+          <a:p>
+            <a:r>
+              <a:rPr lang="en-US"/>
+              <a:t>  ret.result_state_2 = state_2;</a:t>
+            </a:r>
+          </a:p>
+          <a:p>
+            <a:r>
+              <a:rPr lang="en-US"/>
+              <a:t>  return ret;</a:t>
+            </a:r>
+          </a:p>
+          <a:p>
+            <a:r>
+              <a:rPr lang="en-US"/>
+              <a:t>}</a:t>
+            </a:r>
+          </a:p>
+        </p:txBody>
+      </p:sp>
     </p:spTree>
     <p:extLst>
       <p:ext uri="{BB962C8B-B14F-4D97-AF65-F5344CB8AC3E}">
@@ -14395,6 +15063,277 @@
 </file>
 
 <file path=ppt/slides/slide8.xml><?xml version="1.0" encoding="utf-8"?>
+<p:sld xmlns:a="http://schemas.openxmlformats.org/drawingml/2006/main" xmlns:r="http://schemas.openxmlformats.org/officeDocument/2006/relationships" xmlns:p="http://schemas.openxmlformats.org/presentationml/2006/main">
+  <p:cSld>
+    <p:spTree>
+      <p:nvGrpSpPr>
+        <p:cNvPr id="1" name=""/>
+        <p:cNvGrpSpPr/>
+        <p:nvPr/>
+      </p:nvGrpSpPr>
+      <p:grpSpPr>
+        <a:xfrm>
+          <a:off x="0" y="0"/>
+          <a:ext cx="0" cy="0"/>
+          <a:chOff x="0" y="0"/>
+          <a:chExt cx="0" cy="0"/>
+        </a:xfrm>
+      </p:grpSpPr>
+      <p:sp>
+        <p:nvSpPr>
+          <p:cNvPr id="5" name="Title 1">
+            <a:extLst>
+              <a:ext uri="{FF2B5EF4-FFF2-40B4-BE49-F238E27FC236}">
+                <a16:creationId xmlns:a16="http://schemas.microsoft.com/office/drawing/2014/main" id="{E0972F18-5523-6740-9D14-24E62B5D5368}"/>
+              </a:ext>
+            </a:extLst>
+          </p:cNvPr>
+          <p:cNvSpPr txBox="1">
+            <a:spLocks/>
+          </p:cNvSpPr>
+          <p:nvPr/>
+        </p:nvSpPr>
+        <p:spPr>
+          <a:xfrm>
+            <a:off x="296562" y="274638"/>
+            <a:ext cx="11738919" cy="1143000"/>
+          </a:xfrm>
+          <a:prstGeom prst="rect">
+            <a:avLst/>
+          </a:prstGeom>
+        </p:spPr>
+        <p:txBody>
+          <a:bodyPr vert="horz" lIns="91440" tIns="45720" rIns="91440" bIns="45720" rtlCol="0" anchor="ctr">
+            <a:noAutofit/>
+          </a:bodyPr>
+          <a:lstStyle>
+            <a:lvl1pPr algn="ctr" defTabSz="457200" rtl="0" eaLnBrk="1" latinLnBrk="0" hangingPunct="1">
+              <a:spcBef>
+                <a:spcPct val="0"/>
+              </a:spcBef>
+              <a:buNone/>
+              <a:defRPr sz="4400" kern="1200">
+                <a:solidFill>
+                  <a:srgbClr val="0000FF"/>
+                </a:solidFill>
+                <a:latin typeface="+mj-lt"/>
+                <a:ea typeface="+mj-ea"/>
+                <a:cs typeface="+mj-cs"/>
+              </a:defRPr>
+            </a:lvl1pPr>
+          </a:lstStyle>
+          <a:p>
+            <a:pPr marL="0" marR="0" lvl="0" indent="0" algn="ctr" defTabSz="457200" rtl="0" eaLnBrk="1" fontAlgn="auto" latinLnBrk="0" hangingPunct="1">
+              <a:lnSpc>
+                <a:spcPct val="100000"/>
+              </a:lnSpc>
+              <a:spcBef>
+                <a:spcPct val="0"/>
+              </a:spcBef>
+              <a:spcAft>
+                <a:spcPts val="0"/>
+              </a:spcAft>
+              <a:buClrTx/>
+              <a:buSzTx/>
+              <a:buFontTx/>
+              <a:buNone/>
+              <a:tabLst/>
+              <a:defRPr/>
+            </a:pPr>
+            <a:r>
+              <a:rPr kumimoji="0" lang="en-US" sz="3800" b="0" i="0" u="none" strike="noStrike" kern="1200" cap="none" spc="0" normalizeH="0" baseline="0" noProof="0" dirty="0">
+                <a:ln>
+                  <a:noFill/>
+                </a:ln>
+                <a:solidFill>
+                  <a:srgbClr val="0000FF"/>
+                </a:solidFill>
+                <a:effectLst/>
+                <a:uLnTx/>
+                <a:uFillTx/>
+                <a:latin typeface="Calibri"/>
+                <a:ea typeface="+mj-ea"/>
+                <a:cs typeface="+mj-cs"/>
+              </a:rPr>
+              <a:t>Stateful ALU and Stateless ALU</a:t>
+            </a:r>
+          </a:p>
+        </p:txBody>
+      </p:sp>
+      <p:sp>
+        <p:nvSpPr>
+          <p:cNvPr id="6" name="Rectangle 5">
+            <a:extLst>
+              <a:ext uri="{FF2B5EF4-FFF2-40B4-BE49-F238E27FC236}">
+                <a16:creationId xmlns:a16="http://schemas.microsoft.com/office/drawing/2014/main" id="{02397905-1F5F-5642-B17C-904D0764AE16}"/>
+              </a:ext>
+            </a:extLst>
+          </p:cNvPr>
+          <p:cNvSpPr/>
+          <p:nvPr/>
+        </p:nvSpPr>
+        <p:spPr>
+          <a:xfrm>
+            <a:off x="296562" y="1130787"/>
+            <a:ext cx="11887200" cy="5262979"/>
+          </a:xfrm>
+          <a:prstGeom prst="rect">
+            <a:avLst/>
+          </a:prstGeom>
+        </p:spPr>
+        <p:txBody>
+          <a:bodyPr wrap="square">
+            <a:spAutoFit/>
+          </a:bodyPr>
+          <a:lstStyle/>
+          <a:p>
+            <a:r>
+              <a:rPr lang="en-US" sz="1400"/>
+              <a:t>// Max value of opcode is 5</a:t>
+            </a:r>
+          </a:p>
+          <a:p>
+            <a:r>
+              <a:rPr lang="en-US" sz="1400"/>
+              <a:t>int {{ alu_name }}({{arg_list|join(',')}}, int opcode_hole_local, int immediate_operand_hole_local, int mux1_ctrl_hole_local, int mux2_ctrl_hole_local, int mux3_ctrl_hole_local) {</a:t>
+            </a:r>
+          </a:p>
+          <a:p>
+            <a:r>
+              <a:rPr lang="en-US" sz="1400"/>
+              <a:t>  int opcode = opcode_hole_local;</a:t>
+            </a:r>
+          </a:p>
+          <a:p>
+            <a:r>
+              <a:rPr lang="en-US" sz="1400"/>
+              <a:t>  int immediate_operand = immediate_operand_hole_local;</a:t>
+            </a:r>
+          </a:p>
+          <a:p>
+            <a:endParaRPr lang="en-US" sz="1400"/>
+          </a:p>
+          <a:p>
+            <a:r>
+              <a:rPr lang="en-US" sz="1400"/>
+              <a:t>  int x = {{ mux1 }}({{potential_operands|join(',')}}, mux1_ctrl_hole_local);</a:t>
+            </a:r>
+          </a:p>
+          <a:p>
+            <a:r>
+              <a:rPr lang="en-US" sz="1400"/>
+              <a:t>  int y = {{ mux2 }}({{potential_operands|join(',')}}, mux2_ctrl_hole_local);</a:t>
+            </a:r>
+          </a:p>
+          <a:p>
+            <a:r>
+              <a:rPr lang="en-US" sz="1400"/>
+              <a:t>  int z = {{ mux3 }}({{potential_operands|join(',')}}, mux3_ctrl_hole_local);</a:t>
+            </a:r>
+          </a:p>
+          <a:p>
+            <a:endParaRPr lang="en-US" sz="1400"/>
+          </a:p>
+          <a:p>
+            <a:r>
+              <a:rPr lang="en-US" sz="1400"/>
+              <a:t>  if (opcode == 0) {</a:t>
+            </a:r>
+          </a:p>
+          <a:p>
+            <a:r>
+              <a:rPr lang="en-US" sz="1400"/>
+              <a:t>    return immediate_operand;</a:t>
+            </a:r>
+          </a:p>
+          <a:p>
+            <a:r>
+              <a:rPr lang="en-US" sz="1400"/>
+              <a:t>  } else if (opcode == 1) {</a:t>
+            </a:r>
+          </a:p>
+          <a:p>
+            <a:r>
+              <a:rPr lang="en-US" sz="1400"/>
+              <a:t>    return x + y;</a:t>
+            </a:r>
+          </a:p>
+          <a:p>
+            <a:r>
+              <a:rPr lang="en-US" sz="1400"/>
+              <a:t>  } else if (opcode == 2) {</a:t>
+            </a:r>
+          </a:p>
+          <a:p>
+            <a:r>
+              <a:rPr lang="en-US" sz="1400"/>
+              <a:t>    return x + immediate_operand;</a:t>
+            </a:r>
+          </a:p>
+          <a:p>
+            <a:r>
+              <a:rPr lang="en-US" sz="1400"/>
+              <a:t>  } else if (opcode == 3) {</a:t>
+            </a:r>
+          </a:p>
+          <a:p>
+            <a:r>
+              <a:rPr lang="en-US" sz="1400"/>
+              <a:t>    return x - y;</a:t>
+            </a:r>
+          </a:p>
+          <a:p>
+            <a:r>
+              <a:rPr lang="en-US" sz="1400"/>
+              <a:t>  } else if (opcode == 4) {</a:t>
+            </a:r>
+          </a:p>
+          <a:p>
+            <a:r>
+              <a:rPr lang="en-US" sz="1400"/>
+              <a:t>    return x - immediate_operand;</a:t>
+            </a:r>
+          </a:p>
+          <a:p>
+            <a:r>
+              <a:rPr lang="en-US" sz="1400"/>
+              <a:t>  } else {</a:t>
+            </a:r>
+          </a:p>
+          <a:p>
+            <a:r>
+              <a:rPr lang="en-US" sz="1400"/>
+              <a:t>    return immediate_operand - x;</a:t>
+            </a:r>
+          </a:p>
+          <a:p>
+            <a:r>
+              <a:rPr lang="en-US" sz="1400"/>
+              <a:t>  }</a:t>
+            </a:r>
+          </a:p>
+          <a:p>
+            <a:r>
+              <a:rPr lang="en-US" sz="1400"/>
+              <a:t>}</a:t>
+            </a:r>
+          </a:p>
+        </p:txBody>
+      </p:sp>
+    </p:spTree>
+    <p:extLst>
+      <p:ext uri="{BB962C8B-B14F-4D97-AF65-F5344CB8AC3E}">
+        <p14:creationId xmlns:p14="http://schemas.microsoft.com/office/powerpoint/2010/main" val="1320505299"/>
+      </p:ext>
+    </p:extLst>
+  </p:cSld>
+  <p:clrMapOvr>
+    <a:masterClrMapping/>
+  </p:clrMapOvr>
+</p:sld>
+</file>
+
+<file path=ppt/slides/slide9.xml><?xml version="1.0" encoding="utf-8"?>
 <p:sld xmlns:a="http://schemas.openxmlformats.org/drawingml/2006/main" xmlns:r="http://schemas.openxmlformats.org/officeDocument/2006/relationships" xmlns:p="http://schemas.openxmlformats.org/presentationml/2006/main">
   <p:cSld>
     <p:spTree>
@@ -14585,7 +15524,7 @@
         <p:spPr>
           <a:xfrm>
             <a:off x="926757" y="2335427"/>
-            <a:ext cx="6932140" cy="1477328"/>
+            <a:ext cx="6932140" cy="2031325"/>
           </a:xfrm>
           <a:prstGeom prst="rect">
             <a:avLst/>
@@ -14641,515 +15580,29 @@
               <a:t>Canonicalized allocation vs synthesized allocation</a:t>
             </a:r>
           </a:p>
+          <a:p>
+            <a:pPr marL="285750" indent="-285750">
+              <a:buFont typeface="Arial" panose="020B0604020202020204" pitchFamily="34" charset="0"/>
+              <a:buChar char="•"/>
+            </a:pPr>
+            <a:endParaRPr lang="en-US" b="1"/>
+          </a:p>
+          <a:p>
+            <a:pPr marL="285750" indent="-285750">
+              <a:buFont typeface="Arial" panose="020B0604020202020204" pitchFamily="34" charset="0"/>
+              <a:buChar char="•"/>
+            </a:pPr>
+            <a:r>
+              <a:rPr lang="en-US" b="1"/>
+              <a:t>Gradual search for stateless ALU</a:t>
+            </a:r>
+          </a:p>
         </p:txBody>
       </p:sp>
     </p:spTree>
     <p:extLst>
       <p:ext uri="{BB962C8B-B14F-4D97-AF65-F5344CB8AC3E}">
         <p14:creationId xmlns:p14="http://schemas.microsoft.com/office/powerpoint/2010/main" val="1727348291"/>
-      </p:ext>
-    </p:extLst>
-  </p:cSld>
-  <p:clrMapOvr>
-    <a:masterClrMapping/>
-  </p:clrMapOvr>
-</p:sld>
-</file>
-
-<file path=ppt/slides/slide9.xml><?xml version="1.0" encoding="utf-8"?>
-<p:sld xmlns:a="http://schemas.openxmlformats.org/drawingml/2006/main" xmlns:r="http://schemas.openxmlformats.org/officeDocument/2006/relationships" xmlns:p="http://schemas.openxmlformats.org/presentationml/2006/main">
-  <p:cSld>
-    <p:spTree>
-      <p:nvGrpSpPr>
-        <p:cNvPr id="1" name=""/>
-        <p:cNvGrpSpPr/>
-        <p:nvPr/>
-      </p:nvGrpSpPr>
-      <p:grpSpPr>
-        <a:xfrm>
-          <a:off x="0" y="0"/>
-          <a:ext cx="0" cy="0"/>
-          <a:chOff x="0" y="0"/>
-          <a:chExt cx="0" cy="0"/>
-        </a:xfrm>
-      </p:grpSpPr>
-      <p:sp>
-        <p:nvSpPr>
-          <p:cNvPr id="3" name="Rectangle 2">
-            <a:extLst>
-              <a:ext uri="{FF2B5EF4-FFF2-40B4-BE49-F238E27FC236}">
-                <a16:creationId xmlns:a16="http://schemas.microsoft.com/office/drawing/2014/main" id="{D7B2C905-1C57-3A49-9FCA-CBA37FDA671F}"/>
-              </a:ext>
-            </a:extLst>
-          </p:cNvPr>
-          <p:cNvSpPr/>
-          <p:nvPr/>
-        </p:nvSpPr>
-        <p:spPr>
-          <a:xfrm>
-            <a:off x="601100" y="379773"/>
-            <a:ext cx="3080843" cy="369332"/>
-          </a:xfrm>
-          <a:prstGeom prst="rect">
-            <a:avLst/>
-          </a:prstGeom>
-        </p:spPr>
-        <p:txBody>
-          <a:bodyPr wrap="none">
-            <a:spAutoFit/>
-          </a:bodyPr>
-          <a:lstStyle/>
-          <a:p>
-            <a:pPr marL="285750" indent="-285750">
-              <a:buFont typeface="Arial" panose="020B0604020202020204" pitchFamily="34" charset="0"/>
-              <a:buChar char="•"/>
-            </a:pPr>
-            <a:r>
-              <a:rPr lang="en-US" b="1"/>
-              <a:t>Reduce the constant values</a:t>
-            </a:r>
-          </a:p>
-        </p:txBody>
-      </p:sp>
-      <p:sp>
-        <p:nvSpPr>
-          <p:cNvPr id="4" name="TextBox 3">
-            <a:extLst>
-              <a:ext uri="{FF2B5EF4-FFF2-40B4-BE49-F238E27FC236}">
-                <a16:creationId xmlns:a16="http://schemas.microsoft.com/office/drawing/2014/main" id="{73E19AE6-FFF2-A346-86F2-916172BD3661}"/>
-              </a:ext>
-            </a:extLst>
-          </p:cNvPr>
-          <p:cNvSpPr txBox="1"/>
-          <p:nvPr/>
-        </p:nvSpPr>
-        <p:spPr>
-          <a:xfrm>
-            <a:off x="771525" y="791969"/>
-            <a:ext cx="4429126" cy="5078313"/>
-          </a:xfrm>
-          <a:prstGeom prst="rect">
-            <a:avLst/>
-          </a:prstGeom>
-          <a:noFill/>
-        </p:spPr>
-        <p:txBody>
-          <a:bodyPr wrap="square" rtlCol="0">
-            <a:spAutoFit/>
-          </a:bodyPr>
-          <a:lstStyle/>
-          <a:p>
-            <a:r>
-              <a:rPr lang="en-US"/>
-              <a:t>#define FREEZE_TIME 10</a:t>
-            </a:r>
-          </a:p>
-          <a:p>
-            <a:r>
-              <a:rPr lang="en-US"/>
-              <a:t>#define DELTA2 2</a:t>
-            </a:r>
-          </a:p>
-          <a:p>
-            <a:endParaRPr lang="en-US"/>
-          </a:p>
-          <a:p>
-            <a:r>
-              <a:rPr lang="en-US"/>
-              <a:t>struct Packet {</a:t>
-            </a:r>
-          </a:p>
-          <a:p>
-            <a:r>
-              <a:rPr lang="zh-CN" altLang="en-US"/>
-              <a:t>  </a:t>
-            </a:r>
-            <a:r>
-              <a:rPr lang="en-US"/>
-              <a:t>int now;</a:t>
-            </a:r>
-          </a:p>
-          <a:p>
-            <a:r>
-              <a:rPr lang="zh-CN" altLang="en-US"/>
-              <a:t>  </a:t>
-            </a:r>
-            <a:r>
-              <a:rPr lang="en-US"/>
-              <a:t>int now_plus_free;</a:t>
-            </a:r>
-          </a:p>
-          <a:p>
-            <a:r>
-              <a:rPr lang="en-US"/>
-              <a:t>};</a:t>
-            </a:r>
-          </a:p>
-          <a:p>
-            <a:r>
-              <a:rPr lang="en-US"/>
-              <a:t>int last_update;</a:t>
-            </a:r>
-          </a:p>
-          <a:p>
-            <a:r>
-              <a:rPr lang="en-US"/>
-              <a:t>int p_mark;</a:t>
-            </a:r>
-          </a:p>
-          <a:p>
-            <a:endParaRPr lang="en-US"/>
-          </a:p>
-          <a:p>
-            <a:r>
-              <a:rPr lang="en-US"/>
-              <a:t>void func(struct Packet p) {</a:t>
-            </a:r>
-          </a:p>
-          <a:p>
-            <a:r>
-              <a:rPr lang="en-US"/>
-              <a:t>    p.now_plus_free = p.now - FREEZE_TIME;</a:t>
-            </a:r>
-          </a:p>
-          <a:p>
-            <a:r>
-              <a:rPr lang="zh-CN" altLang="en-US"/>
-              <a:t>    </a:t>
-            </a:r>
-            <a:r>
-              <a:rPr lang="en-US"/>
-              <a:t>if (p.now_plus_free &gt; last_update) {</a:t>
-            </a:r>
-          </a:p>
-          <a:p>
-            <a:r>
-              <a:rPr lang="en-US"/>
-              <a:t>      p_mark = p_mark - DELTA2;</a:t>
-            </a:r>
-          </a:p>
-          <a:p>
-            <a:r>
-              <a:rPr lang="en-US"/>
-              <a:t>      last_update = p.now;</a:t>
-            </a:r>
-          </a:p>
-          <a:p>
-            <a:r>
-              <a:rPr lang="en-US"/>
-              <a:t>    }</a:t>
-            </a:r>
-          </a:p>
-          <a:p>
-            <a:r>
-              <a:rPr lang="en-US"/>
-              <a:t>}</a:t>
-            </a:r>
-          </a:p>
-          <a:p>
-            <a:endParaRPr lang="en-US"/>
-          </a:p>
-        </p:txBody>
-      </p:sp>
-      <p:sp>
-        <p:nvSpPr>
-          <p:cNvPr id="47" name="TextBox 46">
-            <a:extLst>
-              <a:ext uri="{FF2B5EF4-FFF2-40B4-BE49-F238E27FC236}">
-                <a16:creationId xmlns:a16="http://schemas.microsoft.com/office/drawing/2014/main" id="{5C73DE75-D0E0-E542-BF1B-6AB1CF1E696E}"/>
-              </a:ext>
-            </a:extLst>
-          </p:cNvPr>
-          <p:cNvSpPr txBox="1"/>
-          <p:nvPr/>
-        </p:nvSpPr>
-        <p:spPr>
-          <a:xfrm>
-            <a:off x="6096000" y="763393"/>
-            <a:ext cx="4429126" cy="5078313"/>
-          </a:xfrm>
-          <a:prstGeom prst="rect">
-            <a:avLst/>
-          </a:prstGeom>
-          <a:noFill/>
-        </p:spPr>
-        <p:txBody>
-          <a:bodyPr wrap="square" rtlCol="0">
-            <a:spAutoFit/>
-          </a:bodyPr>
-          <a:lstStyle/>
-          <a:p>
-            <a:r>
-              <a:rPr lang="en-US"/>
-              <a:t>#define FREEZE_TIME </a:t>
-            </a:r>
-            <a:r>
-              <a:rPr lang="en-US" altLang="zh-CN"/>
-              <a:t>2</a:t>
-            </a:r>
-            <a:endParaRPr lang="en-US"/>
-          </a:p>
-          <a:p>
-            <a:r>
-              <a:rPr lang="en-US"/>
-              <a:t>#define DELTA2 2</a:t>
-            </a:r>
-          </a:p>
-          <a:p>
-            <a:endParaRPr lang="en-US"/>
-          </a:p>
-          <a:p>
-            <a:r>
-              <a:rPr lang="en-US"/>
-              <a:t>struct Packet {</a:t>
-            </a:r>
-          </a:p>
-          <a:p>
-            <a:r>
-              <a:rPr lang="zh-CN" altLang="en-US"/>
-              <a:t>  </a:t>
-            </a:r>
-            <a:r>
-              <a:rPr lang="en-US"/>
-              <a:t>int now;</a:t>
-            </a:r>
-          </a:p>
-          <a:p>
-            <a:r>
-              <a:rPr lang="zh-CN" altLang="en-US"/>
-              <a:t>  </a:t>
-            </a:r>
-            <a:r>
-              <a:rPr lang="en-US"/>
-              <a:t>int now_plus_free;</a:t>
-            </a:r>
-          </a:p>
-          <a:p>
-            <a:r>
-              <a:rPr lang="en-US"/>
-              <a:t>};</a:t>
-            </a:r>
-          </a:p>
-          <a:p>
-            <a:r>
-              <a:rPr lang="en-US"/>
-              <a:t>int last_update;</a:t>
-            </a:r>
-          </a:p>
-          <a:p>
-            <a:r>
-              <a:rPr lang="en-US"/>
-              <a:t>int p_mark;</a:t>
-            </a:r>
-          </a:p>
-          <a:p>
-            <a:endParaRPr lang="en-US"/>
-          </a:p>
-          <a:p>
-            <a:r>
-              <a:rPr lang="en-US"/>
-              <a:t>void func(struct Packet p) {</a:t>
-            </a:r>
-          </a:p>
-          <a:p>
-            <a:r>
-              <a:rPr lang="en-US"/>
-              <a:t>    p.now_plus_free = p.now - FREEZE_TIME;</a:t>
-            </a:r>
-          </a:p>
-          <a:p>
-            <a:r>
-              <a:rPr lang="zh-CN" altLang="en-US"/>
-              <a:t>    </a:t>
-            </a:r>
-            <a:r>
-              <a:rPr lang="en-US"/>
-              <a:t>if (p.now_plus_free &gt; last_update) {</a:t>
-            </a:r>
-          </a:p>
-          <a:p>
-            <a:r>
-              <a:rPr lang="en-US"/>
-              <a:t>      p_mark = p_mark - DELTA2;</a:t>
-            </a:r>
-          </a:p>
-          <a:p>
-            <a:r>
-              <a:rPr lang="en-US"/>
-              <a:t>      last_update = p.now;</a:t>
-            </a:r>
-          </a:p>
-          <a:p>
-            <a:r>
-              <a:rPr lang="en-US"/>
-              <a:t>    }</a:t>
-            </a:r>
-          </a:p>
-          <a:p>
-            <a:r>
-              <a:rPr lang="en-US"/>
-              <a:t>}</a:t>
-            </a:r>
-          </a:p>
-          <a:p>
-            <a:endParaRPr lang="en-US"/>
-          </a:p>
-        </p:txBody>
-      </p:sp>
-      <p:sp>
-        <p:nvSpPr>
-          <p:cNvPr id="5" name="Oval 4">
-            <a:extLst>
-              <a:ext uri="{FF2B5EF4-FFF2-40B4-BE49-F238E27FC236}">
-                <a16:creationId xmlns:a16="http://schemas.microsoft.com/office/drawing/2014/main" id="{3DB9B386-9A61-3747-BFD9-508CBA2B4F04}"/>
-              </a:ext>
-            </a:extLst>
-          </p:cNvPr>
-          <p:cNvSpPr/>
-          <p:nvPr/>
-        </p:nvSpPr>
-        <p:spPr>
-          <a:xfrm>
-            <a:off x="2825063" y="676470"/>
-            <a:ext cx="614363" cy="622495"/>
-          </a:xfrm>
-          <a:prstGeom prst="ellipse">
-            <a:avLst/>
-          </a:prstGeom>
-          <a:noFill/>
-          <a:ln w="28575">
-            <a:solidFill>
-              <a:srgbClr val="FF0000"/>
-            </a:solidFill>
-          </a:ln>
-        </p:spPr>
-        <p:style>
-          <a:lnRef idx="2">
-            <a:schemeClr val="accent1">
-              <a:shade val="50000"/>
-            </a:schemeClr>
-          </a:lnRef>
-          <a:fillRef idx="1">
-            <a:schemeClr val="accent1"/>
-          </a:fillRef>
-          <a:effectRef idx="0">
-            <a:schemeClr val="accent1"/>
-          </a:effectRef>
-          <a:fontRef idx="minor">
-            <a:schemeClr val="lt1"/>
-          </a:fontRef>
-        </p:style>
-        <p:txBody>
-          <a:bodyPr rtlCol="0" anchor="ctr"/>
-          <a:lstStyle/>
-          <a:p>
-            <a:pPr algn="ctr"/>
-            <a:endParaRPr lang="en-US"/>
-          </a:p>
-        </p:txBody>
-      </p:sp>
-      <p:sp>
-        <p:nvSpPr>
-          <p:cNvPr id="48" name="Oval 47">
-            <a:extLst>
-              <a:ext uri="{FF2B5EF4-FFF2-40B4-BE49-F238E27FC236}">
-                <a16:creationId xmlns:a16="http://schemas.microsoft.com/office/drawing/2014/main" id="{539B1558-0ACA-9745-814F-D18D6D53BE67}"/>
-              </a:ext>
-            </a:extLst>
-          </p:cNvPr>
-          <p:cNvSpPr/>
-          <p:nvPr/>
-        </p:nvSpPr>
-        <p:spPr>
-          <a:xfrm>
-            <a:off x="8138213" y="628180"/>
-            <a:ext cx="614363" cy="622495"/>
-          </a:xfrm>
-          <a:prstGeom prst="ellipse">
-            <a:avLst/>
-          </a:prstGeom>
-          <a:noFill/>
-          <a:ln w="28575">
-            <a:solidFill>
-              <a:srgbClr val="FF0000"/>
-            </a:solidFill>
-          </a:ln>
-        </p:spPr>
-        <p:style>
-          <a:lnRef idx="2">
-            <a:schemeClr val="accent1">
-              <a:shade val="50000"/>
-            </a:schemeClr>
-          </a:lnRef>
-          <a:fillRef idx="1">
-            <a:schemeClr val="accent1"/>
-          </a:fillRef>
-          <a:effectRef idx="0">
-            <a:schemeClr val="accent1"/>
-          </a:effectRef>
-          <a:fontRef idx="minor">
-            <a:schemeClr val="lt1"/>
-          </a:fontRef>
-        </p:style>
-        <p:txBody>
-          <a:bodyPr rtlCol="0" anchor="ctr"/>
-          <a:lstStyle/>
-          <a:p>
-            <a:pPr algn="ctr"/>
-            <a:endParaRPr lang="en-US"/>
-          </a:p>
-        </p:txBody>
-      </p:sp>
-      <p:sp>
-        <p:nvSpPr>
-          <p:cNvPr id="11" name="Right Arrow 10">
-            <a:extLst>
-              <a:ext uri="{FF2B5EF4-FFF2-40B4-BE49-F238E27FC236}">
-                <a16:creationId xmlns:a16="http://schemas.microsoft.com/office/drawing/2014/main" id="{0F36B8CE-63E3-C348-BD97-9F36033E7926}"/>
-              </a:ext>
-            </a:extLst>
-          </p:cNvPr>
-          <p:cNvSpPr/>
-          <p:nvPr/>
-        </p:nvSpPr>
-        <p:spPr>
-          <a:xfrm>
-            <a:off x="3681943" y="791969"/>
-            <a:ext cx="2138089" cy="357209"/>
-          </a:xfrm>
-          <a:prstGeom prst="rightArrow">
-            <a:avLst/>
-          </a:prstGeom>
-        </p:spPr>
-        <p:style>
-          <a:lnRef idx="2">
-            <a:schemeClr val="accent1">
-              <a:shade val="50000"/>
-            </a:schemeClr>
-          </a:lnRef>
-          <a:fillRef idx="1">
-            <a:schemeClr val="accent1"/>
-          </a:fillRef>
-          <a:effectRef idx="0">
-            <a:schemeClr val="accent1"/>
-          </a:effectRef>
-          <a:fontRef idx="minor">
-            <a:schemeClr val="lt1"/>
-          </a:fontRef>
-        </p:style>
-        <p:txBody>
-          <a:bodyPr rtlCol="0" anchor="ctr"/>
-          <a:lstStyle/>
-          <a:p>
-            <a:pPr algn="ctr"/>
-            <a:endParaRPr lang="en-US"/>
-          </a:p>
-        </p:txBody>
-      </p:sp>
-    </p:spTree>
-    <p:extLst>
-      <p:ext uri="{BB962C8B-B14F-4D97-AF65-F5344CB8AC3E}">
-        <p14:creationId xmlns:p14="http://schemas.microsoft.com/office/powerpoint/2010/main" val="3641746540"/>
       </p:ext>
     </p:extLst>
   </p:cSld>

</xml_diff>

<commit_message>
Add figures to gradual search for stateless ALU and cex mode
</commit_message>
<xml_diff>
--- a/HotNets_talk.pptx
+++ b/HotNets_talk.pptx
@@ -5,7 +5,7 @@
     <p:sldMasterId id="2147483648" r:id="rId1"/>
   </p:sldMasterIdLst>
   <p:notesMasterIdLst>
-    <p:notesMasterId r:id="rId19"/>
+    <p:notesMasterId r:id="rId20"/>
   </p:notesMasterIdLst>
   <p:sldIdLst>
     <p:sldId id="256" r:id="rId2"/>
@@ -18,13 +18,14 @@
     <p:sldId id="275" r:id="rId9"/>
     <p:sldId id="261" r:id="rId10"/>
     <p:sldId id="269" r:id="rId11"/>
-    <p:sldId id="270" r:id="rId12"/>
+    <p:sldId id="277" r:id="rId12"/>
     <p:sldId id="268" r:id="rId13"/>
-    <p:sldId id="264" r:id="rId14"/>
-    <p:sldId id="262" r:id="rId15"/>
-    <p:sldId id="272" r:id="rId16"/>
-    <p:sldId id="273" r:id="rId17"/>
-    <p:sldId id="263" r:id="rId18"/>
+    <p:sldId id="276" r:id="rId14"/>
+    <p:sldId id="264" r:id="rId15"/>
+    <p:sldId id="262" r:id="rId16"/>
+    <p:sldId id="272" r:id="rId17"/>
+    <p:sldId id="273" r:id="rId18"/>
+    <p:sldId id="263" r:id="rId19"/>
   </p:sldIdLst>
   <p:sldSz cx="12192000" cy="6858000"/>
   <p:notesSz cx="6858000" cy="9144000"/>
@@ -4427,10 +4428,47 @@
       </p:grpSpPr>
       <p:sp>
         <p:nvSpPr>
-          <p:cNvPr id="3" name="Rectangle 2">
-            <a:extLst>
-              <a:ext uri="{FF2B5EF4-FFF2-40B4-BE49-F238E27FC236}">
-                <a16:creationId xmlns:a16="http://schemas.microsoft.com/office/drawing/2014/main" id="{D7B2C905-1C57-3A49-9FCA-CBA37FDA671F}"/>
+          <p:cNvPr id="4" name="TextBox 3">
+            <a:extLst>
+              <a:ext uri="{FF2B5EF4-FFF2-40B4-BE49-F238E27FC236}">
+                <a16:creationId xmlns:a16="http://schemas.microsoft.com/office/drawing/2014/main" id="{F6C3C8BA-01A7-C346-84A6-E0092FC6B84D}"/>
+              </a:ext>
+            </a:extLst>
+          </p:cNvPr>
+          <p:cNvSpPr txBox="1"/>
+          <p:nvPr/>
+        </p:nvSpPr>
+        <p:spPr>
+          <a:xfrm>
+            <a:off x="2033087" y="1630419"/>
+            <a:ext cx="1217686" cy="553998"/>
+          </a:xfrm>
+          <a:prstGeom prst="rect">
+            <a:avLst/>
+          </a:prstGeom>
+          <a:solidFill>
+            <a:schemeClr val="bg1"/>
+          </a:solidFill>
+        </p:spPr>
+        <p:txBody>
+          <a:bodyPr wrap="square" rtlCol="0">
+            <a:spAutoFit/>
+          </a:bodyPr>
+          <a:lstStyle/>
+          <a:p>
+            <a:r>
+              <a:rPr lang="en-US" sz="1500" b="1" dirty="0"/>
+              <a:t>Input Spec file</a:t>
+            </a:r>
+          </a:p>
+        </p:txBody>
+      </p:sp>
+      <p:sp>
+        <p:nvSpPr>
+          <p:cNvPr id="5" name="Rounded Rectangle 4">
+            <a:extLst>
+              <a:ext uri="{FF2B5EF4-FFF2-40B4-BE49-F238E27FC236}">
+                <a16:creationId xmlns:a16="http://schemas.microsoft.com/office/drawing/2014/main" id="{4A9AAEE2-78AA-E54C-9C8D-07AEE91960AD}"/>
               </a:ext>
             </a:extLst>
           </p:cNvPr>
@@ -4439,8 +4477,847 @@
         </p:nvSpPr>
         <p:spPr>
           <a:xfrm>
+            <a:off x="5241442" y="1665707"/>
+            <a:ext cx="1489828" cy="700732"/>
+          </a:xfrm>
+          <a:prstGeom prst="roundRect">
+            <a:avLst/>
+          </a:prstGeom>
+          <a:noFill/>
+          <a:ln w="38100">
+            <a:solidFill>
+              <a:schemeClr val="accent2"/>
+            </a:solidFill>
+          </a:ln>
+        </p:spPr>
+        <p:style>
+          <a:lnRef idx="2">
+            <a:schemeClr val="accent1">
+              <a:shade val="50000"/>
+            </a:schemeClr>
+          </a:lnRef>
+          <a:fillRef idx="1">
+            <a:schemeClr val="accent1"/>
+          </a:fillRef>
+          <a:effectRef idx="0">
+            <a:schemeClr val="accent1"/>
+          </a:effectRef>
+          <a:fontRef idx="minor">
+            <a:schemeClr val="lt1"/>
+          </a:fontRef>
+        </p:style>
+        <p:txBody>
+          <a:bodyPr rot="0" spcFirstLastPara="0" vertOverflow="overflow" horzOverflow="overflow" vert="horz" wrap="square" lIns="85725" tIns="42863" rIns="85725" bIns="42863" numCol="1" spcCol="0" rtlCol="0" fromWordArt="0" anchor="ctr" anchorCtr="0" forceAA="0" compatLnSpc="1">
+            <a:prstTxWarp prst="textNoShape">
+              <a:avLst/>
+            </a:prstTxWarp>
+            <a:noAutofit/>
+          </a:bodyPr>
+          <a:lstStyle/>
+          <a:p>
+            <a:pPr algn="ctr"/>
+            <a:endParaRPr lang="en-US" sz="1500" b="1"/>
+          </a:p>
+        </p:txBody>
+      </p:sp>
+      <p:sp>
+        <p:nvSpPr>
+          <p:cNvPr id="6" name="TextBox 5">
+            <a:extLst>
+              <a:ext uri="{FF2B5EF4-FFF2-40B4-BE49-F238E27FC236}">
+                <a16:creationId xmlns:a16="http://schemas.microsoft.com/office/drawing/2014/main" id="{892F5F9A-552C-064D-BDBC-3DB902295451}"/>
+              </a:ext>
+            </a:extLst>
+          </p:cNvPr>
+          <p:cNvSpPr txBox="1"/>
+          <p:nvPr/>
+        </p:nvSpPr>
+        <p:spPr>
+          <a:xfrm>
+            <a:off x="5219345" y="1803675"/>
+            <a:ext cx="1619796" cy="323165"/>
+          </a:xfrm>
+          <a:prstGeom prst="rect">
+            <a:avLst/>
+          </a:prstGeom>
+          <a:noFill/>
+        </p:spPr>
+        <p:txBody>
+          <a:bodyPr wrap="square" rtlCol="0">
+            <a:spAutoFit/>
+          </a:bodyPr>
+          <a:lstStyle/>
+          <a:p>
+            <a:pPr algn="ctr"/>
+            <a:r>
+              <a:rPr lang="en-US" sz="1500" b="1" dirty="0"/>
+              <a:t>Sketch Compiler</a:t>
+            </a:r>
+          </a:p>
+        </p:txBody>
+      </p:sp>
+      <p:sp>
+        <p:nvSpPr>
+          <p:cNvPr id="7" name="TextBox 6">
+            <a:extLst>
+              <a:ext uri="{FF2B5EF4-FFF2-40B4-BE49-F238E27FC236}">
+                <a16:creationId xmlns:a16="http://schemas.microsoft.com/office/drawing/2014/main" id="{4846480B-0D0E-F543-A664-30B0D172458A}"/>
+              </a:ext>
+            </a:extLst>
+          </p:cNvPr>
+          <p:cNvSpPr txBox="1"/>
+          <p:nvPr/>
+        </p:nvSpPr>
+        <p:spPr>
+          <a:xfrm>
+            <a:off x="6570716" y="3272289"/>
+            <a:ext cx="2034037" cy="553998"/>
+          </a:xfrm>
+          <a:prstGeom prst="rect">
+            <a:avLst/>
+          </a:prstGeom>
+          <a:noFill/>
+        </p:spPr>
+        <p:txBody>
+          <a:bodyPr wrap="square" rtlCol="0">
+            <a:spAutoFit/>
+          </a:bodyPr>
+          <a:lstStyle/>
+          <a:p>
+            <a:r>
+              <a:rPr lang="en-US" sz="1500" b="1" dirty="0"/>
+              <a:t>Failure – Counter Example </a:t>
+            </a:r>
+            <a:r>
+              <a:rPr lang="en-US" sz="1500" b="1" i="1" dirty="0"/>
+              <a:t>c</a:t>
+            </a:r>
+            <a:r>
+              <a:rPr lang="en-US" sz="1500" b="1" dirty="0"/>
+              <a:t> Found </a:t>
+            </a:r>
+          </a:p>
+        </p:txBody>
+      </p:sp>
+      <p:sp>
+        <p:nvSpPr>
+          <p:cNvPr id="8" name="TextBox 7">
+            <a:extLst>
+              <a:ext uri="{FF2B5EF4-FFF2-40B4-BE49-F238E27FC236}">
+                <a16:creationId xmlns:a16="http://schemas.microsoft.com/office/drawing/2014/main" id="{949906B2-EA7B-D040-8BB8-E9AEE8F26B89}"/>
+              </a:ext>
+            </a:extLst>
+          </p:cNvPr>
+          <p:cNvSpPr txBox="1"/>
+          <p:nvPr/>
+        </p:nvSpPr>
+        <p:spPr>
+          <a:xfrm>
+            <a:off x="5266796" y="2495800"/>
+            <a:ext cx="762118" cy="553998"/>
+          </a:xfrm>
+          <a:prstGeom prst="rect">
+            <a:avLst/>
+          </a:prstGeom>
+          <a:noFill/>
+        </p:spPr>
+        <p:txBody>
+          <a:bodyPr wrap="square" rtlCol="0">
+            <a:spAutoFit/>
+          </a:bodyPr>
+          <a:lstStyle/>
+          <a:p>
+            <a:r>
+              <a:rPr lang="en-US" sz="1500" b="1" dirty="0"/>
+              <a:t>Add </a:t>
+            </a:r>
+            <a:r>
+              <a:rPr lang="en-US" sz="1500" b="1" i="1" dirty="0"/>
+              <a:t>c</a:t>
+            </a:r>
+            <a:r>
+              <a:rPr lang="en-US" sz="1500" b="1" dirty="0"/>
+              <a:t> to X</a:t>
+            </a:r>
+          </a:p>
+        </p:txBody>
+      </p:sp>
+      <p:sp>
+        <p:nvSpPr>
+          <p:cNvPr id="9" name="Bent-Up Arrow 8">
+            <a:extLst>
+              <a:ext uri="{FF2B5EF4-FFF2-40B4-BE49-F238E27FC236}">
+                <a16:creationId xmlns:a16="http://schemas.microsoft.com/office/drawing/2014/main" id="{D0A8DB16-C926-9248-9E25-A9C52A793CA4}"/>
+              </a:ext>
+            </a:extLst>
+          </p:cNvPr>
+          <p:cNvSpPr/>
+          <p:nvPr/>
+        </p:nvSpPr>
+        <p:spPr>
+          <a:xfrm rot="10800000" flipH="1">
+            <a:off x="8675814" y="1891650"/>
+            <a:ext cx="699025" cy="1102313"/>
+          </a:xfrm>
+          <a:prstGeom prst="bentUpArrow">
+            <a:avLst>
+              <a:gd name="adj1" fmla="val 9091"/>
+              <a:gd name="adj2" fmla="val 19886"/>
+              <a:gd name="adj3" fmla="val 25000"/>
+            </a:avLst>
+          </a:prstGeom>
+        </p:spPr>
+        <p:style>
+          <a:lnRef idx="2">
+            <a:schemeClr val="accent1">
+              <a:shade val="50000"/>
+            </a:schemeClr>
+          </a:lnRef>
+          <a:fillRef idx="1">
+            <a:schemeClr val="accent1"/>
+          </a:fillRef>
+          <a:effectRef idx="0">
+            <a:schemeClr val="accent1"/>
+          </a:effectRef>
+          <a:fontRef idx="minor">
+            <a:schemeClr val="lt1"/>
+          </a:fontRef>
+        </p:style>
+        <p:txBody>
+          <a:bodyPr rot="0" spcFirstLastPara="0" vertOverflow="overflow" horzOverflow="overflow" vert="horz" wrap="square" lIns="85725" tIns="42863" rIns="85725" bIns="42863" numCol="1" spcCol="0" rtlCol="0" fromWordArt="0" anchor="ctr" anchorCtr="0" forceAA="0" compatLnSpc="1">
+            <a:prstTxWarp prst="textNoShape">
+              <a:avLst/>
+            </a:prstTxWarp>
+            <a:noAutofit/>
+          </a:bodyPr>
+          <a:lstStyle/>
+          <a:p>
+            <a:pPr algn="ctr"/>
+            <a:endParaRPr lang="en-US" sz="1500" b="1" dirty="0"/>
+          </a:p>
+        </p:txBody>
+      </p:sp>
+      <p:sp>
+        <p:nvSpPr>
+          <p:cNvPr id="10" name="Rounded Rectangle 9">
+            <a:extLst>
+              <a:ext uri="{FF2B5EF4-FFF2-40B4-BE49-F238E27FC236}">
+                <a16:creationId xmlns:a16="http://schemas.microsoft.com/office/drawing/2014/main" id="{3684770A-C57C-FD49-8989-6A9EB69A97CD}"/>
+              </a:ext>
+            </a:extLst>
+          </p:cNvPr>
+          <p:cNvSpPr/>
+          <p:nvPr/>
+        </p:nvSpPr>
+        <p:spPr>
+          <a:xfrm>
+            <a:off x="8725433" y="3193902"/>
+            <a:ext cx="1147611" cy="675977"/>
+          </a:xfrm>
+          <a:prstGeom prst="roundRect">
+            <a:avLst/>
+          </a:prstGeom>
+        </p:spPr>
+        <p:style>
+          <a:lnRef idx="2">
+            <a:schemeClr val="accent1">
+              <a:shade val="50000"/>
+            </a:schemeClr>
+          </a:lnRef>
+          <a:fillRef idx="1">
+            <a:schemeClr val="accent1"/>
+          </a:fillRef>
+          <a:effectRef idx="0">
+            <a:schemeClr val="accent1"/>
+          </a:effectRef>
+          <a:fontRef idx="minor">
+            <a:schemeClr val="lt1"/>
+          </a:fontRef>
+        </p:style>
+        <p:txBody>
+          <a:bodyPr rot="0" spcFirstLastPara="0" vertOverflow="overflow" horzOverflow="overflow" vert="horz" wrap="square" lIns="85725" tIns="42863" rIns="85725" bIns="42863" numCol="1" spcCol="0" rtlCol="0" fromWordArt="0" anchor="ctr" anchorCtr="0" forceAA="0" compatLnSpc="1">
+            <a:prstTxWarp prst="textNoShape">
+              <a:avLst/>
+            </a:prstTxWarp>
+            <a:noAutofit/>
+          </a:bodyPr>
+          <a:lstStyle/>
+          <a:p>
+            <a:pPr algn="ctr"/>
+            <a:r>
+              <a:rPr lang="en-US" sz="1500" b="1" dirty="0"/>
+              <a:t>Verification on 10 bits</a:t>
+            </a:r>
+          </a:p>
+        </p:txBody>
+      </p:sp>
+      <p:sp>
+        <p:nvSpPr>
+          <p:cNvPr id="11" name="U-Turn Arrow 10">
+            <a:extLst>
+              <a:ext uri="{FF2B5EF4-FFF2-40B4-BE49-F238E27FC236}">
+                <a16:creationId xmlns:a16="http://schemas.microsoft.com/office/drawing/2014/main" id="{791177A0-0DED-FD4A-B605-9856D7283142}"/>
+              </a:ext>
+            </a:extLst>
+          </p:cNvPr>
+          <p:cNvSpPr/>
+          <p:nvPr/>
+        </p:nvSpPr>
+        <p:spPr>
+          <a:xfrm>
+            <a:off x="6606718" y="1186469"/>
+            <a:ext cx="1660825" cy="339740"/>
+          </a:xfrm>
+          <a:prstGeom prst="uturnArrow">
+            <a:avLst>
+              <a:gd name="adj1" fmla="val 25000"/>
+              <a:gd name="adj2" fmla="val 25000"/>
+              <a:gd name="adj3" fmla="val 25000"/>
+              <a:gd name="adj4" fmla="val 43750"/>
+              <a:gd name="adj5" fmla="val 100000"/>
+            </a:avLst>
+          </a:prstGeom>
+        </p:spPr>
+        <p:style>
+          <a:lnRef idx="2">
+            <a:schemeClr val="accent1">
+              <a:shade val="50000"/>
+            </a:schemeClr>
+          </a:lnRef>
+          <a:fillRef idx="1">
+            <a:schemeClr val="accent1"/>
+          </a:fillRef>
+          <a:effectRef idx="0">
+            <a:schemeClr val="accent1"/>
+          </a:effectRef>
+          <a:fontRef idx="minor">
+            <a:schemeClr val="lt1"/>
+          </a:fontRef>
+        </p:style>
+        <p:txBody>
+          <a:bodyPr rot="0" spcFirstLastPara="0" vertOverflow="overflow" horzOverflow="overflow" vert="horz" wrap="square" lIns="85725" tIns="42863" rIns="85725" bIns="42863" numCol="1" spcCol="0" rtlCol="0" fromWordArt="0" anchor="ctr" anchorCtr="0" forceAA="0" compatLnSpc="1">
+            <a:prstTxWarp prst="textNoShape">
+              <a:avLst/>
+            </a:prstTxWarp>
+            <a:noAutofit/>
+          </a:bodyPr>
+          <a:lstStyle/>
+          <a:p>
+            <a:pPr algn="ctr"/>
+            <a:endParaRPr lang="en-US" sz="1500" b="1">
+              <a:solidFill>
+                <a:schemeClr val="tx1"/>
+              </a:solidFill>
+            </a:endParaRPr>
+          </a:p>
+        </p:txBody>
+      </p:sp>
+      <p:cxnSp>
+        <p:nvCxnSpPr>
+          <p:cNvPr id="12" name="Straight Arrow Connector 11">
+            <a:extLst>
+              <a:ext uri="{FF2B5EF4-FFF2-40B4-BE49-F238E27FC236}">
+                <a16:creationId xmlns:a16="http://schemas.microsoft.com/office/drawing/2014/main" id="{DA63E49B-8A62-1847-A1E7-8A038508B3F1}"/>
+              </a:ext>
+            </a:extLst>
+          </p:cNvPr>
+          <p:cNvCxnSpPr>
+            <a:cxnSpLocks/>
+            <a:endCxn id="6" idx="1"/>
+          </p:cNvCxnSpPr>
+          <p:nvPr/>
+        </p:nvCxnSpPr>
+        <p:spPr>
+          <a:xfrm>
+            <a:off x="2734087" y="1123082"/>
+            <a:ext cx="2485258" cy="842176"/>
+          </a:xfrm>
+          <a:prstGeom prst="straightConnector1">
+            <a:avLst/>
+          </a:prstGeom>
+          <a:ln w="101600">
+            <a:tailEnd type="triangle"/>
+          </a:ln>
+        </p:spPr>
+        <p:style>
+          <a:lnRef idx="1">
+            <a:schemeClr val="accent1"/>
+          </a:lnRef>
+          <a:fillRef idx="0">
+            <a:schemeClr val="accent1"/>
+          </a:fillRef>
+          <a:effectRef idx="0">
+            <a:schemeClr val="accent1"/>
+          </a:effectRef>
+          <a:fontRef idx="minor">
+            <a:schemeClr val="tx1"/>
+          </a:fontRef>
+        </p:style>
+      </p:cxnSp>
+      <p:pic>
+        <p:nvPicPr>
+          <p:cNvPr id="13" name="Picture 12">
+            <a:extLst>
+              <a:ext uri="{FF2B5EF4-FFF2-40B4-BE49-F238E27FC236}">
+                <a16:creationId xmlns:a16="http://schemas.microsoft.com/office/drawing/2014/main" id="{C34D89DA-855C-B049-B515-1ABC1EA6ADA3}"/>
+              </a:ext>
+            </a:extLst>
+          </p:cNvPr>
+          <p:cNvPicPr>
+            <a:picLocks noChangeAspect="1"/>
+          </p:cNvPicPr>
+          <p:nvPr/>
+        </p:nvPicPr>
+        <p:blipFill>
+          <a:blip r:embed="rId2"/>
+          <a:stretch>
+            <a:fillRect/>
+          </a:stretch>
+        </p:blipFill>
+        <p:spPr>
+          <a:xfrm>
+            <a:off x="7990537" y="1612441"/>
+            <a:ext cx="537233" cy="727504"/>
+          </a:xfrm>
+          <a:prstGeom prst="rect">
+            <a:avLst/>
+          </a:prstGeom>
+        </p:spPr>
+      </p:pic>
+      <p:sp>
+        <p:nvSpPr>
+          <p:cNvPr id="14" name="Bent-Up Arrow 13">
+            <a:extLst>
+              <a:ext uri="{FF2B5EF4-FFF2-40B4-BE49-F238E27FC236}">
+                <a16:creationId xmlns:a16="http://schemas.microsoft.com/office/drawing/2014/main" id="{374DC5CA-CE7E-B44C-9190-6397684C2B76}"/>
+              </a:ext>
+            </a:extLst>
+          </p:cNvPr>
+          <p:cNvSpPr/>
+          <p:nvPr/>
+        </p:nvSpPr>
+        <p:spPr>
+          <a:xfrm flipH="1">
+            <a:off x="6261141" y="2734581"/>
+            <a:ext cx="2111913" cy="870463"/>
+          </a:xfrm>
+          <a:prstGeom prst="bentUpArrow">
+            <a:avLst>
+              <a:gd name="adj1" fmla="val 9091"/>
+              <a:gd name="adj2" fmla="val 19886"/>
+              <a:gd name="adj3" fmla="val 25000"/>
+            </a:avLst>
+          </a:prstGeom>
+        </p:spPr>
+        <p:style>
+          <a:lnRef idx="2">
+            <a:schemeClr val="accent1">
+              <a:shade val="50000"/>
+            </a:schemeClr>
+          </a:lnRef>
+          <a:fillRef idx="1">
+            <a:schemeClr val="accent1"/>
+          </a:fillRef>
+          <a:effectRef idx="0">
+            <a:schemeClr val="accent1"/>
+          </a:effectRef>
+          <a:fontRef idx="minor">
+            <a:schemeClr val="lt1"/>
+          </a:fontRef>
+        </p:style>
+        <p:txBody>
+          <a:bodyPr rot="0" spcFirstLastPara="0" vertOverflow="overflow" horzOverflow="overflow" vert="horz" wrap="square" lIns="85725" tIns="42863" rIns="85725" bIns="42863" numCol="1" spcCol="0" rtlCol="0" fromWordArt="0" anchor="ctr" anchorCtr="0" forceAA="0" compatLnSpc="1">
+            <a:prstTxWarp prst="textNoShape">
+              <a:avLst/>
+            </a:prstTxWarp>
+            <a:noAutofit/>
+          </a:bodyPr>
+          <a:lstStyle/>
+          <a:p>
+            <a:pPr algn="ctr"/>
+            <a:endParaRPr lang="en-US" sz="1500" b="1" dirty="0"/>
+          </a:p>
+        </p:txBody>
+      </p:sp>
+      <p:sp>
+        <p:nvSpPr>
+          <p:cNvPr id="15" name="TextBox 14">
+            <a:extLst>
+              <a:ext uri="{FF2B5EF4-FFF2-40B4-BE49-F238E27FC236}">
+                <a16:creationId xmlns:a16="http://schemas.microsoft.com/office/drawing/2014/main" id="{1EA5F8B3-2AD4-0C42-9324-2A55F143572D}"/>
+              </a:ext>
+            </a:extLst>
+          </p:cNvPr>
+          <p:cNvSpPr txBox="1"/>
+          <p:nvPr/>
+        </p:nvSpPr>
+        <p:spPr>
+          <a:xfrm>
+            <a:off x="7433845" y="2483269"/>
+            <a:ext cx="1542444" cy="553998"/>
+          </a:xfrm>
+          <a:prstGeom prst="rect">
+            <a:avLst/>
+          </a:prstGeom>
+          <a:noFill/>
+        </p:spPr>
+        <p:txBody>
+          <a:bodyPr wrap="square" rtlCol="0">
+            <a:spAutoFit/>
+          </a:bodyPr>
+          <a:lstStyle/>
+          <a:p>
+            <a:pPr algn="ctr"/>
+            <a:r>
+              <a:rPr lang="en-US" sz="1500" b="1" dirty="0"/>
+              <a:t>Completed Sketch File</a:t>
+            </a:r>
+          </a:p>
+        </p:txBody>
+      </p:sp>
+      <p:pic>
+        <p:nvPicPr>
+          <p:cNvPr id="16" name="Picture 15">
+            <a:extLst>
+              <a:ext uri="{FF2B5EF4-FFF2-40B4-BE49-F238E27FC236}">
+                <a16:creationId xmlns:a16="http://schemas.microsoft.com/office/drawing/2014/main" id="{358A4854-9295-4549-8075-B6165547C688}"/>
+              </a:ext>
+            </a:extLst>
+          </p:cNvPr>
+          <p:cNvPicPr>
+            <a:picLocks noChangeAspect="1"/>
+          </p:cNvPicPr>
+          <p:nvPr/>
+        </p:nvPicPr>
+        <p:blipFill>
+          <a:blip r:embed="rId2"/>
+          <a:stretch>
+            <a:fillRect/>
+          </a:stretch>
+        </p:blipFill>
+        <p:spPr>
+          <a:xfrm>
+            <a:off x="2215640" y="823247"/>
+            <a:ext cx="537233" cy="727504"/>
+          </a:xfrm>
+          <a:prstGeom prst="rect">
+            <a:avLst/>
+          </a:prstGeom>
+        </p:spPr>
+      </p:pic>
+      <p:sp>
+        <p:nvSpPr>
+          <p:cNvPr id="17" name="Down Arrow 16">
+            <a:extLst>
+              <a:ext uri="{FF2B5EF4-FFF2-40B4-BE49-F238E27FC236}">
+                <a16:creationId xmlns:a16="http://schemas.microsoft.com/office/drawing/2014/main" id="{23E951BF-668D-D444-88D5-FB6CB41DEB1B}"/>
+              </a:ext>
+            </a:extLst>
+          </p:cNvPr>
+          <p:cNvSpPr/>
+          <p:nvPr/>
+        </p:nvSpPr>
+        <p:spPr>
+          <a:xfrm>
+            <a:off x="9215324" y="4135489"/>
+            <a:ext cx="139168" cy="675977"/>
+          </a:xfrm>
+          <a:prstGeom prst="downArrow">
+            <a:avLst/>
+          </a:prstGeom>
+        </p:spPr>
+        <p:style>
+          <a:lnRef idx="2">
+            <a:schemeClr val="accent1">
+              <a:shade val="50000"/>
+            </a:schemeClr>
+          </a:lnRef>
+          <a:fillRef idx="1">
+            <a:schemeClr val="accent1"/>
+          </a:fillRef>
+          <a:effectRef idx="0">
+            <a:schemeClr val="accent1"/>
+          </a:effectRef>
+          <a:fontRef idx="minor">
+            <a:schemeClr val="lt1"/>
+          </a:fontRef>
+        </p:style>
+        <p:txBody>
+          <a:bodyPr rot="0" spcFirstLastPara="0" vertOverflow="overflow" horzOverflow="overflow" vert="horz" wrap="square" lIns="85725" tIns="42863" rIns="85725" bIns="42863" numCol="1" spcCol="0" rtlCol="0" fromWordArt="0" anchor="ctr" anchorCtr="0" forceAA="0" compatLnSpc="1">
+            <a:prstTxWarp prst="textNoShape">
+              <a:avLst/>
+            </a:prstTxWarp>
+            <a:noAutofit/>
+          </a:bodyPr>
+          <a:lstStyle/>
+          <a:p>
+            <a:pPr algn="ctr"/>
+            <a:endParaRPr lang="en-US" sz="1500" b="1"/>
+          </a:p>
+        </p:txBody>
+      </p:sp>
+      <p:sp>
+        <p:nvSpPr>
+          <p:cNvPr id="18" name="TextBox 17">
+            <a:extLst>
+              <a:ext uri="{FF2B5EF4-FFF2-40B4-BE49-F238E27FC236}">
+                <a16:creationId xmlns:a16="http://schemas.microsoft.com/office/drawing/2014/main" id="{9B3DAD0D-F482-4546-A24D-13C8D83164DF}"/>
+              </a:ext>
+            </a:extLst>
+          </p:cNvPr>
+          <p:cNvSpPr txBox="1"/>
+          <p:nvPr/>
+        </p:nvSpPr>
+        <p:spPr>
+          <a:xfrm>
+            <a:off x="9669941" y="4196478"/>
+            <a:ext cx="1147610" cy="553998"/>
+          </a:xfrm>
+          <a:prstGeom prst="rect">
+            <a:avLst/>
+          </a:prstGeom>
+          <a:noFill/>
+        </p:spPr>
+        <p:txBody>
+          <a:bodyPr wrap="square" rtlCol="0">
+            <a:spAutoFit/>
+          </a:bodyPr>
+          <a:lstStyle/>
+          <a:p>
+            <a:pPr algn="ctr"/>
+            <a:r>
+              <a:rPr lang="en-US" sz="1500" b="1" dirty="0"/>
+              <a:t>Successful Verification</a:t>
+            </a:r>
+          </a:p>
+        </p:txBody>
+      </p:sp>
+      <p:sp>
+        <p:nvSpPr>
+          <p:cNvPr id="19" name="TextBox 18">
+            <a:extLst>
+              <a:ext uri="{FF2B5EF4-FFF2-40B4-BE49-F238E27FC236}">
+                <a16:creationId xmlns:a16="http://schemas.microsoft.com/office/drawing/2014/main" id="{8C798642-D94F-5249-B74D-C33A1740BEFA}"/>
+              </a:ext>
+            </a:extLst>
+          </p:cNvPr>
+          <p:cNvSpPr txBox="1"/>
+          <p:nvPr/>
+        </p:nvSpPr>
+        <p:spPr>
+          <a:xfrm>
+            <a:off x="6662402" y="718116"/>
+            <a:ext cx="1826033" cy="553998"/>
+          </a:xfrm>
+          <a:prstGeom prst="rect">
+            <a:avLst/>
+          </a:prstGeom>
+          <a:noFill/>
+        </p:spPr>
+        <p:txBody>
+          <a:bodyPr wrap="square" rtlCol="0">
+            <a:spAutoFit/>
+          </a:bodyPr>
+          <a:lstStyle/>
+          <a:p>
+            <a:r>
+              <a:rPr lang="en-US" sz="1500" b="1" dirty="0"/>
+              <a:t>Completes spec with 2 bit inputs</a:t>
+            </a:r>
+          </a:p>
+        </p:txBody>
+      </p:sp>
+      <p:pic>
+        <p:nvPicPr>
+          <p:cNvPr id="20" name="Picture 19">
+            <a:extLst>
+              <a:ext uri="{FF2B5EF4-FFF2-40B4-BE49-F238E27FC236}">
+                <a16:creationId xmlns:a16="http://schemas.microsoft.com/office/drawing/2014/main" id="{D02DF6C2-2339-C04C-95C7-6D5C53C6A95C}"/>
+              </a:ext>
+            </a:extLst>
+          </p:cNvPr>
+          <p:cNvPicPr>
+            <a:picLocks noChangeAspect="1"/>
+          </p:cNvPicPr>
+          <p:nvPr/>
+        </p:nvPicPr>
+        <p:blipFill>
+          <a:blip r:embed="rId2"/>
+          <a:stretch>
+            <a:fillRect/>
+          </a:stretch>
+        </p:blipFill>
+        <p:spPr>
+          <a:xfrm>
+            <a:off x="9061526" y="4940651"/>
+            <a:ext cx="537233" cy="727504"/>
+          </a:xfrm>
+          <a:prstGeom prst="rect">
+            <a:avLst/>
+          </a:prstGeom>
+        </p:spPr>
+      </p:pic>
+      <p:sp>
+        <p:nvSpPr>
+          <p:cNvPr id="21" name="TextBox 20">
+            <a:extLst>
+              <a:ext uri="{FF2B5EF4-FFF2-40B4-BE49-F238E27FC236}">
+                <a16:creationId xmlns:a16="http://schemas.microsoft.com/office/drawing/2014/main" id="{AA9D0E66-E061-6F4D-8A3B-B2CBF32E6687}"/>
+              </a:ext>
+            </a:extLst>
+          </p:cNvPr>
+          <p:cNvSpPr txBox="1"/>
+          <p:nvPr/>
+        </p:nvSpPr>
+        <p:spPr>
+          <a:xfrm>
+            <a:off x="8767254" y="5785845"/>
+            <a:ext cx="1334127" cy="553998"/>
+          </a:xfrm>
+          <a:prstGeom prst="rect">
+            <a:avLst/>
+          </a:prstGeom>
+          <a:solidFill>
+            <a:schemeClr val="bg1"/>
+          </a:solidFill>
+        </p:spPr>
+        <p:txBody>
+          <a:bodyPr wrap="square" rtlCol="0">
+            <a:spAutoFit/>
+          </a:bodyPr>
+          <a:lstStyle/>
+          <a:p>
+            <a:r>
+              <a:rPr lang="en-US" sz="1500" b="1" dirty="0"/>
+              <a:t>Verified Sketch File</a:t>
+            </a:r>
+          </a:p>
+        </p:txBody>
+      </p:sp>
+      <p:sp>
+        <p:nvSpPr>
+          <p:cNvPr id="22" name="TextBox 21">
+            <a:extLst>
+              <a:ext uri="{FF2B5EF4-FFF2-40B4-BE49-F238E27FC236}">
+                <a16:creationId xmlns:a16="http://schemas.microsoft.com/office/drawing/2014/main" id="{033D7C26-81DC-C14A-8952-04DC305FB3BF}"/>
+              </a:ext>
+            </a:extLst>
+          </p:cNvPr>
+          <p:cNvSpPr txBox="1"/>
+          <p:nvPr/>
+        </p:nvSpPr>
+        <p:spPr>
+          <a:xfrm>
+            <a:off x="1917623" y="3521565"/>
+            <a:ext cx="1881108" cy="323165"/>
+          </a:xfrm>
+          <a:prstGeom prst="rect">
+            <a:avLst/>
+          </a:prstGeom>
+          <a:solidFill>
+            <a:schemeClr val="bg1"/>
+          </a:solidFill>
+        </p:spPr>
+        <p:txBody>
+          <a:bodyPr wrap="square" rtlCol="0">
+            <a:spAutoFit/>
+          </a:bodyPr>
+          <a:lstStyle/>
+          <a:p>
+            <a:r>
+              <a:rPr lang="en-US" sz="1500" b="1" dirty="0"/>
+              <a:t>Input Sketch file</a:t>
+            </a:r>
+          </a:p>
+        </p:txBody>
+      </p:sp>
+      <p:pic>
+        <p:nvPicPr>
+          <p:cNvPr id="23" name="Picture 22">
+            <a:extLst>
+              <a:ext uri="{FF2B5EF4-FFF2-40B4-BE49-F238E27FC236}">
+                <a16:creationId xmlns:a16="http://schemas.microsoft.com/office/drawing/2014/main" id="{319572BF-824A-3F40-A176-5DD866C8167E}"/>
+              </a:ext>
+            </a:extLst>
+          </p:cNvPr>
+          <p:cNvPicPr>
+            <a:picLocks noChangeAspect="1"/>
+          </p:cNvPicPr>
+          <p:nvPr/>
+        </p:nvPicPr>
+        <p:blipFill>
+          <a:blip r:embed="rId2"/>
+          <a:stretch>
+            <a:fillRect/>
+          </a:stretch>
+        </p:blipFill>
+        <p:spPr>
+          <a:xfrm>
+            <a:off x="2188840" y="2775040"/>
+            <a:ext cx="537233" cy="727504"/>
+          </a:xfrm>
+          <a:prstGeom prst="rect">
+            <a:avLst/>
+          </a:prstGeom>
+        </p:spPr>
+      </p:pic>
+      <p:cxnSp>
+        <p:nvCxnSpPr>
+          <p:cNvPr id="24" name="Straight Arrow Connector 23">
+            <a:extLst>
+              <a:ext uri="{FF2B5EF4-FFF2-40B4-BE49-F238E27FC236}">
+                <a16:creationId xmlns:a16="http://schemas.microsoft.com/office/drawing/2014/main" id="{E3C2D292-844A-0C45-A845-BEDE6006E24F}"/>
+              </a:ext>
+            </a:extLst>
+          </p:cNvPr>
+          <p:cNvCxnSpPr>
+            <a:cxnSpLocks/>
+          </p:cNvCxnSpPr>
+          <p:nvPr/>
+        </p:nvCxnSpPr>
+        <p:spPr>
+          <a:xfrm flipV="1">
+            <a:off x="3692306" y="2434355"/>
+            <a:ext cx="869680" cy="241686"/>
+          </a:xfrm>
+          <a:prstGeom prst="straightConnector1">
+            <a:avLst/>
+          </a:prstGeom>
+          <a:ln w="101600">
+            <a:tailEnd type="triangle"/>
+          </a:ln>
+        </p:spPr>
+        <p:style>
+          <a:lnRef idx="1">
+            <a:schemeClr val="accent1"/>
+          </a:lnRef>
+          <a:fillRef idx="0">
+            <a:schemeClr val="accent1"/>
+          </a:fillRef>
+          <a:effectRef idx="0">
+            <a:schemeClr val="accent1"/>
+          </a:effectRef>
+          <a:fontRef idx="minor">
+            <a:schemeClr val="tx1"/>
+          </a:fontRef>
+        </p:style>
+      </p:cxnSp>
+      <p:sp>
+        <p:nvSpPr>
+          <p:cNvPr id="25" name="Rectangle 24">
+            <a:extLst>
+              <a:ext uri="{FF2B5EF4-FFF2-40B4-BE49-F238E27FC236}">
+                <a16:creationId xmlns:a16="http://schemas.microsoft.com/office/drawing/2014/main" id="{C722B2DC-AB19-F84D-873A-7B5989D0AFE7}"/>
+              </a:ext>
+            </a:extLst>
+          </p:cNvPr>
+          <p:cNvSpPr/>
+          <p:nvPr/>
+        </p:nvSpPr>
+        <p:spPr>
+          <a:xfrm>
             <a:off x="601100" y="379773"/>
-            <a:ext cx="5946821" cy="369332"/>
+            <a:ext cx="5658280" cy="369332"/>
           </a:xfrm>
           <a:prstGeom prst="rect">
             <a:avLst/>
@@ -4452,13 +5329,47 @@
           </a:bodyPr>
           <a:lstStyle/>
           <a:p>
-            <a:pPr marL="285750" indent="-285750">
-              <a:buFont typeface="Arial" panose="020B0604020202020204" pitchFamily="34" charset="0"/>
-              <a:buChar char="•"/>
-            </a:pPr>
             <a:r>
               <a:rPr lang="en-US" b="1"/>
               <a:t>External counterexample mode vs hole-elimination mode</a:t>
+            </a:r>
+          </a:p>
+        </p:txBody>
+      </p:sp>
+      <p:sp>
+        <p:nvSpPr>
+          <p:cNvPr id="26" name="Rectangle 25">
+            <a:extLst>
+              <a:ext uri="{FF2B5EF4-FFF2-40B4-BE49-F238E27FC236}">
+                <a16:creationId xmlns:a16="http://schemas.microsoft.com/office/drawing/2014/main" id="{2429F1CB-0A1F-B449-87CA-7DD7266539C0}"/>
+              </a:ext>
+            </a:extLst>
+          </p:cNvPr>
+          <p:cNvSpPr/>
+          <p:nvPr/>
+        </p:nvSpPr>
+        <p:spPr>
+          <a:xfrm>
+            <a:off x="370634" y="5968712"/>
+            <a:ext cx="7239033" cy="369332"/>
+          </a:xfrm>
+          <a:prstGeom prst="rect">
+            <a:avLst/>
+          </a:prstGeom>
+        </p:spPr>
+        <p:txBody>
+          <a:bodyPr wrap="none">
+            <a:spAutoFit/>
+          </a:bodyPr>
+          <a:lstStyle/>
+          <a:p>
+            <a:r>
+              <a:rPr lang="en-US" b="1">
+                <a:solidFill>
+                  <a:srgbClr val="FF0000"/>
+                </a:solidFill>
+              </a:rPr>
+              <a:t>NOTE: this figure is borrowed from NSDI, we should make a lot of changes</a:t>
             </a:r>
           </a:p>
         </p:txBody>
@@ -4466,7 +5377,7 @@
     </p:spTree>
     <p:extLst>
       <p:ext uri="{BB962C8B-B14F-4D97-AF65-F5344CB8AC3E}">
-        <p14:creationId xmlns:p14="http://schemas.microsoft.com/office/powerpoint/2010/main" val="1022074525"/>
+        <p14:creationId xmlns:p14="http://schemas.microsoft.com/office/powerpoint/2010/main" val="829517524"/>
       </p:ext>
     </p:extLst>
   </p:cSld>
@@ -7036,7 +7947,7 @@
         <p:spPr>
           <a:xfrm>
             <a:off x="601100" y="355059"/>
-            <a:ext cx="5182124" cy="369332"/>
+            <a:ext cx="4893584" cy="369332"/>
           </a:xfrm>
           <a:prstGeom prst="rect">
             <a:avLst/>
@@ -7048,10 +7959,6 @@
           </a:bodyPr>
           <a:lstStyle/>
           <a:p>
-            <a:pPr marL="285750" indent="-285750">
-              <a:buFont typeface="Arial" panose="020B0604020202020204" pitchFamily="34" charset="0"/>
-              <a:buChar char="•"/>
-            </a:pPr>
             <a:r>
               <a:rPr lang="en-US" b="1"/>
               <a:t>Canonicalized allocation vs synthesized allocation</a:t>
@@ -7091,91 +7998,44 @@
       </p:grpSpPr>
       <p:sp>
         <p:nvSpPr>
-          <p:cNvPr id="4" name="Title 1">
-            <a:extLst>
-              <a:ext uri="{FF2B5EF4-FFF2-40B4-BE49-F238E27FC236}">
-                <a16:creationId xmlns:a16="http://schemas.microsoft.com/office/drawing/2014/main" id="{27488B10-E791-B84B-9454-529036FFBC58}"/>
-              </a:ext>
-            </a:extLst>
-          </p:cNvPr>
-          <p:cNvSpPr txBox="1">
-            <a:spLocks/>
-          </p:cNvSpPr>
+          <p:cNvPr id="3" name="Rectangle 2">
+            <a:extLst>
+              <a:ext uri="{FF2B5EF4-FFF2-40B4-BE49-F238E27FC236}">
+                <a16:creationId xmlns:a16="http://schemas.microsoft.com/office/drawing/2014/main" id="{D7B2C905-1C57-3A49-9FCA-CBA37FDA671F}"/>
+              </a:ext>
+            </a:extLst>
+          </p:cNvPr>
+          <p:cNvSpPr/>
           <p:nvPr/>
         </p:nvSpPr>
         <p:spPr>
           <a:xfrm>
-            <a:off x="296562" y="274638"/>
-            <a:ext cx="11738919" cy="1143000"/>
+            <a:off x="601100" y="379773"/>
+            <a:ext cx="3252878" cy="369332"/>
           </a:xfrm>
           <a:prstGeom prst="rect">
             <a:avLst/>
           </a:prstGeom>
         </p:spPr>
         <p:txBody>
-          <a:bodyPr vert="horz" lIns="91440" tIns="45720" rIns="91440" bIns="45720" rtlCol="0" anchor="ctr">
-            <a:noAutofit/>
+          <a:bodyPr wrap="none">
+            <a:spAutoFit/>
           </a:bodyPr>
-          <a:lstStyle>
-            <a:lvl1pPr algn="ctr" defTabSz="457200" rtl="0" eaLnBrk="1" latinLnBrk="0" hangingPunct="1">
-              <a:spcBef>
-                <a:spcPct val="0"/>
-              </a:spcBef>
-              <a:buNone/>
-              <a:defRPr sz="4400" kern="1200">
-                <a:solidFill>
-                  <a:srgbClr val="0000FF"/>
-                </a:solidFill>
-                <a:latin typeface="+mj-lt"/>
-                <a:ea typeface="+mj-ea"/>
-                <a:cs typeface="+mj-cs"/>
-              </a:defRPr>
-            </a:lvl1pPr>
-          </a:lstStyle>
-          <a:p>
-            <a:pPr marL="0" marR="0" lvl="0" indent="0" algn="ctr" defTabSz="457200" rtl="0" eaLnBrk="1" fontAlgn="auto" latinLnBrk="0" hangingPunct="1">
-              <a:lnSpc>
-                <a:spcPct val="100000"/>
-              </a:lnSpc>
-              <a:spcBef>
-                <a:spcPct val="0"/>
-              </a:spcBef>
-              <a:spcAft>
-                <a:spcPts val="0"/>
-              </a:spcAft>
-              <a:buClrTx/>
-              <a:buSzTx/>
-              <a:buFontTx/>
-              <a:buNone/>
-              <a:tabLst/>
-              <a:defRPr/>
-            </a:pPr>
-            <a:r>
-              <a:rPr kumimoji="0" lang="en-US" sz="3800" b="0" i="0" u="none" strike="noStrike" kern="1200" cap="none" spc="0" normalizeH="0" baseline="0" noProof="0" dirty="0">
-                <a:ln>
-                  <a:noFill/>
-                </a:ln>
-                <a:solidFill>
-                  <a:srgbClr val="0000FF"/>
-                </a:solidFill>
-                <a:effectLst/>
-                <a:uLnTx/>
-                <a:uFillTx/>
-                <a:latin typeface="Calibri"/>
-                <a:ea typeface="+mj-ea"/>
-                <a:cs typeface="+mj-cs"/>
-              </a:rPr>
-              <a:t>Benchmark introduction</a:t>
-            </a:r>
-          </a:p>
-        </p:txBody>
-      </p:sp>
-      <p:sp>
-        <p:nvSpPr>
-          <p:cNvPr id="5" name="TextBox 4">
-            <a:extLst>
-              <a:ext uri="{FF2B5EF4-FFF2-40B4-BE49-F238E27FC236}">
-                <a16:creationId xmlns:a16="http://schemas.microsoft.com/office/drawing/2014/main" id="{2E43FD2C-73AC-8340-9279-08D34ACFC067}"/>
+          <a:lstStyle/>
+          <a:p>
+            <a:r>
+              <a:rPr lang="en-US" b="1"/>
+              <a:t>Gradual search for stateless ALU</a:t>
+            </a:r>
+          </a:p>
+        </p:txBody>
+      </p:sp>
+      <p:sp>
+        <p:nvSpPr>
+          <p:cNvPr id="4" name="TextBox 3">
+            <a:extLst>
+              <a:ext uri="{FF2B5EF4-FFF2-40B4-BE49-F238E27FC236}">
+                <a16:creationId xmlns:a16="http://schemas.microsoft.com/office/drawing/2014/main" id="{60EF046B-A10C-9E45-A65A-9286E1E73485}"/>
               </a:ext>
             </a:extLst>
           </p:cNvPr>
@@ -7184,8 +8044,8 @@
         </p:nvSpPr>
         <p:spPr>
           <a:xfrm>
-            <a:off x="926757" y="2298357"/>
-            <a:ext cx="6932140" cy="2585323"/>
+            <a:off x="4243773" y="1304741"/>
+            <a:ext cx="4429126" cy="369332"/>
           </a:xfrm>
           <a:prstGeom prst="rect">
             <a:avLst/>
@@ -7198,85 +8058,19 @@
           </a:bodyPr>
           <a:lstStyle/>
           <a:p>
-            <a:pPr marL="285750" indent="-285750">
-              <a:buFont typeface="Arial" panose="020B0604020202020204" pitchFamily="34" charset="0"/>
-              <a:buChar char="•"/>
-            </a:pPr>
-            <a:r>
-              <a:rPr lang="en-US" b="1"/>
-              <a:t>Add (1==1)</a:t>
-            </a:r>
-          </a:p>
-          <a:p>
-            <a:pPr marL="285750" indent="-285750">
-              <a:buFont typeface="Arial" panose="020B0604020202020204" pitchFamily="34" charset="0"/>
-              <a:buChar char="•"/>
-            </a:pPr>
-            <a:endParaRPr lang="en-US" b="1"/>
-          </a:p>
-          <a:p>
-            <a:pPr marL="285750" indent="-285750">
-              <a:buFont typeface="Arial" panose="020B0604020202020204" pitchFamily="34" charset="0"/>
-              <a:buChar char="•"/>
-            </a:pPr>
-            <a:endParaRPr lang="en-US" b="1"/>
-          </a:p>
-          <a:p>
-            <a:pPr marL="285750" indent="-285750">
-              <a:buFont typeface="Arial" panose="020B0604020202020204" pitchFamily="34" charset="0"/>
-              <a:buChar char="•"/>
-            </a:pPr>
-            <a:endParaRPr lang="en-US" b="1"/>
-          </a:p>
-          <a:p>
-            <a:pPr marL="285750" indent="-285750">
-              <a:buFont typeface="Arial" panose="020B0604020202020204" pitchFamily="34" charset="0"/>
-              <a:buChar char="•"/>
-            </a:pPr>
-            <a:r>
-              <a:rPr lang="en-US" b="1"/>
-              <a:t>Switch the if-else statement</a:t>
-            </a:r>
-          </a:p>
-          <a:p>
-            <a:pPr marL="285750" indent="-285750">
-              <a:buFont typeface="Arial" panose="020B0604020202020204" pitchFamily="34" charset="0"/>
-              <a:buChar char="•"/>
-            </a:pPr>
-            <a:endParaRPr lang="en-US" b="1"/>
-          </a:p>
-          <a:p>
-            <a:pPr marL="285750" indent="-285750">
-              <a:buFont typeface="Arial" panose="020B0604020202020204" pitchFamily="34" charset="0"/>
-              <a:buChar char="•"/>
-            </a:pPr>
-            <a:endParaRPr lang="en-US" b="1"/>
-          </a:p>
-          <a:p>
-            <a:pPr marL="285750" indent="-285750">
-              <a:buFont typeface="Arial" panose="020B0604020202020204" pitchFamily="34" charset="0"/>
-              <a:buChar char="•"/>
-            </a:pPr>
-            <a:endParaRPr lang="en-US" b="1"/>
-          </a:p>
-          <a:p>
-            <a:pPr marL="285750" indent="-285750">
-              <a:buFont typeface="Arial" panose="020B0604020202020204" pitchFamily="34" charset="0"/>
-              <a:buChar char="•"/>
-            </a:pPr>
-            <a:r>
-              <a:rPr lang="en-US" b="1"/>
-              <a:t>Switch the order of statement within if </a:t>
-            </a:r>
-          </a:p>
-        </p:txBody>
-      </p:sp>
-      <p:sp>
-        <p:nvSpPr>
-          <p:cNvPr id="6" name="TextBox 5">
-            <a:extLst>
-              <a:ext uri="{FF2B5EF4-FFF2-40B4-BE49-F238E27FC236}">
-                <a16:creationId xmlns:a16="http://schemas.microsoft.com/office/drawing/2014/main" id="{5EDC3E62-9309-6C4A-8691-357902D7B937}"/>
+            <a:r>
+              <a:rPr lang="en-US"/>
+              <a:t>Stateless alu</a:t>
+            </a:r>
+          </a:p>
+        </p:txBody>
+      </p:sp>
+      <p:sp>
+        <p:nvSpPr>
+          <p:cNvPr id="7" name="TextBox 6">
+            <a:extLst>
+              <a:ext uri="{FF2B5EF4-FFF2-40B4-BE49-F238E27FC236}">
+                <a16:creationId xmlns:a16="http://schemas.microsoft.com/office/drawing/2014/main" id="{45BF686C-453A-7E4E-8207-7596EE6347BE}"/>
               </a:ext>
             </a:extLst>
           </p:cNvPr>
@@ -7285,8 +8079,8 @@
         </p:nvSpPr>
         <p:spPr>
           <a:xfrm>
-            <a:off x="926757" y="1488665"/>
-            <a:ext cx="6932140" cy="369332"/>
+            <a:off x="3628595" y="2003458"/>
+            <a:ext cx="4429126" cy="369332"/>
           </a:xfrm>
           <a:prstGeom prst="rect">
             <a:avLst/>
@@ -7300,86 +8094,88 @@
           <a:lstStyle/>
           <a:p>
             <a:r>
-              <a:rPr lang="en-US" b="1"/>
-              <a:t>Totally three ways to generate mutator </a:t>
-            </a:r>
-          </a:p>
-        </p:txBody>
-      </p:sp>
-      <p:sp>
-        <p:nvSpPr>
-          <p:cNvPr id="7" name="Rectangle 6">
-            <a:extLst>
-              <a:ext uri="{FF2B5EF4-FFF2-40B4-BE49-F238E27FC236}">
-                <a16:creationId xmlns:a16="http://schemas.microsoft.com/office/drawing/2014/main" id="{0D4AA46B-A73E-7440-8E16-276B65AC2BD6}"/>
-              </a:ext>
-            </a:extLst>
-          </p:cNvPr>
-          <p:cNvSpPr/>
+              <a:rPr lang="en-US"/>
+              <a:t>Stateless_alu_arith_rel_cond</a:t>
+            </a:r>
+          </a:p>
+        </p:txBody>
+      </p:sp>
+      <p:sp>
+        <p:nvSpPr>
+          <p:cNvPr id="8" name="TextBox 7">
+            <a:extLst>
+              <a:ext uri="{FF2B5EF4-FFF2-40B4-BE49-F238E27FC236}">
+                <a16:creationId xmlns:a16="http://schemas.microsoft.com/office/drawing/2014/main" id="{0154E959-57C0-884D-A3C6-DC570BC1BEA1}"/>
+              </a:ext>
+            </a:extLst>
+          </p:cNvPr>
+          <p:cNvSpPr txBox="1"/>
           <p:nvPr/>
         </p:nvSpPr>
         <p:spPr>
           <a:xfrm>
-            <a:off x="4642021" y="3406352"/>
-            <a:ext cx="7393460" cy="369332"/>
+            <a:off x="3853978" y="2761284"/>
+            <a:ext cx="4429126" cy="369332"/>
           </a:xfrm>
           <a:prstGeom prst="rect">
             <a:avLst/>
           </a:prstGeom>
-        </p:spPr>
-        <p:txBody>
-          <a:bodyPr wrap="square">
+          <a:noFill/>
+        </p:spPr>
+        <p:txBody>
+          <a:bodyPr wrap="square" rtlCol="0">
             <a:spAutoFit/>
           </a:bodyPr>
           <a:lstStyle/>
           <a:p>
             <a:r>
               <a:rPr lang="en-US"/>
-              <a:t>if (condition_1) {do A;} else {do B;} -----&gt; if(!condition_1) {do B;} else {do A;}</a:t>
-            </a:r>
-          </a:p>
-        </p:txBody>
-      </p:sp>
-      <p:sp>
-        <p:nvSpPr>
-          <p:cNvPr id="3" name="Rectangle 2">
-            <a:extLst>
-              <a:ext uri="{FF2B5EF4-FFF2-40B4-BE49-F238E27FC236}">
-                <a16:creationId xmlns:a16="http://schemas.microsoft.com/office/drawing/2014/main" id="{F3EB28DC-E27A-2147-9B97-993393C42118}"/>
-              </a:ext>
-            </a:extLst>
-          </p:cNvPr>
-          <p:cNvSpPr/>
+              <a:t>Stateless_alu_arith_rel</a:t>
+            </a:r>
+          </a:p>
+        </p:txBody>
+      </p:sp>
+      <p:sp>
+        <p:nvSpPr>
+          <p:cNvPr id="9" name="TextBox 8">
+            <a:extLst>
+              <a:ext uri="{FF2B5EF4-FFF2-40B4-BE49-F238E27FC236}">
+                <a16:creationId xmlns:a16="http://schemas.microsoft.com/office/drawing/2014/main" id="{0BCD4481-B9B1-4743-AE31-8094F073A817}"/>
+              </a:ext>
+            </a:extLst>
+          </p:cNvPr>
+          <p:cNvSpPr txBox="1"/>
           <p:nvPr/>
         </p:nvSpPr>
         <p:spPr>
           <a:xfrm>
-            <a:off x="5214551" y="4468181"/>
-            <a:ext cx="6820930" cy="369332"/>
+            <a:off x="3951073" y="3686252"/>
+            <a:ext cx="4429126" cy="369332"/>
           </a:xfrm>
           <a:prstGeom prst="rect">
             <a:avLst/>
           </a:prstGeom>
-        </p:spPr>
-        <p:txBody>
-          <a:bodyPr wrap="square">
+          <a:noFill/>
+        </p:spPr>
+        <p:txBody>
+          <a:bodyPr wrap="square" rtlCol="0">
             <a:spAutoFit/>
           </a:bodyPr>
           <a:lstStyle/>
           <a:p>
             <a:r>
               <a:rPr lang="en-US"/>
-              <a:t>if (condition_1 &amp;&amp; condition_2) -----&gt; if (condition_2 &amp;&amp; condition_1)</a:t>
-            </a:r>
-          </a:p>
-        </p:txBody>
-      </p:sp>
-      <p:sp>
-        <p:nvSpPr>
-          <p:cNvPr id="8" name="Rectangle 7">
-            <a:extLst>
-              <a:ext uri="{FF2B5EF4-FFF2-40B4-BE49-F238E27FC236}">
-                <a16:creationId xmlns:a16="http://schemas.microsoft.com/office/drawing/2014/main" id="{9371B809-CEB2-674E-A509-DAAD50B43576}"/>
+              <a:t>Stateless_alu_arith</a:t>
+            </a:r>
+          </a:p>
+        </p:txBody>
+      </p:sp>
+      <p:sp>
+        <p:nvSpPr>
+          <p:cNvPr id="10" name="Rectangle 9">
+            <a:extLst>
+              <a:ext uri="{FF2B5EF4-FFF2-40B4-BE49-F238E27FC236}">
+                <a16:creationId xmlns:a16="http://schemas.microsoft.com/office/drawing/2014/main" id="{956A3C65-6E30-1F4D-995F-8A522BC92E5B}"/>
               </a:ext>
             </a:extLst>
           </p:cNvPr>
@@ -7388,134 +8184,54 @@
         </p:nvSpPr>
         <p:spPr>
           <a:xfrm>
-            <a:off x="4662620" y="2299226"/>
-            <a:ext cx="6820930" cy="369332"/>
+            <a:off x="432418" y="4958129"/>
+            <a:ext cx="10290125" cy="923330"/>
           </a:xfrm>
           <a:prstGeom prst="rect">
             <a:avLst/>
           </a:prstGeom>
         </p:spPr>
         <p:txBody>
-          <a:bodyPr wrap="square">
+          <a:bodyPr wrap="none">
             <a:spAutoFit/>
           </a:bodyPr>
           <a:lstStyle/>
           <a:p>
             <a:r>
-              <a:rPr lang="en-US"/>
-              <a:t>if (condition_1) {do A;} -----&gt; if (condition_1 &amp;&amp; 1==1) {do A;}</a:t>
-            </a:r>
-          </a:p>
-        </p:txBody>
-      </p:sp>
-      <p:sp>
-        <p:nvSpPr>
-          <p:cNvPr id="9" name="Oval 8">
-            <a:extLst>
-              <a:ext uri="{FF2B5EF4-FFF2-40B4-BE49-F238E27FC236}">
-                <a16:creationId xmlns:a16="http://schemas.microsoft.com/office/drawing/2014/main" id="{8C472178-6F34-FF4F-A217-9AD4A995DDB2}"/>
-              </a:ext>
-            </a:extLst>
-          </p:cNvPr>
-          <p:cNvSpPr/>
-          <p:nvPr/>
-        </p:nvSpPr>
-        <p:spPr>
-          <a:xfrm>
-            <a:off x="9045146" y="2150259"/>
-            <a:ext cx="803190" cy="667265"/>
-          </a:xfrm>
-          <a:prstGeom prst="ellipse">
-            <a:avLst/>
-          </a:prstGeom>
-          <a:noFill/>
-          <a:ln w="28575">
-            <a:solidFill>
-              <a:srgbClr val="FF0000"/>
-            </a:solidFill>
-          </a:ln>
-        </p:spPr>
-        <p:style>
-          <a:lnRef idx="2">
-            <a:schemeClr val="accent1">
-              <a:shade val="50000"/>
-            </a:schemeClr>
-          </a:lnRef>
-          <a:fillRef idx="1">
-            <a:schemeClr val="accent1"/>
-          </a:fillRef>
-          <a:effectRef idx="0">
-            <a:schemeClr val="accent1"/>
-          </a:effectRef>
-          <a:fontRef idx="minor">
-            <a:schemeClr val="lt1"/>
-          </a:fontRef>
-        </p:style>
-        <p:txBody>
-          <a:bodyPr rtlCol="0" anchor="ctr"/>
-          <a:lstStyle/>
-          <a:p>
-            <a:pPr algn="ctr"/>
-            <a:endParaRPr lang="en-US"/>
-          </a:p>
-        </p:txBody>
-      </p:sp>
-      <p:sp>
-        <p:nvSpPr>
-          <p:cNvPr id="10" name="Oval 9">
-            <a:extLst>
-              <a:ext uri="{FF2B5EF4-FFF2-40B4-BE49-F238E27FC236}">
-                <a16:creationId xmlns:a16="http://schemas.microsoft.com/office/drawing/2014/main" id="{2202F55D-7C94-3844-AF03-590419D54FC3}"/>
-              </a:ext>
-            </a:extLst>
-          </p:cNvPr>
-          <p:cNvSpPr/>
-          <p:nvPr/>
-        </p:nvSpPr>
-        <p:spPr>
-          <a:xfrm>
-            <a:off x="8625016" y="3246396"/>
-            <a:ext cx="1371600" cy="667265"/>
-          </a:xfrm>
-          <a:prstGeom prst="ellipse">
-            <a:avLst/>
-          </a:prstGeom>
-          <a:noFill/>
-          <a:ln w="28575">
-            <a:solidFill>
-              <a:srgbClr val="FF0000"/>
-            </a:solidFill>
-          </a:ln>
-        </p:spPr>
-        <p:style>
-          <a:lnRef idx="2">
-            <a:schemeClr val="accent1">
-              <a:shade val="50000"/>
-            </a:schemeClr>
-          </a:lnRef>
-          <a:fillRef idx="1">
-            <a:schemeClr val="accent1"/>
-          </a:fillRef>
-          <a:effectRef idx="0">
-            <a:schemeClr val="accent1"/>
-          </a:effectRef>
-          <a:fontRef idx="minor">
-            <a:schemeClr val="lt1"/>
-          </a:fontRef>
-        </p:style>
-        <p:txBody>
-          <a:bodyPr rtlCol="0" anchor="ctr"/>
-          <a:lstStyle/>
-          <a:p>
-            <a:pPr algn="ctr"/>
-            <a:endParaRPr lang="en-US"/>
+              <a:rPr lang="en-US" b="1">
+                <a:solidFill>
+                  <a:srgbClr val="FF0000"/>
+                </a:solidFill>
+              </a:rPr>
+              <a:t>NOTE: It looks like we delete the table to compare compilation time of stateless_alu vs stateless_alu_arith</a:t>
+            </a:r>
+          </a:p>
+          <a:p>
+            <a:r>
+              <a:rPr lang="en-US" b="1">
+                <a:solidFill>
+                  <a:srgbClr val="FF0000"/>
+                </a:solidFill>
+              </a:rPr>
+              <a:t>             in HotNets paper. We could add them back to the paper if there is enough space (7 pages at most)</a:t>
+            </a:r>
+          </a:p>
+          <a:p>
+            <a:r>
+              <a:rPr lang="en-US" b="1">
+                <a:solidFill>
+                  <a:srgbClr val="FF0000"/>
+                </a:solidFill>
+              </a:rPr>
+              <a:t>             and then show the table/graph here</a:t>
+            </a:r>
           </a:p>
         </p:txBody>
       </p:sp>
     </p:spTree>
     <p:extLst>
       <p:ext uri="{BB962C8B-B14F-4D97-AF65-F5344CB8AC3E}">
-        <p14:creationId xmlns:p14="http://schemas.microsoft.com/office/powerpoint/2010/main" val="2586495501"/>
+        <p14:creationId xmlns:p14="http://schemas.microsoft.com/office/powerpoint/2010/main" val="83857228"/>
       </p:ext>
     </p:extLst>
   </p:cSld>
@@ -7618,6 +8334,459 @@
                 <a:ea typeface="+mj-ea"/>
                 <a:cs typeface="+mj-cs"/>
               </a:rPr>
+              <a:t>Benchmark introduction</a:t>
+            </a:r>
+          </a:p>
+        </p:txBody>
+      </p:sp>
+      <p:sp>
+        <p:nvSpPr>
+          <p:cNvPr id="5" name="TextBox 4">
+            <a:extLst>
+              <a:ext uri="{FF2B5EF4-FFF2-40B4-BE49-F238E27FC236}">
+                <a16:creationId xmlns:a16="http://schemas.microsoft.com/office/drawing/2014/main" id="{2E43FD2C-73AC-8340-9279-08D34ACFC067}"/>
+              </a:ext>
+            </a:extLst>
+          </p:cNvPr>
+          <p:cNvSpPr txBox="1"/>
+          <p:nvPr/>
+        </p:nvSpPr>
+        <p:spPr>
+          <a:xfrm>
+            <a:off x="926757" y="2298357"/>
+            <a:ext cx="6932140" cy="2585323"/>
+          </a:xfrm>
+          <a:prstGeom prst="rect">
+            <a:avLst/>
+          </a:prstGeom>
+          <a:noFill/>
+        </p:spPr>
+        <p:txBody>
+          <a:bodyPr wrap="square" rtlCol="0">
+            <a:spAutoFit/>
+          </a:bodyPr>
+          <a:lstStyle/>
+          <a:p>
+            <a:pPr marL="285750" indent="-285750">
+              <a:buFont typeface="Arial" panose="020B0604020202020204" pitchFamily="34" charset="0"/>
+              <a:buChar char="•"/>
+            </a:pPr>
+            <a:r>
+              <a:rPr lang="en-US" b="1"/>
+              <a:t>Add (1==1)</a:t>
+            </a:r>
+          </a:p>
+          <a:p>
+            <a:pPr marL="285750" indent="-285750">
+              <a:buFont typeface="Arial" panose="020B0604020202020204" pitchFamily="34" charset="0"/>
+              <a:buChar char="•"/>
+            </a:pPr>
+            <a:endParaRPr lang="en-US" b="1"/>
+          </a:p>
+          <a:p>
+            <a:pPr marL="285750" indent="-285750">
+              <a:buFont typeface="Arial" panose="020B0604020202020204" pitchFamily="34" charset="0"/>
+              <a:buChar char="•"/>
+            </a:pPr>
+            <a:endParaRPr lang="en-US" b="1"/>
+          </a:p>
+          <a:p>
+            <a:pPr marL="285750" indent="-285750">
+              <a:buFont typeface="Arial" panose="020B0604020202020204" pitchFamily="34" charset="0"/>
+              <a:buChar char="•"/>
+            </a:pPr>
+            <a:endParaRPr lang="en-US" b="1"/>
+          </a:p>
+          <a:p>
+            <a:pPr marL="285750" indent="-285750">
+              <a:buFont typeface="Arial" panose="020B0604020202020204" pitchFamily="34" charset="0"/>
+              <a:buChar char="•"/>
+            </a:pPr>
+            <a:r>
+              <a:rPr lang="en-US" b="1"/>
+              <a:t>Switch the if-else statement</a:t>
+            </a:r>
+          </a:p>
+          <a:p>
+            <a:pPr marL="285750" indent="-285750">
+              <a:buFont typeface="Arial" panose="020B0604020202020204" pitchFamily="34" charset="0"/>
+              <a:buChar char="•"/>
+            </a:pPr>
+            <a:endParaRPr lang="en-US" b="1"/>
+          </a:p>
+          <a:p>
+            <a:pPr marL="285750" indent="-285750">
+              <a:buFont typeface="Arial" panose="020B0604020202020204" pitchFamily="34" charset="0"/>
+              <a:buChar char="•"/>
+            </a:pPr>
+            <a:endParaRPr lang="en-US" b="1"/>
+          </a:p>
+          <a:p>
+            <a:pPr marL="285750" indent="-285750">
+              <a:buFont typeface="Arial" panose="020B0604020202020204" pitchFamily="34" charset="0"/>
+              <a:buChar char="•"/>
+            </a:pPr>
+            <a:endParaRPr lang="en-US" b="1"/>
+          </a:p>
+          <a:p>
+            <a:pPr marL="285750" indent="-285750">
+              <a:buFont typeface="Arial" panose="020B0604020202020204" pitchFamily="34" charset="0"/>
+              <a:buChar char="•"/>
+            </a:pPr>
+            <a:r>
+              <a:rPr lang="en-US" b="1"/>
+              <a:t>Switch the order of statement within if </a:t>
+            </a:r>
+          </a:p>
+        </p:txBody>
+      </p:sp>
+      <p:sp>
+        <p:nvSpPr>
+          <p:cNvPr id="6" name="TextBox 5">
+            <a:extLst>
+              <a:ext uri="{FF2B5EF4-FFF2-40B4-BE49-F238E27FC236}">
+                <a16:creationId xmlns:a16="http://schemas.microsoft.com/office/drawing/2014/main" id="{5EDC3E62-9309-6C4A-8691-357902D7B937}"/>
+              </a:ext>
+            </a:extLst>
+          </p:cNvPr>
+          <p:cNvSpPr txBox="1"/>
+          <p:nvPr/>
+        </p:nvSpPr>
+        <p:spPr>
+          <a:xfrm>
+            <a:off x="926757" y="1488665"/>
+            <a:ext cx="6932140" cy="369332"/>
+          </a:xfrm>
+          <a:prstGeom prst="rect">
+            <a:avLst/>
+          </a:prstGeom>
+          <a:noFill/>
+        </p:spPr>
+        <p:txBody>
+          <a:bodyPr wrap="square" rtlCol="0">
+            <a:spAutoFit/>
+          </a:bodyPr>
+          <a:lstStyle/>
+          <a:p>
+            <a:r>
+              <a:rPr lang="en-US" b="1"/>
+              <a:t>Totally three ways to generate mutator </a:t>
+            </a:r>
+          </a:p>
+        </p:txBody>
+      </p:sp>
+      <p:sp>
+        <p:nvSpPr>
+          <p:cNvPr id="7" name="Rectangle 6">
+            <a:extLst>
+              <a:ext uri="{FF2B5EF4-FFF2-40B4-BE49-F238E27FC236}">
+                <a16:creationId xmlns:a16="http://schemas.microsoft.com/office/drawing/2014/main" id="{0D4AA46B-A73E-7440-8E16-276B65AC2BD6}"/>
+              </a:ext>
+            </a:extLst>
+          </p:cNvPr>
+          <p:cNvSpPr/>
+          <p:nvPr/>
+        </p:nvSpPr>
+        <p:spPr>
+          <a:xfrm>
+            <a:off x="4642021" y="3406352"/>
+            <a:ext cx="7393460" cy="369332"/>
+          </a:xfrm>
+          <a:prstGeom prst="rect">
+            <a:avLst/>
+          </a:prstGeom>
+        </p:spPr>
+        <p:txBody>
+          <a:bodyPr wrap="square">
+            <a:spAutoFit/>
+          </a:bodyPr>
+          <a:lstStyle/>
+          <a:p>
+            <a:r>
+              <a:rPr lang="en-US"/>
+              <a:t>if (condition_1) {do A;} else {do B;} -----&gt; if(!condition_1) {do B;} else {do A;}</a:t>
+            </a:r>
+          </a:p>
+        </p:txBody>
+      </p:sp>
+      <p:sp>
+        <p:nvSpPr>
+          <p:cNvPr id="3" name="Rectangle 2">
+            <a:extLst>
+              <a:ext uri="{FF2B5EF4-FFF2-40B4-BE49-F238E27FC236}">
+                <a16:creationId xmlns:a16="http://schemas.microsoft.com/office/drawing/2014/main" id="{F3EB28DC-E27A-2147-9B97-993393C42118}"/>
+              </a:ext>
+            </a:extLst>
+          </p:cNvPr>
+          <p:cNvSpPr/>
+          <p:nvPr/>
+        </p:nvSpPr>
+        <p:spPr>
+          <a:xfrm>
+            <a:off x="5214551" y="4468181"/>
+            <a:ext cx="6820930" cy="369332"/>
+          </a:xfrm>
+          <a:prstGeom prst="rect">
+            <a:avLst/>
+          </a:prstGeom>
+        </p:spPr>
+        <p:txBody>
+          <a:bodyPr wrap="square">
+            <a:spAutoFit/>
+          </a:bodyPr>
+          <a:lstStyle/>
+          <a:p>
+            <a:r>
+              <a:rPr lang="en-US"/>
+              <a:t>if (condition_1 &amp;&amp; condition_2) -----&gt; if (condition_2 &amp;&amp; condition_1)</a:t>
+            </a:r>
+          </a:p>
+        </p:txBody>
+      </p:sp>
+      <p:sp>
+        <p:nvSpPr>
+          <p:cNvPr id="8" name="Rectangle 7">
+            <a:extLst>
+              <a:ext uri="{FF2B5EF4-FFF2-40B4-BE49-F238E27FC236}">
+                <a16:creationId xmlns:a16="http://schemas.microsoft.com/office/drawing/2014/main" id="{9371B809-CEB2-674E-A509-DAAD50B43576}"/>
+              </a:ext>
+            </a:extLst>
+          </p:cNvPr>
+          <p:cNvSpPr/>
+          <p:nvPr/>
+        </p:nvSpPr>
+        <p:spPr>
+          <a:xfrm>
+            <a:off x="4662620" y="2299226"/>
+            <a:ext cx="6820930" cy="369332"/>
+          </a:xfrm>
+          <a:prstGeom prst="rect">
+            <a:avLst/>
+          </a:prstGeom>
+        </p:spPr>
+        <p:txBody>
+          <a:bodyPr wrap="square">
+            <a:spAutoFit/>
+          </a:bodyPr>
+          <a:lstStyle/>
+          <a:p>
+            <a:r>
+              <a:rPr lang="en-US"/>
+              <a:t>if (condition_1) {do A;} -----&gt; if (condition_1 &amp;&amp; 1==1) {do A;}</a:t>
+            </a:r>
+          </a:p>
+        </p:txBody>
+      </p:sp>
+      <p:sp>
+        <p:nvSpPr>
+          <p:cNvPr id="9" name="Oval 8">
+            <a:extLst>
+              <a:ext uri="{FF2B5EF4-FFF2-40B4-BE49-F238E27FC236}">
+                <a16:creationId xmlns:a16="http://schemas.microsoft.com/office/drawing/2014/main" id="{8C472178-6F34-FF4F-A217-9AD4A995DDB2}"/>
+              </a:ext>
+            </a:extLst>
+          </p:cNvPr>
+          <p:cNvSpPr/>
+          <p:nvPr/>
+        </p:nvSpPr>
+        <p:spPr>
+          <a:xfrm>
+            <a:off x="9045146" y="2150259"/>
+            <a:ext cx="803190" cy="667265"/>
+          </a:xfrm>
+          <a:prstGeom prst="ellipse">
+            <a:avLst/>
+          </a:prstGeom>
+          <a:noFill/>
+          <a:ln w="28575">
+            <a:solidFill>
+              <a:srgbClr val="FF0000"/>
+            </a:solidFill>
+          </a:ln>
+        </p:spPr>
+        <p:style>
+          <a:lnRef idx="2">
+            <a:schemeClr val="accent1">
+              <a:shade val="50000"/>
+            </a:schemeClr>
+          </a:lnRef>
+          <a:fillRef idx="1">
+            <a:schemeClr val="accent1"/>
+          </a:fillRef>
+          <a:effectRef idx="0">
+            <a:schemeClr val="accent1"/>
+          </a:effectRef>
+          <a:fontRef idx="minor">
+            <a:schemeClr val="lt1"/>
+          </a:fontRef>
+        </p:style>
+        <p:txBody>
+          <a:bodyPr rtlCol="0" anchor="ctr"/>
+          <a:lstStyle/>
+          <a:p>
+            <a:pPr algn="ctr"/>
+            <a:endParaRPr lang="en-US"/>
+          </a:p>
+        </p:txBody>
+      </p:sp>
+      <p:sp>
+        <p:nvSpPr>
+          <p:cNvPr id="10" name="Oval 9">
+            <a:extLst>
+              <a:ext uri="{FF2B5EF4-FFF2-40B4-BE49-F238E27FC236}">
+                <a16:creationId xmlns:a16="http://schemas.microsoft.com/office/drawing/2014/main" id="{2202F55D-7C94-3844-AF03-590419D54FC3}"/>
+              </a:ext>
+            </a:extLst>
+          </p:cNvPr>
+          <p:cNvSpPr/>
+          <p:nvPr/>
+        </p:nvSpPr>
+        <p:spPr>
+          <a:xfrm>
+            <a:off x="8625016" y="3246396"/>
+            <a:ext cx="1371600" cy="667265"/>
+          </a:xfrm>
+          <a:prstGeom prst="ellipse">
+            <a:avLst/>
+          </a:prstGeom>
+          <a:noFill/>
+          <a:ln w="28575">
+            <a:solidFill>
+              <a:srgbClr val="FF0000"/>
+            </a:solidFill>
+          </a:ln>
+        </p:spPr>
+        <p:style>
+          <a:lnRef idx="2">
+            <a:schemeClr val="accent1">
+              <a:shade val="50000"/>
+            </a:schemeClr>
+          </a:lnRef>
+          <a:fillRef idx="1">
+            <a:schemeClr val="accent1"/>
+          </a:fillRef>
+          <a:effectRef idx="0">
+            <a:schemeClr val="accent1"/>
+          </a:effectRef>
+          <a:fontRef idx="minor">
+            <a:schemeClr val="lt1"/>
+          </a:fontRef>
+        </p:style>
+        <p:txBody>
+          <a:bodyPr rtlCol="0" anchor="ctr"/>
+          <a:lstStyle/>
+          <a:p>
+            <a:pPr algn="ctr"/>
+            <a:endParaRPr lang="en-US"/>
+          </a:p>
+        </p:txBody>
+      </p:sp>
+    </p:spTree>
+    <p:extLst>
+      <p:ext uri="{BB962C8B-B14F-4D97-AF65-F5344CB8AC3E}">
+        <p14:creationId xmlns:p14="http://schemas.microsoft.com/office/powerpoint/2010/main" val="2586495501"/>
+      </p:ext>
+    </p:extLst>
+  </p:cSld>
+  <p:clrMapOvr>
+    <a:masterClrMapping/>
+  </p:clrMapOvr>
+</p:sld>
+</file>
+
+<file path=ppt/slides/slide15.xml><?xml version="1.0" encoding="utf-8"?>
+<p:sld xmlns:a="http://schemas.openxmlformats.org/drawingml/2006/main" xmlns:r="http://schemas.openxmlformats.org/officeDocument/2006/relationships" xmlns:p="http://schemas.openxmlformats.org/presentationml/2006/main">
+  <p:cSld>
+    <p:spTree>
+      <p:nvGrpSpPr>
+        <p:cNvPr id="1" name=""/>
+        <p:cNvGrpSpPr/>
+        <p:nvPr/>
+      </p:nvGrpSpPr>
+      <p:grpSpPr>
+        <a:xfrm>
+          <a:off x="0" y="0"/>
+          <a:ext cx="0" cy="0"/>
+          <a:chOff x="0" y="0"/>
+          <a:chExt cx="0" cy="0"/>
+        </a:xfrm>
+      </p:grpSpPr>
+      <p:sp>
+        <p:nvSpPr>
+          <p:cNvPr id="4" name="Title 1">
+            <a:extLst>
+              <a:ext uri="{FF2B5EF4-FFF2-40B4-BE49-F238E27FC236}">
+                <a16:creationId xmlns:a16="http://schemas.microsoft.com/office/drawing/2014/main" id="{27488B10-E791-B84B-9454-529036FFBC58}"/>
+              </a:ext>
+            </a:extLst>
+          </p:cNvPr>
+          <p:cNvSpPr txBox="1">
+            <a:spLocks/>
+          </p:cNvSpPr>
+          <p:nvPr/>
+        </p:nvSpPr>
+        <p:spPr>
+          <a:xfrm>
+            <a:off x="296562" y="274638"/>
+            <a:ext cx="11738919" cy="1143000"/>
+          </a:xfrm>
+          <a:prstGeom prst="rect">
+            <a:avLst/>
+          </a:prstGeom>
+        </p:spPr>
+        <p:txBody>
+          <a:bodyPr vert="horz" lIns="91440" tIns="45720" rIns="91440" bIns="45720" rtlCol="0" anchor="ctr">
+            <a:noAutofit/>
+          </a:bodyPr>
+          <a:lstStyle>
+            <a:lvl1pPr algn="ctr" defTabSz="457200" rtl="0" eaLnBrk="1" latinLnBrk="0" hangingPunct="1">
+              <a:spcBef>
+                <a:spcPct val="0"/>
+              </a:spcBef>
+              <a:buNone/>
+              <a:defRPr sz="4400" kern="1200">
+                <a:solidFill>
+                  <a:srgbClr val="0000FF"/>
+                </a:solidFill>
+                <a:latin typeface="+mj-lt"/>
+                <a:ea typeface="+mj-ea"/>
+                <a:cs typeface="+mj-cs"/>
+              </a:defRPr>
+            </a:lvl1pPr>
+          </a:lstStyle>
+          <a:p>
+            <a:pPr marL="0" marR="0" lvl="0" indent="0" algn="ctr" defTabSz="457200" rtl="0" eaLnBrk="1" fontAlgn="auto" latinLnBrk="0" hangingPunct="1">
+              <a:lnSpc>
+                <a:spcPct val="100000"/>
+              </a:lnSpc>
+              <a:spcBef>
+                <a:spcPct val="0"/>
+              </a:spcBef>
+              <a:spcAft>
+                <a:spcPts val="0"/>
+              </a:spcAft>
+              <a:buClrTx/>
+              <a:buSzTx/>
+              <a:buFontTx/>
+              <a:buNone/>
+              <a:tabLst/>
+              <a:defRPr/>
+            </a:pPr>
+            <a:r>
+              <a:rPr kumimoji="0" lang="en-US" sz="3800" b="0" i="0" u="none" strike="noStrike" kern="1200" cap="none" spc="0" normalizeH="0" baseline="0" noProof="0" dirty="0">
+                <a:ln>
+                  <a:noFill/>
+                </a:ln>
+                <a:solidFill>
+                  <a:srgbClr val="0000FF"/>
+                </a:solidFill>
+                <a:effectLst/>
+                <a:uLnTx/>
+                <a:uFillTx/>
+                <a:latin typeface="Calibri"/>
+                <a:ea typeface="+mj-ea"/>
+                <a:cs typeface="+mj-cs"/>
+              </a:rPr>
               <a:t>Compilation result </a:t>
             </a:r>
           </a:p>
@@ -7744,7 +8913,7 @@
 </p:sld>
 </file>
 
-<file path=ppt/slides/slide15.xml><?xml version="1.0" encoding="utf-8"?>
+<file path=ppt/slides/slide16.xml><?xml version="1.0" encoding="utf-8"?>
 <p:sld xmlns:a="http://schemas.openxmlformats.org/drawingml/2006/main" xmlns:r="http://schemas.openxmlformats.org/officeDocument/2006/relationships" xmlns:p="http://schemas.openxmlformats.org/presentationml/2006/main">
   <p:cSld>
     <p:spTree>
@@ -8652,7 +9821,7 @@
 </p:sld>
 </file>
 
-<file path=ppt/slides/slide16.xml><?xml version="1.0" encoding="utf-8"?>
+<file path=ppt/slides/slide17.xml><?xml version="1.0" encoding="utf-8"?>
 <p:sld xmlns:a="http://schemas.openxmlformats.org/drawingml/2006/main" xmlns:r="http://schemas.openxmlformats.org/officeDocument/2006/relationships" xmlns:p="http://schemas.openxmlformats.org/presentationml/2006/main">
   <p:cSld>
     <p:spTree>
@@ -9075,6 +10244,66 @@
           </a:p>
         </p:txBody>
       </p:sp>
+      <p:pic>
+        <p:nvPicPr>
+          <p:cNvPr id="2" name="Picture 1">
+            <a:extLst>
+              <a:ext uri="{FF2B5EF4-FFF2-40B4-BE49-F238E27FC236}">
+                <a16:creationId xmlns:a16="http://schemas.microsoft.com/office/drawing/2014/main" id="{B10BD539-7863-6541-AF91-14BA4AF04724}"/>
+              </a:ext>
+            </a:extLst>
+          </p:cNvPr>
+          <p:cNvPicPr>
+            <a:picLocks noChangeAspect="1"/>
+          </p:cNvPicPr>
+          <p:nvPr/>
+        </p:nvPicPr>
+        <p:blipFill>
+          <a:blip r:embed="rId2"/>
+          <a:stretch>
+            <a:fillRect/>
+          </a:stretch>
+        </p:blipFill>
+        <p:spPr>
+          <a:xfrm>
+            <a:off x="5929356" y="1951858"/>
+            <a:ext cx="4577729" cy="3389699"/>
+          </a:xfrm>
+          <a:prstGeom prst="rect">
+            <a:avLst/>
+          </a:prstGeom>
+        </p:spPr>
+      </p:pic>
+      <p:pic>
+        <p:nvPicPr>
+          <p:cNvPr id="3" name="Picture 2">
+            <a:extLst>
+              <a:ext uri="{FF2B5EF4-FFF2-40B4-BE49-F238E27FC236}">
+                <a16:creationId xmlns:a16="http://schemas.microsoft.com/office/drawing/2014/main" id="{71E0E803-CD09-0B45-8D82-2A3BB3DA9A16}"/>
+              </a:ext>
+            </a:extLst>
+          </p:cNvPr>
+          <p:cNvPicPr>
+            <a:picLocks noChangeAspect="1"/>
+          </p:cNvPicPr>
+          <p:nvPr/>
+        </p:nvPicPr>
+        <p:blipFill>
+          <a:blip r:embed="rId3"/>
+          <a:stretch>
+            <a:fillRect/>
+          </a:stretch>
+        </p:blipFill>
+        <p:spPr>
+          <a:xfrm>
+            <a:off x="1219200" y="1951858"/>
+            <a:ext cx="4719420" cy="3389699"/>
+          </a:xfrm>
+          <a:prstGeom prst="rect">
+            <a:avLst/>
+          </a:prstGeom>
+        </p:spPr>
+      </p:pic>
     </p:spTree>
     <p:extLst>
       <p:ext uri="{BB962C8B-B14F-4D97-AF65-F5344CB8AC3E}">
@@ -9088,7 +10317,7 @@
 </p:sld>
 </file>
 
-<file path=ppt/slides/slide17.xml><?xml version="1.0" encoding="utf-8"?>
+<file path=ppt/slides/slide18.xml><?xml version="1.0" encoding="utf-8"?>
 <p:sld xmlns:a="http://schemas.openxmlformats.org/drawingml/2006/main" xmlns:r="http://schemas.openxmlformats.org/officeDocument/2006/relationships" xmlns:p="http://schemas.openxmlformats.org/presentationml/2006/main">
   <p:cSld>
     <p:spTree>

</xml_diff>

<commit_message>
Add some words in each slides
</commit_message>
<xml_diff>
--- a/HotNets_talk.pptx
+++ b/HotNets_talk.pptx
@@ -5,7 +5,7 @@
     <p:sldMasterId id="2147483648" r:id="rId1"/>
   </p:sldMasterIdLst>
   <p:notesMasterIdLst>
-    <p:notesMasterId r:id="rId20"/>
+    <p:notesMasterId r:id="rId21"/>
   </p:notesMasterIdLst>
   <p:sldIdLst>
     <p:sldId id="256" r:id="rId2"/>
@@ -25,7 +25,8 @@
     <p:sldId id="262" r:id="rId16"/>
     <p:sldId id="272" r:id="rId17"/>
     <p:sldId id="273" r:id="rId18"/>
-    <p:sldId id="263" r:id="rId19"/>
+    <p:sldId id="278" r:id="rId19"/>
+    <p:sldId id="263" r:id="rId20"/>
   </p:sldIdLst>
   <p:sldSz cx="12192000" cy="6858000"/>
   <p:notesSz cx="6858000" cy="9144000"/>
@@ -213,7 +214,7 @@
           </a:lstStyle>
           <a:p>
             <a:fld id="{33CB1762-D33B-2D4C-8BBE-0709F42BCBD5}" type="datetimeFigureOut">
-              <a:t>10/9/19</a:t>
+              <a:t>10/10/19</a:t>
             </a:fld>
             <a:endParaRPr lang="en-US"/>
           </a:p>
@@ -653,6 +654,90 @@
 </p:notes>
 </file>
 
+<file path=ppt/notesSlides/notesSlide3.xml><?xml version="1.0" encoding="utf-8"?>
+<p:notes xmlns:a="http://schemas.openxmlformats.org/drawingml/2006/main" xmlns:r="http://schemas.openxmlformats.org/officeDocument/2006/relationships" xmlns:p="http://schemas.openxmlformats.org/presentationml/2006/main">
+  <p:cSld>
+    <p:spTree>
+      <p:nvGrpSpPr>
+        <p:cNvPr id="1" name=""/>
+        <p:cNvGrpSpPr/>
+        <p:nvPr/>
+      </p:nvGrpSpPr>
+      <p:grpSpPr>
+        <a:xfrm>
+          <a:off x="0" y="0"/>
+          <a:ext cx="0" cy="0"/>
+          <a:chOff x="0" y="0"/>
+          <a:chExt cx="0" cy="0"/>
+        </a:xfrm>
+      </p:grpSpPr>
+      <p:sp>
+        <p:nvSpPr>
+          <p:cNvPr id="2" name="Slide Image Placeholder 1"/>
+          <p:cNvSpPr>
+            <a:spLocks noGrp="1" noRot="1" noChangeAspect="1"/>
+          </p:cNvSpPr>
+          <p:nvPr>
+            <p:ph type="sldImg"/>
+          </p:nvPr>
+        </p:nvSpPr>
+        <p:spPr/>
+      </p:sp>
+      <p:sp>
+        <p:nvSpPr>
+          <p:cNvPr id="3" name="Notes Placeholder 2"/>
+          <p:cNvSpPr>
+            <a:spLocks noGrp="1"/>
+          </p:cNvSpPr>
+          <p:nvPr>
+            <p:ph type="body" idx="1"/>
+          </p:nvPr>
+        </p:nvSpPr>
+        <p:spPr/>
+        <p:txBody>
+          <a:bodyPr/>
+          <a:lstStyle/>
+          <a:p>
+            <a:endParaRPr lang="en-US"/>
+          </a:p>
+        </p:txBody>
+      </p:sp>
+      <p:sp>
+        <p:nvSpPr>
+          <p:cNvPr id="4" name="Slide Number Placeholder 3"/>
+          <p:cNvSpPr>
+            <a:spLocks noGrp="1"/>
+          </p:cNvSpPr>
+          <p:nvPr>
+            <p:ph type="sldNum" sz="quarter" idx="5"/>
+          </p:nvPr>
+        </p:nvSpPr>
+        <p:spPr/>
+        <p:txBody>
+          <a:bodyPr/>
+          <a:lstStyle/>
+          <a:p>
+            <a:fld id="{822DC16D-7BA6-C54C-A5EF-FE506FEBC1D6}" type="slidenum">
+              <a:rPr lang="en-US"/>
+              <a:t>7</a:t>
+            </a:fld>
+            <a:endParaRPr lang="en-US"/>
+          </a:p>
+        </p:txBody>
+      </p:sp>
+    </p:spTree>
+    <p:extLst>
+      <p:ext uri="{BB962C8B-B14F-4D97-AF65-F5344CB8AC3E}">
+        <p14:creationId xmlns:p14="http://schemas.microsoft.com/office/powerpoint/2010/main" val="3533069519"/>
+      </p:ext>
+    </p:extLst>
+  </p:cSld>
+  <p:clrMapOvr>
+    <a:masterClrMapping/>
+  </p:clrMapOvr>
+</p:notes>
+</file>
+
 <file path=ppt/slideLayouts/slideLayout1.xml><?xml version="1.0" encoding="utf-8"?>
 <p:sldLayout xmlns:a="http://schemas.openxmlformats.org/drawingml/2006/main" xmlns:r="http://schemas.openxmlformats.org/officeDocument/2006/relationships" xmlns:p="http://schemas.openxmlformats.org/presentationml/2006/main" type="title" preserve="1">
   <p:cSld name="Title Slide">
@@ -799,7 +884,7 @@
           <a:lstStyle/>
           <a:p>
             <a:fld id="{0A57F018-826C-CE4C-A706-F4FED366862D}" type="datetimeFigureOut">
-              <a:t>10/9/19</a:t>
+              <a:t>10/10/19</a:t>
             </a:fld>
             <a:endParaRPr lang="en-US"/>
           </a:p>
@@ -995,7 +1080,7 @@
           <a:lstStyle/>
           <a:p>
             <a:fld id="{0A57F018-826C-CE4C-A706-F4FED366862D}" type="datetimeFigureOut">
-              <a:t>10/9/19</a:t>
+              <a:t>10/10/19</a:t>
             </a:fld>
             <a:endParaRPr lang="en-US"/>
           </a:p>
@@ -1201,7 +1286,7 @@
           <a:lstStyle/>
           <a:p>
             <a:fld id="{0A57F018-826C-CE4C-A706-F4FED366862D}" type="datetimeFigureOut">
-              <a:t>10/9/19</a:t>
+              <a:t>10/10/19</a:t>
             </a:fld>
             <a:endParaRPr lang="en-US"/>
           </a:p>
@@ -1397,7 +1482,7 @@
           <a:lstStyle/>
           <a:p>
             <a:fld id="{0A57F018-826C-CE4C-A706-F4FED366862D}" type="datetimeFigureOut">
-              <a:t>10/9/19</a:t>
+              <a:t>10/10/19</a:t>
             </a:fld>
             <a:endParaRPr lang="en-US"/>
           </a:p>
@@ -1670,7 +1755,7 @@
           <a:lstStyle/>
           <a:p>
             <a:fld id="{0A57F018-826C-CE4C-A706-F4FED366862D}" type="datetimeFigureOut">
-              <a:t>10/9/19</a:t>
+              <a:t>10/10/19</a:t>
             </a:fld>
             <a:endParaRPr lang="en-US"/>
           </a:p>
@@ -1933,7 +2018,7 @@
           <a:lstStyle/>
           <a:p>
             <a:fld id="{0A57F018-826C-CE4C-A706-F4FED366862D}" type="datetimeFigureOut">
-              <a:t>10/9/19</a:t>
+              <a:t>10/10/19</a:t>
             </a:fld>
             <a:endParaRPr lang="en-US"/>
           </a:p>
@@ -2343,7 +2428,7 @@
           <a:lstStyle/>
           <a:p>
             <a:fld id="{0A57F018-826C-CE4C-A706-F4FED366862D}" type="datetimeFigureOut">
-              <a:t>10/9/19</a:t>
+              <a:t>10/10/19</a:t>
             </a:fld>
             <a:endParaRPr lang="en-US"/>
           </a:p>
@@ -2482,7 +2567,7 @@
           <a:lstStyle/>
           <a:p>
             <a:fld id="{0A57F018-826C-CE4C-A706-F4FED366862D}" type="datetimeFigureOut">
-              <a:t>10/9/19</a:t>
+              <a:t>10/10/19</a:t>
             </a:fld>
             <a:endParaRPr lang="en-US"/>
           </a:p>
@@ -2593,7 +2678,7 @@
           <a:lstStyle/>
           <a:p>
             <a:fld id="{0A57F018-826C-CE4C-A706-F4FED366862D}" type="datetimeFigureOut">
-              <a:t>10/9/19</a:t>
+              <a:t>10/10/19</a:t>
             </a:fld>
             <a:endParaRPr lang="en-US"/>
           </a:p>
@@ -2902,7 +2987,7 @@
           <a:lstStyle/>
           <a:p>
             <a:fld id="{0A57F018-826C-CE4C-A706-F4FED366862D}" type="datetimeFigureOut">
-              <a:t>10/9/19</a:t>
+              <a:t>10/10/19</a:t>
             </a:fld>
             <a:endParaRPr lang="en-US"/>
           </a:p>
@@ -3188,7 +3273,7 @@
           <a:lstStyle/>
           <a:p>
             <a:fld id="{0A57F018-826C-CE4C-A706-F4FED366862D}" type="datetimeFigureOut">
-              <a:t>10/9/19</a:t>
+              <a:t>10/10/19</a:t>
             </a:fld>
             <a:endParaRPr lang="en-US"/>
           </a:p>
@@ -3427,7 +3512,7 @@
           </a:lstStyle>
           <a:p>
             <a:fld id="{0A57F018-826C-CE4C-A706-F4FED366862D}" type="datetimeFigureOut">
-              <a:t>10/9/19</a:t>
+              <a:t>10/10/19</a:t>
             </a:fld>
             <a:endParaRPr lang="en-US"/>
           </a:p>
@@ -4396,6 +4481,87 @@
           </a:p>
         </p:txBody>
       </p:sp>
+      <p:sp>
+        <p:nvSpPr>
+          <p:cNvPr id="8" name="Title 1">
+            <a:extLst>
+              <a:ext uri="{FF2B5EF4-FFF2-40B4-BE49-F238E27FC236}">
+                <a16:creationId xmlns:a16="http://schemas.microsoft.com/office/drawing/2014/main" id="{98A6A100-07B6-3144-81B6-3F812476D4DA}"/>
+              </a:ext>
+            </a:extLst>
+          </p:cNvPr>
+          <p:cNvSpPr txBox="1">
+            <a:spLocks/>
+          </p:cNvSpPr>
+          <p:nvPr/>
+        </p:nvSpPr>
+        <p:spPr>
+          <a:xfrm>
+            <a:off x="226540" y="5298782"/>
+            <a:ext cx="11738919" cy="1143000"/>
+          </a:xfrm>
+          <a:prstGeom prst="rect">
+            <a:avLst/>
+          </a:prstGeom>
+        </p:spPr>
+        <p:txBody>
+          <a:bodyPr vert="horz" lIns="91440" tIns="45720" rIns="91440" bIns="45720" rtlCol="0" anchor="ctr">
+            <a:noAutofit/>
+          </a:bodyPr>
+          <a:lstStyle>
+            <a:lvl1pPr algn="ctr" defTabSz="457200" rtl="0" eaLnBrk="1" latinLnBrk="0" hangingPunct="1">
+              <a:spcBef>
+                <a:spcPct val="0"/>
+              </a:spcBef>
+              <a:buNone/>
+              <a:defRPr sz="4400" kern="1200">
+                <a:solidFill>
+                  <a:srgbClr val="0000FF"/>
+                </a:solidFill>
+                <a:latin typeface="+mj-lt"/>
+                <a:ea typeface="+mj-ea"/>
+                <a:cs typeface="+mj-cs"/>
+              </a:defRPr>
+            </a:lvl1pPr>
+          </a:lstStyle>
+          <a:p>
+            <a:pPr marL="342900" marR="0" lvl="0" indent="-342900" algn="l" defTabSz="457200" rtl="0" eaLnBrk="1" fontAlgn="auto" latinLnBrk="0" hangingPunct="1">
+              <a:lnSpc>
+                <a:spcPct val="100000"/>
+              </a:lnSpc>
+              <a:spcBef>
+                <a:spcPct val="0"/>
+              </a:spcBef>
+              <a:spcAft>
+                <a:spcPts val="0"/>
+              </a:spcAft>
+              <a:buClrTx/>
+              <a:buSzTx/>
+              <a:buFont typeface="Arial" panose="020B0604020202020204" pitchFamily="34" charset="0"/>
+              <a:buChar char="•"/>
+              <a:tabLst/>
+              <a:defRPr/>
+            </a:pPr>
+            <a:r>
+              <a:rPr kumimoji="0" lang="en-US" sz="2400" b="0" i="0" u="none" strike="noStrike" kern="1200" cap="none" spc="0" normalizeH="0" baseline="0" noProof="0" dirty="0">
+                <a:ln>
+                  <a:noFill/>
+                </a:ln>
+                <a:solidFill>
+                  <a:schemeClr val="tx1"/>
+                </a:solidFill>
+                <a:effectLst/>
+                <a:uLnTx/>
+                <a:uFillTx/>
+                <a:latin typeface="Calibri"/>
+                <a:ea typeface="+mj-ea"/>
+                <a:cs typeface="+mj-cs"/>
+              </a:rPr>
+              <a:t>Constrain all constants appear in benchmarks into 2-bit range in order to reduce the search space of program synthesis</a:t>
+            </a:r>
+          </a:p>
+        </p:txBody>
+      </p:sp>
     </p:spTree>
     <p:extLst>
       <p:ext uri="{BB962C8B-B14F-4D97-AF65-F5344CB8AC3E}">
@@ -4711,7 +4877,7 @@
         </p:nvSpPr>
         <p:spPr>
           <a:xfrm>
-            <a:off x="8725433" y="3193902"/>
+            <a:off x="8614222" y="3107403"/>
             <a:ext cx="1147611" cy="675977"/>
           </a:xfrm>
           <a:prstGeom prst="roundRect">
@@ -5019,7 +5185,7 @@
         </p:nvSpPr>
         <p:spPr>
           <a:xfrm>
-            <a:off x="9215324" y="4135489"/>
+            <a:off x="9128827" y="3863637"/>
             <a:ext cx="139168" cy="675977"/>
           </a:xfrm>
           <a:prstGeom prst="downArrow">
@@ -5070,7 +5236,7 @@
         </p:nvSpPr>
         <p:spPr>
           <a:xfrm>
-            <a:off x="9669941" y="4196478"/>
+            <a:off x="9521658" y="3912271"/>
             <a:ext cx="1147610" cy="553998"/>
           </a:xfrm>
           <a:prstGeom prst="rect">
@@ -5149,7 +5315,7 @@
         </p:blipFill>
         <p:spPr>
           <a:xfrm>
-            <a:off x="9061526" y="4940651"/>
+            <a:off x="8975029" y="4668799"/>
             <a:ext cx="537233" cy="727504"/>
           </a:xfrm>
           <a:prstGeom prst="rect">
@@ -5171,7 +5337,7 @@
         </p:nvSpPr>
         <p:spPr>
           <a:xfrm>
-            <a:off x="8767254" y="5785845"/>
+            <a:off x="8680757" y="5513993"/>
             <a:ext cx="1334127" cy="553998"/>
           </a:xfrm>
           <a:prstGeom prst="rect">
@@ -5350,7 +5516,7 @@
         </p:nvSpPr>
         <p:spPr>
           <a:xfrm>
-            <a:off x="370634" y="5968712"/>
+            <a:off x="3697580" y="136874"/>
             <a:ext cx="7239033" cy="369332"/>
           </a:xfrm>
           <a:prstGeom prst="rect">
@@ -5370,6 +5536,218 @@
                 </a:solidFill>
               </a:rPr>
               <a:t>NOTE: this figure is borrowed from NSDI, we should make a lot of changes</a:t>
+            </a:r>
+          </a:p>
+        </p:txBody>
+      </p:sp>
+      <p:sp>
+        <p:nvSpPr>
+          <p:cNvPr id="27" name="Title 1">
+            <a:extLst>
+              <a:ext uri="{FF2B5EF4-FFF2-40B4-BE49-F238E27FC236}">
+                <a16:creationId xmlns:a16="http://schemas.microsoft.com/office/drawing/2014/main" id="{F8116D54-5866-C24B-8D7B-0C133B5AE00C}"/>
+              </a:ext>
+            </a:extLst>
+          </p:cNvPr>
+          <p:cNvSpPr txBox="1">
+            <a:spLocks/>
+          </p:cNvSpPr>
+          <p:nvPr/>
+        </p:nvSpPr>
+        <p:spPr>
+          <a:xfrm>
+            <a:off x="226540" y="4704068"/>
+            <a:ext cx="11738919" cy="1143000"/>
+          </a:xfrm>
+          <a:prstGeom prst="rect">
+            <a:avLst/>
+          </a:prstGeom>
+        </p:spPr>
+        <p:txBody>
+          <a:bodyPr vert="horz" lIns="91440" tIns="45720" rIns="91440" bIns="45720" rtlCol="0" anchor="ctr">
+            <a:noAutofit/>
+          </a:bodyPr>
+          <a:lstStyle>
+            <a:lvl1pPr algn="ctr" defTabSz="457200" rtl="0" eaLnBrk="1" latinLnBrk="0" hangingPunct="1">
+              <a:spcBef>
+                <a:spcPct val="0"/>
+              </a:spcBef>
+              <a:buNone/>
+              <a:defRPr sz="4400" kern="1200">
+                <a:solidFill>
+                  <a:srgbClr val="0000FF"/>
+                </a:solidFill>
+                <a:latin typeface="+mj-lt"/>
+                <a:ea typeface="+mj-ea"/>
+                <a:cs typeface="+mj-cs"/>
+              </a:defRPr>
+            </a:lvl1pPr>
+          </a:lstStyle>
+          <a:p>
+            <a:pPr marL="342900" marR="0" lvl="0" indent="-342900" algn="l" defTabSz="457200" rtl="0" eaLnBrk="1" fontAlgn="auto" latinLnBrk="0" hangingPunct="1">
+              <a:lnSpc>
+                <a:spcPct val="100000"/>
+              </a:lnSpc>
+              <a:spcBef>
+                <a:spcPct val="0"/>
+              </a:spcBef>
+              <a:spcAft>
+                <a:spcPts val="0"/>
+              </a:spcAft>
+              <a:buClrTx/>
+              <a:buSzTx/>
+              <a:buFont typeface="Arial" panose="020B0604020202020204" pitchFamily="34" charset="0"/>
+              <a:buChar char="•"/>
+              <a:tabLst/>
+              <a:defRPr/>
+            </a:pPr>
+            <a:endParaRPr kumimoji="0" lang="en-US" sz="2400" b="0" i="0" u="none" strike="noStrike" kern="1200" cap="none" spc="0" normalizeH="0" baseline="0" noProof="0" dirty="0">
+              <a:ln>
+                <a:noFill/>
+              </a:ln>
+              <a:solidFill>
+                <a:schemeClr val="tx1"/>
+              </a:solidFill>
+              <a:effectLst/>
+              <a:uLnTx/>
+              <a:uFillTx/>
+              <a:latin typeface="Calibri"/>
+              <a:ea typeface="+mj-ea"/>
+              <a:cs typeface="+mj-cs"/>
+            </a:endParaRPr>
+          </a:p>
+        </p:txBody>
+      </p:sp>
+      <p:sp>
+        <p:nvSpPr>
+          <p:cNvPr id="2" name="Rectangle 1">
+            <a:extLst>
+              <a:ext uri="{FF2B5EF4-FFF2-40B4-BE49-F238E27FC236}">
+                <a16:creationId xmlns:a16="http://schemas.microsoft.com/office/drawing/2014/main" id="{474D9520-32BD-2440-B46C-7556BE9B8FA5}"/>
+              </a:ext>
+            </a:extLst>
+          </p:cNvPr>
+          <p:cNvSpPr/>
+          <p:nvPr/>
+        </p:nvSpPr>
+        <p:spPr>
+          <a:xfrm>
+            <a:off x="226540" y="5329327"/>
+            <a:ext cx="4238981" cy="461665"/>
+          </a:xfrm>
+          <a:prstGeom prst="rect">
+            <a:avLst/>
+          </a:prstGeom>
+        </p:spPr>
+        <p:txBody>
+          <a:bodyPr wrap="none">
+            <a:spAutoFit/>
+          </a:bodyPr>
+          <a:lstStyle/>
+          <a:p>
+            <a:pPr marL="342900" lvl="0" indent="-342900" defTabSz="457200">
+              <a:spcBef>
+                <a:spcPct val="0"/>
+              </a:spcBef>
+              <a:buFont typeface="Arial" panose="020B0604020202020204" pitchFamily="34" charset="0"/>
+              <a:buChar char="•"/>
+              <a:defRPr/>
+            </a:pPr>
+            <a:r>
+              <a:rPr lang="en-US" sz="2400" dirty="0">
+                <a:latin typeface="Calibri"/>
+                <a:ea typeface="+mj-ea"/>
+                <a:cs typeface="+mj-cs"/>
+              </a:rPr>
+              <a:t>Do verification in 10-bit range</a:t>
+            </a:r>
+          </a:p>
+        </p:txBody>
+      </p:sp>
+      <p:sp>
+        <p:nvSpPr>
+          <p:cNvPr id="28" name="Rectangle 27">
+            <a:extLst>
+              <a:ext uri="{FF2B5EF4-FFF2-40B4-BE49-F238E27FC236}">
+                <a16:creationId xmlns:a16="http://schemas.microsoft.com/office/drawing/2014/main" id="{04446860-4854-0040-B268-85C3E883CBFC}"/>
+              </a:ext>
+            </a:extLst>
+          </p:cNvPr>
+          <p:cNvSpPr/>
+          <p:nvPr/>
+        </p:nvSpPr>
+        <p:spPr>
+          <a:xfrm>
+            <a:off x="227025" y="5784589"/>
+            <a:ext cx="7726602" cy="461665"/>
+          </a:xfrm>
+          <a:prstGeom prst="rect">
+            <a:avLst/>
+          </a:prstGeom>
+        </p:spPr>
+        <p:txBody>
+          <a:bodyPr wrap="none">
+            <a:spAutoFit/>
+          </a:bodyPr>
+          <a:lstStyle/>
+          <a:p>
+            <a:pPr marL="342900" lvl="0" indent="-342900" defTabSz="457200">
+              <a:spcBef>
+                <a:spcPct val="0"/>
+              </a:spcBef>
+              <a:buFont typeface="Arial" panose="020B0604020202020204" pitchFamily="34" charset="0"/>
+              <a:buChar char="•"/>
+              <a:defRPr/>
+            </a:pPr>
+            <a:r>
+              <a:rPr lang="en-US" sz="2400" dirty="0">
+                <a:latin typeface="Calibri"/>
+                <a:ea typeface="+mj-ea"/>
+                <a:cs typeface="+mj-cs"/>
+              </a:rPr>
+              <a:t>Add the counterexample into input if the verification fails  </a:t>
+            </a:r>
+          </a:p>
+        </p:txBody>
+      </p:sp>
+      <p:sp>
+        <p:nvSpPr>
+          <p:cNvPr id="29" name="Rectangle 28">
+            <a:extLst>
+              <a:ext uri="{FF2B5EF4-FFF2-40B4-BE49-F238E27FC236}">
+                <a16:creationId xmlns:a16="http://schemas.microsoft.com/office/drawing/2014/main" id="{5FD741BD-791F-DB4C-AE8C-EA98524781A8}"/>
+              </a:ext>
+            </a:extLst>
+          </p:cNvPr>
+          <p:cNvSpPr/>
+          <p:nvPr/>
+        </p:nvSpPr>
+        <p:spPr>
+          <a:xfrm>
+            <a:off x="226540" y="4846992"/>
+            <a:ext cx="6560450" cy="461665"/>
+          </a:xfrm>
+          <a:prstGeom prst="rect">
+            <a:avLst/>
+          </a:prstGeom>
+        </p:spPr>
+        <p:txBody>
+          <a:bodyPr wrap="none">
+            <a:spAutoFit/>
+          </a:bodyPr>
+          <a:lstStyle/>
+          <a:p>
+            <a:pPr marL="342900" lvl="0" indent="-342900" defTabSz="457200">
+              <a:spcBef>
+                <a:spcPct val="0"/>
+              </a:spcBef>
+              <a:buFont typeface="Arial" panose="020B0604020202020204" pitchFamily="34" charset="0"/>
+              <a:buChar char="•"/>
+              <a:defRPr/>
+            </a:pPr>
+            <a:r>
+              <a:rPr lang="en-US" sz="2400" dirty="0"/>
+              <a:t>Constrain the input into 2-bit range for synthesis</a:t>
             </a:r>
           </a:p>
         </p:txBody>
@@ -5421,7 +5799,7 @@
         </p:nvCxnSpPr>
         <p:spPr>
           <a:xfrm flipV="1">
-            <a:off x="8208866" y="1825631"/>
+            <a:off x="8208866" y="1430207"/>
             <a:ext cx="1239496" cy="15030"/>
           </a:xfrm>
           <a:prstGeom prst="straightConnector1">
@@ -5463,7 +5841,7 @@
         </p:nvCxnSpPr>
         <p:spPr>
           <a:xfrm flipV="1">
-            <a:off x="8208866" y="2757429"/>
+            <a:off x="8208866" y="2362005"/>
             <a:ext cx="1286947" cy="7901"/>
           </a:xfrm>
           <a:prstGeom prst="straightConnector1">
@@ -5505,7 +5883,7 @@
         </p:nvCxnSpPr>
         <p:spPr>
           <a:xfrm flipV="1">
-            <a:off x="8208866" y="3672337"/>
+            <a:off x="8208866" y="3276913"/>
             <a:ext cx="1300489" cy="10213"/>
           </a:xfrm>
           <a:prstGeom prst="straightConnector1">
@@ -5547,7 +5925,7 @@
         </p:nvCxnSpPr>
         <p:spPr>
           <a:xfrm flipV="1">
-            <a:off x="8208866" y="4582721"/>
+            <a:off x="8208866" y="4187297"/>
             <a:ext cx="1303064" cy="14926"/>
           </a:xfrm>
           <a:prstGeom prst="straightConnector1">
@@ -5586,7 +5964,7 @@
         </p:nvGrpSpPr>
         <p:grpSpPr>
           <a:xfrm>
-            <a:off x="3482804" y="1433384"/>
+            <a:off x="3482804" y="1037960"/>
             <a:ext cx="2276419" cy="3614083"/>
             <a:chOff x="1824105" y="562095"/>
             <a:chExt cx="1425880" cy="2375796"/>
@@ -5868,7 +6246,7 @@
         </p:nvSpPr>
         <p:spPr>
           <a:xfrm>
-            <a:off x="3605576" y="1555439"/>
+            <a:off x="3605576" y="1160015"/>
             <a:ext cx="2159283" cy="523220"/>
           </a:xfrm>
           <a:prstGeom prst="rect">
@@ -5903,7 +6281,7 @@
         </p:nvSpPr>
         <p:spPr>
           <a:xfrm>
-            <a:off x="3605576" y="2535815"/>
+            <a:off x="3605576" y="2140391"/>
             <a:ext cx="2159283" cy="523220"/>
           </a:xfrm>
           <a:prstGeom prst="rect">
@@ -5938,7 +6316,7 @@
         </p:nvSpPr>
         <p:spPr>
           <a:xfrm>
-            <a:off x="3605576" y="3357033"/>
+            <a:off x="3605576" y="2961609"/>
             <a:ext cx="2159283" cy="523220"/>
           </a:xfrm>
           <a:prstGeom prst="rect">
@@ -5973,7 +6351,7 @@
         </p:nvSpPr>
         <p:spPr>
           <a:xfrm>
-            <a:off x="3632780" y="4239341"/>
+            <a:off x="3632780" y="3843917"/>
             <a:ext cx="2159283" cy="523220"/>
           </a:xfrm>
           <a:prstGeom prst="rect">
@@ -6011,7 +6389,7 @@
         </p:nvCxnSpPr>
         <p:spPr>
           <a:xfrm>
-            <a:off x="1732300" y="1840661"/>
+            <a:off x="1732300" y="1445237"/>
             <a:ext cx="1750504" cy="1827157"/>
           </a:xfrm>
           <a:prstGeom prst="straightConnector1">
@@ -6055,7 +6433,7 @@
         </p:nvCxnSpPr>
         <p:spPr>
           <a:xfrm>
-            <a:off x="2126029" y="2671721"/>
+            <a:off x="2126029" y="2276297"/>
             <a:ext cx="1356776" cy="280104"/>
           </a:xfrm>
           <a:prstGeom prst="straightConnector1">
@@ -6097,7 +6475,7 @@
         </p:nvCxnSpPr>
         <p:spPr>
           <a:xfrm flipV="1">
-            <a:off x="1732300" y="1650037"/>
+            <a:off x="1732300" y="1254613"/>
             <a:ext cx="1750510" cy="2947610"/>
           </a:xfrm>
           <a:prstGeom prst="straightConnector1">
@@ -6143,7 +6521,7 @@
         </p:nvCxnSpPr>
         <p:spPr>
           <a:xfrm>
-            <a:off x="1732300" y="3682550"/>
+            <a:off x="1732300" y="3287126"/>
             <a:ext cx="1900480" cy="818401"/>
           </a:xfrm>
           <a:prstGeom prst="straightConnector1">
@@ -6182,7 +6560,7 @@
         </p:nvGrpSpPr>
         <p:grpSpPr>
           <a:xfrm>
-            <a:off x="9511930" y="1433384"/>
+            <a:off x="9511930" y="1037960"/>
             <a:ext cx="2276419" cy="3614083"/>
             <a:chOff x="1824105" y="562095"/>
             <a:chExt cx="1425880" cy="2375796"/>
@@ -6464,7 +6842,7 @@
         </p:nvSpPr>
         <p:spPr>
           <a:xfrm>
-            <a:off x="9647058" y="1567796"/>
+            <a:off x="9647058" y="1172372"/>
             <a:ext cx="2159283" cy="523220"/>
           </a:xfrm>
           <a:prstGeom prst="rect">
@@ -6499,7 +6877,7 @@
         </p:nvSpPr>
         <p:spPr>
           <a:xfrm>
-            <a:off x="9647058" y="2548172"/>
+            <a:off x="9647058" y="2152748"/>
             <a:ext cx="2159283" cy="523220"/>
           </a:xfrm>
           <a:prstGeom prst="rect">
@@ -6534,7 +6912,7 @@
         </p:nvSpPr>
         <p:spPr>
           <a:xfrm>
-            <a:off x="9647058" y="3369390"/>
+            <a:off x="9647058" y="2973966"/>
             <a:ext cx="2159283" cy="523220"/>
           </a:xfrm>
           <a:prstGeom prst="rect">
@@ -6569,7 +6947,7 @@
         </p:nvSpPr>
         <p:spPr>
           <a:xfrm>
-            <a:off x="9674262" y="4251698"/>
+            <a:off x="9674262" y="3856274"/>
             <a:ext cx="2159283" cy="523220"/>
           </a:xfrm>
           <a:prstGeom prst="rect">
@@ -6604,7 +6982,7 @@
         </p:nvSpPr>
         <p:spPr>
           <a:xfrm>
-            <a:off x="6770916" y="1495400"/>
+            <a:off x="6770916" y="1099976"/>
             <a:ext cx="1437950" cy="690522"/>
           </a:xfrm>
           <a:prstGeom prst="roundRect">
@@ -6763,7 +7141,7 @@
         </p:nvSpPr>
         <p:spPr>
           <a:xfrm>
-            <a:off x="6770916" y="2420073"/>
+            <a:off x="6770916" y="2024649"/>
             <a:ext cx="1437950" cy="690514"/>
           </a:xfrm>
           <a:prstGeom prst="roundRect">
@@ -6922,7 +7300,7 @@
         </p:nvSpPr>
         <p:spPr>
           <a:xfrm>
-            <a:off x="6770916" y="3344129"/>
+            <a:off x="6770916" y="2948705"/>
             <a:ext cx="1437950" cy="676841"/>
           </a:xfrm>
           <a:prstGeom prst="roundRect">
@@ -7081,7 +7459,7 @@
         </p:nvSpPr>
         <p:spPr>
           <a:xfrm>
-            <a:off x="6770916" y="4254902"/>
+            <a:off x="6770916" y="3859478"/>
             <a:ext cx="1437950" cy="685489"/>
           </a:xfrm>
           <a:prstGeom prst="roundRect">
@@ -7240,7 +7618,7 @@
         </p:nvSpPr>
         <p:spPr>
           <a:xfrm>
-            <a:off x="294350" y="1495400"/>
+            <a:off x="294350" y="1099976"/>
             <a:ext cx="1437950" cy="690522"/>
           </a:xfrm>
           <a:prstGeom prst="roundRect">
@@ -7399,7 +7777,7 @@
         </p:nvSpPr>
         <p:spPr>
           <a:xfrm>
-            <a:off x="294350" y="2420073"/>
+            <a:off x="294350" y="2024649"/>
             <a:ext cx="1437950" cy="690514"/>
           </a:xfrm>
           <a:prstGeom prst="roundRect">
@@ -7558,7 +7936,7 @@
         </p:nvSpPr>
         <p:spPr>
           <a:xfrm>
-            <a:off x="294350" y="3344129"/>
+            <a:off x="294350" y="2948705"/>
             <a:ext cx="1437950" cy="676841"/>
           </a:xfrm>
           <a:prstGeom prst="roundRect">
@@ -7717,7 +8095,7 @@
         </p:nvSpPr>
         <p:spPr>
           <a:xfrm>
-            <a:off x="294350" y="4254902"/>
+            <a:off x="294350" y="3859478"/>
             <a:ext cx="1437950" cy="685489"/>
           </a:xfrm>
           <a:prstGeom prst="roundRect">
@@ -7876,7 +8254,7 @@
         </p:nvSpPr>
         <p:spPr>
           <a:xfrm>
-            <a:off x="977742" y="5121117"/>
+            <a:off x="977742" y="4725693"/>
             <a:ext cx="4368762" cy="523220"/>
           </a:xfrm>
           <a:prstGeom prst="rect">
@@ -7911,7 +8289,7 @@
         </p:nvSpPr>
         <p:spPr>
           <a:xfrm>
-            <a:off x="7333692" y="5121117"/>
+            <a:off x="7333692" y="4725693"/>
             <a:ext cx="3187499" cy="523220"/>
           </a:xfrm>
           <a:prstGeom prst="rect">
@@ -7962,6 +8340,137 @@
             <a:r>
               <a:rPr lang="en-US" b="1"/>
               <a:t>Canonicalized allocation vs synthesized allocation</a:t>
+            </a:r>
+          </a:p>
+        </p:txBody>
+      </p:sp>
+      <p:sp>
+        <p:nvSpPr>
+          <p:cNvPr id="47" name="Rectangle 46">
+            <a:extLst>
+              <a:ext uri="{FF2B5EF4-FFF2-40B4-BE49-F238E27FC236}">
+                <a16:creationId xmlns:a16="http://schemas.microsoft.com/office/drawing/2014/main" id="{B1ABA3FC-E6AE-3E49-82F9-86AD23A531F0}"/>
+              </a:ext>
+            </a:extLst>
+          </p:cNvPr>
+          <p:cNvSpPr/>
+          <p:nvPr/>
+        </p:nvSpPr>
+        <p:spPr>
+          <a:xfrm>
+            <a:off x="226540" y="5724739"/>
+            <a:ext cx="10598542" cy="461665"/>
+          </a:xfrm>
+          <a:prstGeom prst="rect">
+            <a:avLst/>
+          </a:prstGeom>
+        </p:spPr>
+        <p:txBody>
+          <a:bodyPr wrap="none">
+            <a:spAutoFit/>
+          </a:bodyPr>
+          <a:lstStyle/>
+          <a:p>
+            <a:pPr marL="342900" lvl="0" indent="-342900" defTabSz="457200">
+              <a:spcBef>
+                <a:spcPct val="0"/>
+              </a:spcBef>
+              <a:buFont typeface="Arial" panose="020B0604020202020204" pitchFamily="34" charset="0"/>
+              <a:buChar char="•"/>
+              <a:defRPr/>
+            </a:pPr>
+            <a:r>
+              <a:rPr lang="en-US" sz="2400" dirty="0"/>
+              <a:t>Synthesized-allocation and Canonicalized-allocation are “semantically” equivalent</a:t>
+            </a:r>
+          </a:p>
+        </p:txBody>
+      </p:sp>
+      <p:sp>
+        <p:nvSpPr>
+          <p:cNvPr id="48" name="Rectangle 47">
+            <a:extLst>
+              <a:ext uri="{FF2B5EF4-FFF2-40B4-BE49-F238E27FC236}">
+                <a16:creationId xmlns:a16="http://schemas.microsoft.com/office/drawing/2014/main" id="{B036DBF3-B11A-9843-A315-E56D875A3584}"/>
+              </a:ext>
+            </a:extLst>
+          </p:cNvPr>
+          <p:cNvSpPr/>
+          <p:nvPr/>
+        </p:nvSpPr>
+        <p:spPr>
+          <a:xfrm>
+            <a:off x="227025" y="6155295"/>
+            <a:ext cx="10606558" cy="461665"/>
+          </a:xfrm>
+          <a:prstGeom prst="rect">
+            <a:avLst/>
+          </a:prstGeom>
+        </p:spPr>
+        <p:txBody>
+          <a:bodyPr wrap="none">
+            <a:spAutoFit/>
+          </a:bodyPr>
+          <a:lstStyle/>
+          <a:p>
+            <a:pPr marL="342900" lvl="0" indent="-342900" defTabSz="457200">
+              <a:spcBef>
+                <a:spcPct val="0"/>
+              </a:spcBef>
+              <a:buFont typeface="Arial" panose="020B0604020202020204" pitchFamily="34" charset="0"/>
+              <a:buChar char="•"/>
+              <a:defRPr/>
+            </a:pPr>
+            <a:r>
+              <a:rPr lang="en-US" sz="2400" dirty="0"/>
+              <a:t>Canonicalized-allocation has smaller search space for program synthesis problem</a:t>
+            </a:r>
+            <a:endParaRPr lang="en-US" sz="2400" dirty="0">
+              <a:latin typeface="Calibri"/>
+              <a:ea typeface="+mj-ea"/>
+              <a:cs typeface="+mj-cs"/>
+            </a:endParaRPr>
+          </a:p>
+        </p:txBody>
+      </p:sp>
+      <p:sp>
+        <p:nvSpPr>
+          <p:cNvPr id="49" name="Rectangle 48">
+            <a:extLst>
+              <a:ext uri="{FF2B5EF4-FFF2-40B4-BE49-F238E27FC236}">
+                <a16:creationId xmlns:a16="http://schemas.microsoft.com/office/drawing/2014/main" id="{C1C7C17D-204B-5448-9E9B-3196EBFC92B8}"/>
+              </a:ext>
+            </a:extLst>
+          </p:cNvPr>
+          <p:cNvSpPr/>
+          <p:nvPr/>
+        </p:nvSpPr>
+        <p:spPr>
+          <a:xfrm>
+            <a:off x="226540" y="5279479"/>
+            <a:ext cx="10295832" cy="461665"/>
+          </a:xfrm>
+          <a:prstGeom prst="rect">
+            <a:avLst/>
+          </a:prstGeom>
+        </p:spPr>
+        <p:txBody>
+          <a:bodyPr wrap="none">
+            <a:spAutoFit/>
+          </a:bodyPr>
+          <a:lstStyle/>
+          <a:p>
+            <a:pPr marL="342900" lvl="0" indent="-342900" defTabSz="457200">
+              <a:spcBef>
+                <a:spcPct val="0"/>
+              </a:spcBef>
+              <a:buFont typeface="Arial" panose="020B0604020202020204" pitchFamily="34" charset="0"/>
+              <a:buChar char="•"/>
+              <a:defRPr/>
+            </a:pPr>
+            <a:r>
+              <a:rPr lang="en-US" sz="2400" dirty="0"/>
+              <a:t>Synthesized-allocation and Canonicalized-allocation are “syntatically” different</a:t>
             </a:r>
           </a:p>
         </p:txBody>
@@ -8353,7 +8862,7 @@
         </p:nvSpPr>
         <p:spPr>
           <a:xfrm>
-            <a:off x="926757" y="2298357"/>
+            <a:off x="926757" y="1989433"/>
             <a:ext cx="6932140" cy="2585323"/>
           </a:xfrm>
           <a:prstGeom prst="rect">
@@ -8454,7 +8963,7 @@
         </p:nvSpPr>
         <p:spPr>
           <a:xfrm>
-            <a:off x="926757" y="1488665"/>
+            <a:off x="926757" y="1389809"/>
             <a:ext cx="6932140" cy="369332"/>
           </a:xfrm>
           <a:prstGeom prst="rect">
@@ -8489,7 +8998,7 @@
         </p:nvSpPr>
         <p:spPr>
           <a:xfrm>
-            <a:off x="4642021" y="3406352"/>
+            <a:off x="4642021" y="3097430"/>
             <a:ext cx="7393460" cy="369332"/>
           </a:xfrm>
           <a:prstGeom prst="rect">
@@ -8523,7 +9032,7 @@
         </p:nvSpPr>
         <p:spPr>
           <a:xfrm>
-            <a:off x="5214551" y="4468181"/>
+            <a:off x="5214551" y="4159259"/>
             <a:ext cx="6820930" cy="369332"/>
           </a:xfrm>
           <a:prstGeom prst="rect">
@@ -8557,7 +9066,7 @@
         </p:nvSpPr>
         <p:spPr>
           <a:xfrm>
-            <a:off x="4662620" y="2299226"/>
+            <a:off x="4662620" y="1990304"/>
             <a:ext cx="6820930" cy="369332"/>
           </a:xfrm>
           <a:prstGeom prst="rect">
@@ -8591,7 +9100,7 @@
         </p:nvSpPr>
         <p:spPr>
           <a:xfrm>
-            <a:off x="9045146" y="2150259"/>
+            <a:off x="9045146" y="1841337"/>
             <a:ext cx="803190" cy="667265"/>
           </a:xfrm>
           <a:prstGeom prst="ellipse">
@@ -8643,7 +9152,7 @@
         </p:nvSpPr>
         <p:spPr>
           <a:xfrm>
-            <a:off x="8625016" y="3246396"/>
+            <a:off x="8625016" y="2937474"/>
             <a:ext cx="1371600" cy="667265"/>
           </a:xfrm>
           <a:prstGeom prst="ellipse">
@@ -8678,6 +9187,48 @@
           <a:p>
             <a:pPr algn="ctr"/>
             <a:endParaRPr lang="en-US"/>
+          </a:p>
+        </p:txBody>
+      </p:sp>
+      <p:sp>
+        <p:nvSpPr>
+          <p:cNvPr id="11" name="Rectangle 10">
+            <a:extLst>
+              <a:ext uri="{FF2B5EF4-FFF2-40B4-BE49-F238E27FC236}">
+                <a16:creationId xmlns:a16="http://schemas.microsoft.com/office/drawing/2014/main" id="{E7395000-47E3-274A-B7F0-0AA4EA95B411}"/>
+              </a:ext>
+            </a:extLst>
+          </p:cNvPr>
+          <p:cNvSpPr/>
+          <p:nvPr/>
+        </p:nvSpPr>
+        <p:spPr>
+          <a:xfrm>
+            <a:off x="580768" y="4897051"/>
+            <a:ext cx="10775092" cy="830997"/>
+          </a:xfrm>
+          <a:prstGeom prst="rect">
+            <a:avLst/>
+          </a:prstGeom>
+        </p:spPr>
+        <p:txBody>
+          <a:bodyPr wrap="square">
+            <a:spAutoFit/>
+          </a:bodyPr>
+          <a:lstStyle/>
+          <a:p>
+            <a:pPr marL="342900" lvl="0" indent="-342900" defTabSz="457200">
+              <a:spcBef>
+                <a:spcPct val="0"/>
+              </a:spcBef>
+              <a:buFont typeface="Arial" panose="020B0604020202020204" pitchFamily="34" charset="0"/>
+              <a:buChar char="•"/>
+              <a:defRPr/>
+            </a:pPr>
+            <a:r>
+              <a:rPr lang="en-US" sz="2400" dirty="0"/>
+              <a:t>Manually create some ”noise” for program so as to increase compilation difficult for traditional Domino compiler</a:t>
+            </a:r>
           </a:p>
         </p:txBody>
       </p:sp>
@@ -10339,6 +10890,272 @@
           <p:cNvPr id="4" name="Title 1">
             <a:extLst>
               <a:ext uri="{FF2B5EF4-FFF2-40B4-BE49-F238E27FC236}">
+                <a16:creationId xmlns:a16="http://schemas.microsoft.com/office/drawing/2014/main" id="{27488B10-E791-B84B-9454-529036FFBC58}"/>
+              </a:ext>
+            </a:extLst>
+          </p:cNvPr>
+          <p:cNvSpPr txBox="1">
+            <a:spLocks/>
+          </p:cNvSpPr>
+          <p:nvPr/>
+        </p:nvSpPr>
+        <p:spPr>
+          <a:xfrm>
+            <a:off x="296562" y="274638"/>
+            <a:ext cx="11738919" cy="1143000"/>
+          </a:xfrm>
+          <a:prstGeom prst="rect">
+            <a:avLst/>
+          </a:prstGeom>
+        </p:spPr>
+        <p:txBody>
+          <a:bodyPr vert="horz" lIns="91440" tIns="45720" rIns="91440" bIns="45720" rtlCol="0" anchor="ctr">
+            <a:noAutofit/>
+          </a:bodyPr>
+          <a:lstStyle>
+            <a:lvl1pPr algn="ctr" defTabSz="457200" rtl="0" eaLnBrk="1" latinLnBrk="0" hangingPunct="1">
+              <a:spcBef>
+                <a:spcPct val="0"/>
+              </a:spcBef>
+              <a:buNone/>
+              <a:defRPr sz="4400" kern="1200">
+                <a:solidFill>
+                  <a:srgbClr val="0000FF"/>
+                </a:solidFill>
+                <a:latin typeface="+mj-lt"/>
+                <a:ea typeface="+mj-ea"/>
+                <a:cs typeface="+mj-cs"/>
+              </a:defRPr>
+            </a:lvl1pPr>
+          </a:lstStyle>
+          <a:p>
+            <a:pPr marL="0" marR="0" lvl="0" indent="0" algn="ctr" defTabSz="457200" rtl="0" eaLnBrk="1" fontAlgn="auto" latinLnBrk="0" hangingPunct="1">
+              <a:lnSpc>
+                <a:spcPct val="100000"/>
+              </a:lnSpc>
+              <a:spcBef>
+                <a:spcPct val="0"/>
+              </a:spcBef>
+              <a:spcAft>
+                <a:spcPts val="0"/>
+              </a:spcAft>
+              <a:buClrTx/>
+              <a:buSzTx/>
+              <a:buFontTx/>
+              <a:buNone/>
+              <a:tabLst/>
+              <a:defRPr/>
+            </a:pPr>
+            <a:r>
+              <a:rPr kumimoji="0" lang="en-US" sz="3800" b="0" i="0" u="none" strike="noStrike" kern="1200" cap="none" spc="0" normalizeH="0" baseline="0" noProof="0" dirty="0">
+                <a:ln>
+                  <a:noFill/>
+                </a:ln>
+                <a:solidFill>
+                  <a:srgbClr val="0000FF"/>
+                </a:solidFill>
+                <a:effectLst/>
+                <a:uLnTx/>
+                <a:uFillTx/>
+                <a:latin typeface="Calibri"/>
+                <a:ea typeface="+mj-ea"/>
+                <a:cs typeface="+mj-cs"/>
+              </a:rPr>
+              <a:t>Compilation result </a:t>
+            </a:r>
+          </a:p>
+        </p:txBody>
+      </p:sp>
+      <p:sp>
+        <p:nvSpPr>
+          <p:cNvPr id="6" name="TextBox 5">
+            <a:extLst>
+              <a:ext uri="{FF2B5EF4-FFF2-40B4-BE49-F238E27FC236}">
+                <a16:creationId xmlns:a16="http://schemas.microsoft.com/office/drawing/2014/main" id="{922F54D0-C445-5246-B19F-2D7BF091539A}"/>
+              </a:ext>
+            </a:extLst>
+          </p:cNvPr>
+          <p:cNvSpPr txBox="1"/>
+          <p:nvPr/>
+        </p:nvSpPr>
+        <p:spPr>
+          <a:xfrm>
+            <a:off x="1099751" y="1599875"/>
+            <a:ext cx="9527060" cy="461665"/>
+          </a:xfrm>
+          <a:prstGeom prst="rect">
+            <a:avLst/>
+          </a:prstGeom>
+          <a:noFill/>
+        </p:spPr>
+        <p:txBody>
+          <a:bodyPr wrap="square" rtlCol="0">
+            <a:spAutoFit/>
+          </a:bodyPr>
+          <a:lstStyle/>
+          <a:p>
+            <a:pPr marL="342900" indent="-342900">
+              <a:buFont typeface="Arial" panose="020B0604020202020204" pitchFamily="34" charset="0"/>
+              <a:buChar char="•"/>
+            </a:pPr>
+            <a:r>
+              <a:rPr lang="en-US" sz="2400"/>
+              <a:t>In general, Chipmunk can compile many mutation that Domino cannot</a:t>
+            </a:r>
+          </a:p>
+        </p:txBody>
+      </p:sp>
+      <p:sp>
+        <p:nvSpPr>
+          <p:cNvPr id="7" name="TextBox 6">
+            <a:extLst>
+              <a:ext uri="{FF2B5EF4-FFF2-40B4-BE49-F238E27FC236}">
+                <a16:creationId xmlns:a16="http://schemas.microsoft.com/office/drawing/2014/main" id="{12E89E06-6673-6F49-9A75-FCBA9E9E4DE1}"/>
+              </a:ext>
+            </a:extLst>
+          </p:cNvPr>
+          <p:cNvSpPr txBox="1"/>
+          <p:nvPr/>
+        </p:nvSpPr>
+        <p:spPr>
+          <a:xfrm>
+            <a:off x="1099751" y="4228562"/>
+            <a:ext cx="9527060" cy="830997"/>
+          </a:xfrm>
+          <a:prstGeom prst="rect">
+            <a:avLst/>
+          </a:prstGeom>
+          <a:noFill/>
+        </p:spPr>
+        <p:txBody>
+          <a:bodyPr wrap="square" rtlCol="0">
+            <a:spAutoFit/>
+          </a:bodyPr>
+          <a:lstStyle/>
+          <a:p>
+            <a:pPr marL="342900" indent="-342900">
+              <a:buFont typeface="Arial" panose="020B0604020202020204" pitchFamily="34" charset="0"/>
+              <a:buChar char="•"/>
+            </a:pPr>
+            <a:r>
+              <a:rPr lang="en-US" sz="2400"/>
+              <a:t>However, due to the complexity of program synthesis problem, the compilation time of Chipmunk is much longer than Domino</a:t>
+            </a:r>
+          </a:p>
+        </p:txBody>
+      </p:sp>
+      <p:sp>
+        <p:nvSpPr>
+          <p:cNvPr id="8" name="TextBox 7">
+            <a:extLst>
+              <a:ext uri="{FF2B5EF4-FFF2-40B4-BE49-F238E27FC236}">
+                <a16:creationId xmlns:a16="http://schemas.microsoft.com/office/drawing/2014/main" id="{E0A86A54-C09C-D340-83CF-C90F28AFAB1C}"/>
+              </a:ext>
+            </a:extLst>
+          </p:cNvPr>
+          <p:cNvSpPr txBox="1"/>
+          <p:nvPr/>
+        </p:nvSpPr>
+        <p:spPr>
+          <a:xfrm>
+            <a:off x="1099751" y="2452553"/>
+            <a:ext cx="9527060" cy="830997"/>
+          </a:xfrm>
+          <a:prstGeom prst="rect">
+            <a:avLst/>
+          </a:prstGeom>
+          <a:noFill/>
+        </p:spPr>
+        <p:txBody>
+          <a:bodyPr wrap="square" rtlCol="0">
+            <a:spAutoFit/>
+          </a:bodyPr>
+          <a:lstStyle/>
+          <a:p>
+            <a:pPr marL="342900" indent="-342900">
+              <a:buFont typeface="Arial" panose="020B0604020202020204" pitchFamily="34" charset="0"/>
+              <a:buChar char="•"/>
+            </a:pPr>
+            <a:r>
+              <a:rPr lang="en-US" sz="2400"/>
+              <a:t>Chipmunk will find the optimal resources usage, with smaller depth and width</a:t>
+            </a:r>
+          </a:p>
+        </p:txBody>
+      </p:sp>
+      <p:sp>
+        <p:nvSpPr>
+          <p:cNvPr id="9" name="Rectangle 8">
+            <a:extLst>
+              <a:ext uri="{FF2B5EF4-FFF2-40B4-BE49-F238E27FC236}">
+                <a16:creationId xmlns:a16="http://schemas.microsoft.com/office/drawing/2014/main" id="{7712ECDF-319F-5F42-BF3D-3F758079E7BE}"/>
+              </a:ext>
+            </a:extLst>
+          </p:cNvPr>
+          <p:cNvSpPr/>
+          <p:nvPr/>
+        </p:nvSpPr>
+        <p:spPr>
+          <a:xfrm>
+            <a:off x="1099751" y="3429000"/>
+            <a:ext cx="4716676" cy="369332"/>
+          </a:xfrm>
+          <a:prstGeom prst="rect">
+            <a:avLst/>
+          </a:prstGeom>
+        </p:spPr>
+        <p:txBody>
+          <a:bodyPr wrap="none">
+            <a:spAutoFit/>
+          </a:bodyPr>
+          <a:lstStyle/>
+          <a:p>
+            <a:r>
+              <a:rPr lang="en-US" b="1">
+                <a:solidFill>
+                  <a:srgbClr val="FF0000"/>
+                </a:solidFill>
+              </a:rPr>
+              <a:t>NOTE: How should we explain the width issue? </a:t>
+            </a:r>
+          </a:p>
+        </p:txBody>
+      </p:sp>
+    </p:spTree>
+    <p:extLst>
+      <p:ext uri="{BB962C8B-B14F-4D97-AF65-F5344CB8AC3E}">
+        <p14:creationId xmlns:p14="http://schemas.microsoft.com/office/powerpoint/2010/main" val="2187553313"/>
+      </p:ext>
+    </p:extLst>
+  </p:cSld>
+  <p:clrMapOvr>
+    <a:masterClrMapping/>
+  </p:clrMapOvr>
+</p:sld>
+</file>
+
+<file path=ppt/slides/slide19.xml><?xml version="1.0" encoding="utf-8"?>
+<p:sld xmlns:a="http://schemas.openxmlformats.org/drawingml/2006/main" xmlns:r="http://schemas.openxmlformats.org/officeDocument/2006/relationships" xmlns:p="http://schemas.openxmlformats.org/presentationml/2006/main">
+  <p:cSld>
+    <p:spTree>
+      <p:nvGrpSpPr>
+        <p:cNvPr id="1" name=""/>
+        <p:cNvGrpSpPr/>
+        <p:nvPr/>
+      </p:nvGrpSpPr>
+      <p:grpSpPr>
+        <a:xfrm>
+          <a:off x="0" y="0"/>
+          <a:ext cx="0" cy="0"/>
+          <a:chOff x="0" y="0"/>
+          <a:chExt cx="0" cy="0"/>
+        </a:xfrm>
+      </p:grpSpPr>
+      <p:sp>
+        <p:nvSpPr>
+          <p:cNvPr id="4" name="Title 1">
+            <a:extLst>
+              <a:ext uri="{FF2B5EF4-FFF2-40B4-BE49-F238E27FC236}">
                 <a16:creationId xmlns:a16="http://schemas.microsoft.com/office/drawing/2014/main" id="{CA442AC4-4D21-CC43-91B5-08A9F368D471}"/>
               </a:ext>
             </a:extLst>
@@ -10754,7 +11571,7 @@
         </p:nvSpPr>
         <p:spPr>
           <a:xfrm>
-            <a:off x="329621" y="2052512"/>
+            <a:off x="329621" y="1323460"/>
             <a:ext cx="3231847" cy="1631024"/>
           </a:xfrm>
           <a:prstGeom prst="rect">
@@ -10813,7 +11630,7 @@
         </p:nvSpPr>
         <p:spPr>
           <a:xfrm>
-            <a:off x="3906309" y="1934272"/>
+            <a:off x="3906309" y="1205220"/>
             <a:ext cx="3922121" cy="2143920"/>
           </a:xfrm>
           <a:prstGeom prst="rect">
@@ -10880,7 +11697,7 @@
         </p:nvSpPr>
         <p:spPr>
           <a:xfrm>
-            <a:off x="8273129" y="1897696"/>
+            <a:off x="8273129" y="1180998"/>
             <a:ext cx="4509104" cy="2143920"/>
           </a:xfrm>
           <a:prstGeom prst="rect">
@@ -10939,7 +11756,7 @@
         </p:nvSpPr>
         <p:spPr>
           <a:xfrm>
-            <a:off x="270934" y="4463435"/>
+            <a:off x="270934" y="3734383"/>
             <a:ext cx="2395720" cy="605230"/>
           </a:xfrm>
           <a:prstGeom prst="rect">
@@ -10974,7 +11791,7 @@
         </p:nvSpPr>
         <p:spPr>
           <a:xfrm>
-            <a:off x="3679649" y="4227467"/>
+            <a:off x="3679649" y="3498415"/>
             <a:ext cx="3658053" cy="1118127"/>
           </a:xfrm>
           <a:prstGeom prst="rect">
@@ -11015,7 +11832,7 @@
         </p:nvSpPr>
         <p:spPr>
           <a:xfrm>
-            <a:off x="7660697" y="4131278"/>
+            <a:off x="7660697" y="3402226"/>
             <a:ext cx="4536050" cy="1118127"/>
           </a:xfrm>
           <a:prstGeom prst="rect">
@@ -11056,7 +11873,7 @@
         </p:nvSpPr>
         <p:spPr>
           <a:xfrm>
-            <a:off x="168812" y="1975339"/>
+            <a:off x="168812" y="1246287"/>
             <a:ext cx="3231845" cy="1977917"/>
           </a:xfrm>
           <a:prstGeom prst="rect">
@@ -11104,7 +11921,7 @@
         </p:nvSpPr>
         <p:spPr>
           <a:xfrm>
-            <a:off x="3734467" y="1897696"/>
+            <a:off x="3734467" y="1168644"/>
             <a:ext cx="3879688" cy="2309259"/>
           </a:xfrm>
           <a:prstGeom prst="rect">
@@ -11152,7 +11969,7 @@
         </p:nvSpPr>
         <p:spPr>
           <a:xfrm>
-            <a:off x="8013007" y="1873312"/>
+            <a:off x="8013007" y="1144260"/>
             <a:ext cx="3879688" cy="2329771"/>
           </a:xfrm>
           <a:prstGeom prst="rect">
@@ -11263,6 +12080,87 @@
                 <a:cs typeface="+mj-cs"/>
               </a:rPr>
               <a:t>Introduction to Sketch</a:t>
+            </a:r>
+          </a:p>
+        </p:txBody>
+      </p:sp>
+      <p:sp>
+        <p:nvSpPr>
+          <p:cNvPr id="16" name="Title 1">
+            <a:extLst>
+              <a:ext uri="{FF2B5EF4-FFF2-40B4-BE49-F238E27FC236}">
+                <a16:creationId xmlns:a16="http://schemas.microsoft.com/office/drawing/2014/main" id="{6F2C5E14-C986-A04C-A366-3A24A0CA88E9}"/>
+              </a:ext>
+            </a:extLst>
+          </p:cNvPr>
+          <p:cNvSpPr txBox="1">
+            <a:spLocks/>
+          </p:cNvSpPr>
+          <p:nvPr/>
+        </p:nvSpPr>
+        <p:spPr>
+          <a:xfrm>
+            <a:off x="270934" y="4834195"/>
+            <a:ext cx="11921066" cy="1143000"/>
+          </a:xfrm>
+          <a:prstGeom prst="rect">
+            <a:avLst/>
+          </a:prstGeom>
+        </p:spPr>
+        <p:txBody>
+          <a:bodyPr vert="horz" lIns="91440" tIns="45720" rIns="91440" bIns="45720" rtlCol="0" anchor="ctr">
+            <a:noAutofit/>
+          </a:bodyPr>
+          <a:lstStyle>
+            <a:lvl1pPr algn="ctr" defTabSz="457200" rtl="0" eaLnBrk="1" latinLnBrk="0" hangingPunct="1">
+              <a:spcBef>
+                <a:spcPct val="0"/>
+              </a:spcBef>
+              <a:buNone/>
+              <a:defRPr sz="4400" kern="1200">
+                <a:solidFill>
+                  <a:srgbClr val="0000FF"/>
+                </a:solidFill>
+                <a:latin typeface="+mj-lt"/>
+                <a:ea typeface="+mj-ea"/>
+                <a:cs typeface="+mj-cs"/>
+              </a:defRPr>
+            </a:lvl1pPr>
+          </a:lstStyle>
+          <a:p>
+            <a:pPr marL="342900" marR="0" lvl="0" indent="-342900" algn="l" defTabSz="457200" rtl="0" eaLnBrk="1" fontAlgn="auto" latinLnBrk="0" hangingPunct="1">
+              <a:lnSpc>
+                <a:spcPct val="100000"/>
+              </a:lnSpc>
+              <a:spcBef>
+                <a:spcPct val="0"/>
+              </a:spcBef>
+              <a:spcAft>
+                <a:spcPts val="0"/>
+              </a:spcAft>
+              <a:buClrTx/>
+              <a:buSzTx/>
+              <a:buFont typeface="Arial" panose="020B0604020202020204" pitchFamily="34" charset="0"/>
+              <a:buChar char="•"/>
+              <a:tabLst/>
+              <a:defRPr/>
+            </a:pPr>
+            <a:r>
+              <a:rPr kumimoji="0" lang="en-US" sz="2400" b="0" i="0" u="none" strike="noStrike" kern="1200" cap="none" spc="0" normalizeH="0" baseline="0" noProof="0" dirty="0">
+                <a:ln>
+                  <a:noFill/>
+                </a:ln>
+                <a:solidFill>
+                  <a:schemeClr val="tx1"/>
+                </a:solidFill>
+                <a:effectLst/>
+                <a:uLnTx/>
+                <a:uFillTx/>
+                <a:latin typeface="Calibri"/>
+                <a:ea typeface="+mj-ea"/>
+                <a:cs typeface="+mj-cs"/>
+              </a:rPr>
+              <a:t>Automatically generate programs which satisfy specification given the partial program</a:t>
             </a:r>
           </a:p>
         </p:txBody>
@@ -11311,8 +12209,8 @@
         </p:nvSpPr>
         <p:spPr>
           <a:xfrm>
-            <a:off x="370700" y="1062683"/>
-            <a:ext cx="2879719" cy="830997"/>
+            <a:off x="1531347" y="1077942"/>
+            <a:ext cx="2273155" cy="707886"/>
           </a:xfrm>
           <a:prstGeom prst="rect">
             <a:avLst/>
@@ -11329,7 +12227,7 @@
           <a:p>
             <a:pPr algn="ctr"/>
             <a:r>
-              <a:rPr lang="en-US" sz="2400" dirty="0"/>
+              <a:rPr lang="en-US" sz="2000" dirty="0"/>
               <a:t>Initialize X to random inputs</a:t>
             </a:r>
           </a:p>
@@ -11349,8 +12247,8 @@
         </p:nvSpPr>
         <p:spPr>
           <a:xfrm>
-            <a:off x="2898621" y="2274121"/>
-            <a:ext cx="3185900" cy="1362711"/>
+            <a:off x="3038333" y="2219818"/>
+            <a:ext cx="2514844" cy="1120450"/>
           </a:xfrm>
           <a:prstGeom prst="roundRect">
             <a:avLst/>
@@ -11384,7 +12282,7 @@
           <a:lstStyle/>
           <a:p>
             <a:pPr algn="ctr"/>
-            <a:endParaRPr lang="en-US" sz="2400"/>
+            <a:endParaRPr lang="en-US" sz="2000"/>
           </a:p>
         </p:txBody>
       </p:sp>
@@ -11402,8 +12300,8 @@
         </p:nvSpPr>
         <p:spPr>
           <a:xfrm>
-            <a:off x="6864185" y="2274300"/>
-            <a:ext cx="3181575" cy="1364822"/>
+            <a:off x="6372790" y="2183301"/>
+            <a:ext cx="2734231" cy="1122185"/>
           </a:xfrm>
           <a:prstGeom prst="roundRect">
             <a:avLst/>
@@ -11437,7 +12335,7 @@
           <a:lstStyle/>
           <a:p>
             <a:pPr algn="ctr"/>
-            <a:endParaRPr lang="en-US" sz="2400"/>
+            <a:endParaRPr lang="en-US" sz="2000"/>
           </a:p>
         </p:txBody>
       </p:sp>
@@ -11455,8 +12353,8 @@
         </p:nvSpPr>
         <p:spPr>
           <a:xfrm rot="10800000">
-            <a:off x="4662805" y="3940842"/>
-            <a:ext cx="3551566" cy="660692"/>
+            <a:off x="4743616" y="3601093"/>
+            <a:ext cx="2803489" cy="543235"/>
           </a:xfrm>
           <a:prstGeom prst="uturnArrow">
             <a:avLst>
@@ -11494,7 +12392,7 @@
           <a:lstStyle/>
           <a:p>
             <a:pPr algn="ctr"/>
-            <a:endParaRPr lang="en-US" sz="2400">
+            <a:endParaRPr lang="en-US" sz="2000">
               <a:solidFill>
                 <a:schemeClr val="tx1"/>
               </a:solidFill>
@@ -11502,8 +12400,8 @@
           </a:p>
         </p:txBody>
       </p:sp>
-      <mc:AlternateContent xmlns:mc="http://schemas.openxmlformats.org/markup-compatibility/2006" xmlns:a14="http://schemas.microsoft.com/office/drawing/2010/main">
-        <mc:Choice Requires="a14">
+      <mc:AlternateContent xmlns:mc="http://schemas.openxmlformats.org/markup-compatibility/2006">
+        <mc:Choice xmlns:a14="http://schemas.microsoft.com/office/drawing/2010/main" Requires="a14">
           <p:sp>
             <p:nvSpPr>
               <p:cNvPr id="13" name="TextBox 12">
@@ -11518,8 +12416,8 @@
             </p:nvSpPr>
             <p:spPr>
               <a:xfrm>
-                <a:off x="6676482" y="2529715"/>
-                <a:ext cx="3625162" cy="830997"/>
+                <a:off x="6278521" y="2343814"/>
+                <a:ext cx="2861583" cy="707886"/>
               </a:xfrm>
               <a:prstGeom prst="rect">
                 <a:avLst/>
@@ -11534,13 +12432,13 @@
               <a:p>
                 <a:pPr algn="ctr"/>
                 <a:r>
-                  <a:rPr lang="en-US" sz="2400" dirty="0"/>
+                  <a:rPr lang="en-US" sz="2000" dirty="0"/>
                   <a:t>Verify hole assignment on all inputs </a:t>
                 </a:r>
                 <a14:m>
                   <m:oMath xmlns:m="http://schemas.openxmlformats.org/officeDocument/2006/math">
                     <m:r>
-                      <a:rPr lang="en-US" sz="2400" i="1" dirty="0">
+                      <a:rPr lang="en-US" sz="2000" i="1" dirty="0">
                         <a:latin typeface="Cambria Math" panose="02040503050406030204" pitchFamily="18" charset="0"/>
                       </a:rPr>
                       <m:t>𝑌</m:t>
@@ -11548,14 +12446,14 @@
                   </m:oMath>
                 </a14:m>
                 <a:r>
-                  <a:rPr lang="en-US" sz="2400" dirty="0"/>
+                  <a:rPr lang="en-US" sz="2000" dirty="0"/>
                   <a:t>(X ⊆ Y)</a:t>
                 </a:r>
               </a:p>
             </p:txBody>
           </p:sp>
         </mc:Choice>
-        <mc:Fallback xmlns="">
+        <mc:Fallback>
           <p:sp>
             <p:nvSpPr>
               <p:cNvPr id="13" name="TextBox 12">
@@ -11572,8 +12470,8 @@
             </p:nvSpPr>
             <p:spPr>
               <a:xfrm>
-                <a:off x="6676482" y="2529715"/>
-                <a:ext cx="3625162" cy="830997"/>
+                <a:off x="6278521" y="2343814"/>
+                <a:ext cx="2861583" cy="707886"/>
               </a:xfrm>
               <a:prstGeom prst="rect">
                 <a:avLst/>
@@ -11581,7 +12479,7 @@
               <a:blipFill>
                 <a:blip r:embed="rId2"/>
                 <a:stretch>
-                  <a:fillRect t="-4478" r="-1049" b="-13433"/>
+                  <a:fillRect l="-1762" t="-5357" r="-3965" b="-14286"/>
                 </a:stretch>
               </a:blipFill>
             </p:spPr>
@@ -11600,8 +12498,8 @@
           </p:sp>
         </mc:Fallback>
       </mc:AlternateContent>
-      <mc:AlternateContent xmlns:mc="http://schemas.openxmlformats.org/markup-compatibility/2006" xmlns:a14="http://schemas.microsoft.com/office/drawing/2010/main">
-        <mc:Choice Requires="a14">
+      <mc:AlternateContent xmlns:mc="http://schemas.openxmlformats.org/markup-compatibility/2006">
+        <mc:Choice xmlns:a14="http://schemas.microsoft.com/office/drawing/2010/main" Requires="a14">
           <p:sp>
             <p:nvSpPr>
               <p:cNvPr id="15" name="TextBox 14">
@@ -11616,8 +12514,8 @@
             </p:nvSpPr>
             <p:spPr>
               <a:xfrm>
-                <a:off x="2802229" y="2527324"/>
-                <a:ext cx="3463829" cy="830997"/>
+                <a:off x="3000482" y="2378494"/>
+                <a:ext cx="2734232" cy="707886"/>
               </a:xfrm>
               <a:prstGeom prst="rect">
                 <a:avLst/>
@@ -11632,25 +12530,25 @@
               <a:p>
                 <a:pPr algn="ctr"/>
                 <a:r>
-                  <a:rPr lang="en-US" sz="2400" dirty="0"/>
+                  <a:rPr lang="en-US" sz="2000" dirty="0"/>
                   <a:t>Synthesize holes that work for inputs </a:t>
                 </a:r>
                 <a14:m>
                   <m:oMath xmlns:m="http://schemas.openxmlformats.org/officeDocument/2006/math">
                     <m:r>
-                      <a:rPr lang="en-US" sz="2400" i="1">
+                      <a:rPr lang="en-US" sz="2000" i="1">
                         <a:latin typeface="Cambria Math" panose="02040503050406030204" pitchFamily="18" charset="0"/>
                       </a:rPr>
                       <m:t>𝑋</m:t>
                     </m:r>
                   </m:oMath>
                 </a14:m>
-                <a:endParaRPr lang="en-US" sz="2400" dirty="0"/>
+                <a:endParaRPr lang="en-US" sz="2000" dirty="0"/>
               </a:p>
             </p:txBody>
           </p:sp>
         </mc:Choice>
-        <mc:Fallback xmlns="">
+        <mc:Fallback>
           <p:sp>
             <p:nvSpPr>
               <p:cNvPr id="15" name="TextBox 14">
@@ -11667,8 +12565,8 @@
             </p:nvSpPr>
             <p:spPr>
               <a:xfrm>
-                <a:off x="2802229" y="2527324"/>
-                <a:ext cx="3463829" cy="830997"/>
+                <a:off x="3000482" y="2378494"/>
+                <a:ext cx="2734232" cy="707886"/>
               </a:xfrm>
               <a:prstGeom prst="rect">
                 <a:avLst/>
@@ -11676,7 +12574,7 @@
               <a:blipFill>
                 <a:blip r:embed="rId3"/>
                 <a:stretch>
-                  <a:fillRect t="-6061" b="-15152"/>
+                  <a:fillRect t="-3509" b="-14035"/>
                 </a:stretch>
               </a:blipFill>
             </p:spPr>
@@ -11709,8 +12607,8 @@
         </p:nvSpPr>
         <p:spPr>
           <a:xfrm>
-            <a:off x="5169304" y="848656"/>
-            <a:ext cx="2746554" cy="461665"/>
+            <a:off x="4919913" y="856589"/>
+            <a:ext cx="2168039" cy="400110"/>
           </a:xfrm>
           <a:prstGeom prst="rect">
             <a:avLst/>
@@ -11725,7 +12623,7 @@
           <a:p>
             <a:pPr algn="ctr"/>
             <a:r>
-              <a:rPr lang="en-US" sz="2400" dirty="0"/>
+              <a:rPr lang="en-US" sz="2000" dirty="0"/>
               <a:t>Hole Assignment</a:t>
             </a:r>
           </a:p>
@@ -11745,8 +12643,8 @@
         </p:nvSpPr>
         <p:spPr>
           <a:xfrm>
-            <a:off x="4671316" y="4615659"/>
-            <a:ext cx="3815956" cy="461665"/>
+            <a:off x="4807817" y="4240528"/>
+            <a:ext cx="3012190" cy="400110"/>
           </a:xfrm>
           <a:prstGeom prst="rect">
             <a:avLst/>
@@ -11761,7 +12659,7 @@
           <a:p>
             <a:pPr algn="ctr"/>
             <a:r>
-              <a:rPr lang="en-US" sz="2400" dirty="0"/>
+              <a:rPr lang="en-US" sz="2000" dirty="0"/>
               <a:t>Counterexample Input c</a:t>
             </a:r>
           </a:p>
@@ -11781,8 +12679,8 @@
         </p:nvSpPr>
         <p:spPr>
           <a:xfrm>
-            <a:off x="851185" y="5229429"/>
-            <a:ext cx="1536049" cy="690802"/>
+            <a:off x="1520723" y="4487256"/>
+            <a:ext cx="1212506" cy="567992"/>
           </a:xfrm>
           <a:prstGeom prst="roundRect">
             <a:avLst/>
@@ -11815,7 +12713,7 @@
           <a:p>
             <a:pPr algn="ctr"/>
             <a:r>
-              <a:rPr lang="en-US" sz="2400" dirty="0"/>
+              <a:rPr lang="en-US" sz="2000" dirty="0"/>
               <a:t>Failure</a:t>
             </a:r>
           </a:p>
@@ -11835,8 +12733,8 @@
         </p:nvSpPr>
         <p:spPr>
           <a:xfrm>
-            <a:off x="3611502" y="3596314"/>
-            <a:ext cx="1554298" cy="461665"/>
+            <a:off x="3407544" y="3381824"/>
+            <a:ext cx="1226911" cy="400110"/>
           </a:xfrm>
           <a:prstGeom prst="rect">
             <a:avLst/>
@@ -11851,7 +12749,7 @@
           <a:p>
             <a:pPr algn="ctr"/>
             <a:r>
-              <a:rPr lang="en-US" sz="2400" dirty="0"/>
+              <a:rPr lang="en-US" sz="2000" dirty="0"/>
               <a:t>Add c to X</a:t>
             </a:r>
           </a:p>
@@ -11871,8 +12769,8 @@
         </p:nvSpPr>
         <p:spPr>
           <a:xfrm rot="10800000" flipH="1">
-            <a:off x="10140582" y="3024034"/>
-            <a:ext cx="1232236" cy="2143664"/>
+            <a:off x="9461017" y="2626652"/>
+            <a:ext cx="972686" cy="1762566"/>
           </a:xfrm>
           <a:prstGeom prst="bentUpArrow">
             <a:avLst>
@@ -11908,7 +12806,7 @@
           <a:lstStyle/>
           <a:p>
             <a:pPr algn="ctr"/>
-            <a:endParaRPr lang="en-US" sz="2400" dirty="0"/>
+            <a:endParaRPr lang="en-US" sz="2000" dirty="0"/>
           </a:p>
         </p:txBody>
       </p:sp>
@@ -11926,8 +12824,8 @@
         </p:nvSpPr>
         <p:spPr>
           <a:xfrm>
-            <a:off x="10360880" y="5225061"/>
-            <a:ext cx="1536049" cy="690802"/>
+            <a:off x="9745308" y="4569391"/>
+            <a:ext cx="1212506" cy="567992"/>
           </a:xfrm>
           <a:prstGeom prst="roundRect">
             <a:avLst/>
@@ -11960,7 +12858,7 @@
           <a:p>
             <a:pPr algn="ctr"/>
             <a:r>
-              <a:rPr lang="en-US" sz="2400" dirty="0"/>
+              <a:rPr lang="en-US" sz="2000" dirty="0"/>
               <a:t>Success</a:t>
             </a:r>
           </a:p>
@@ -11980,8 +12878,8 @@
         </p:nvSpPr>
         <p:spPr>
           <a:xfrm>
-            <a:off x="9210677" y="4059951"/>
-            <a:ext cx="2981324" cy="461665"/>
+            <a:off x="8899526" y="3363545"/>
+            <a:ext cx="2353359" cy="400110"/>
           </a:xfrm>
           <a:prstGeom prst="rect">
             <a:avLst/>
@@ -11998,7 +12896,7 @@
           <a:p>
             <a:pPr algn="ctr"/>
             <a:r>
-              <a:rPr lang="en-US" sz="2400" dirty="0"/>
+              <a:rPr lang="en-US" sz="2000" dirty="0"/>
               <a:t>No Counterexamples</a:t>
             </a:r>
           </a:p>
@@ -12018,8 +12916,8 @@
         </p:nvSpPr>
         <p:spPr>
           <a:xfrm>
-            <a:off x="4832873" y="1396142"/>
-            <a:ext cx="3551566" cy="660692"/>
+            <a:off x="4753044" y="1439457"/>
+            <a:ext cx="2803489" cy="543235"/>
           </a:xfrm>
           <a:prstGeom prst="uturnArrow">
             <a:avLst>
@@ -12057,7 +12955,7 @@
           <a:lstStyle/>
           <a:p>
             <a:pPr algn="ctr"/>
-            <a:endParaRPr lang="en-US" sz="2400">
+            <a:endParaRPr lang="en-US" sz="2000">
               <a:solidFill>
                 <a:schemeClr val="tx1"/>
               </a:solidFill>
@@ -12079,8 +12977,8 @@
         </p:nvSpPr>
         <p:spPr>
           <a:xfrm rot="10800000">
-            <a:off x="1364789" y="3024032"/>
-            <a:ext cx="1234674" cy="2143662"/>
+            <a:off x="1847276" y="2614289"/>
+            <a:ext cx="974611" cy="1762564"/>
           </a:xfrm>
           <a:prstGeom prst="bentUpArrow">
             <a:avLst>
@@ -12116,7 +13014,7 @@
           <a:lstStyle/>
           <a:p>
             <a:pPr algn="ctr"/>
-            <a:endParaRPr lang="en-US" sz="2400" dirty="0"/>
+            <a:endParaRPr lang="en-US" sz="2000" dirty="0"/>
           </a:p>
         </p:txBody>
       </p:sp>
@@ -12134,8 +13032,8 @@
         </p:nvSpPr>
         <p:spPr>
           <a:xfrm>
-            <a:off x="231584" y="4016438"/>
-            <a:ext cx="3581377" cy="567528"/>
+            <a:off x="985941" y="3388271"/>
+            <a:ext cx="2421604" cy="400110"/>
           </a:xfrm>
           <a:prstGeom prst="rect">
             <a:avLst/>
@@ -12151,7 +13049,7 @@
           <a:lstStyle/>
           <a:p>
             <a:r>
-              <a:rPr lang="en-US" sz="3088" dirty="0"/>
+              <a:rPr lang="en-US" sz="2000" dirty="0"/>
               <a:t>No Hole Assignment</a:t>
             </a:r>
           </a:p>
@@ -12174,8 +13072,8 @@
         </p:nvCxnSpPr>
         <p:spPr>
           <a:xfrm>
-            <a:off x="1810560" y="1893680"/>
-            <a:ext cx="466170" cy="708929"/>
+            <a:off x="2667925" y="1785828"/>
+            <a:ext cx="162888" cy="684306"/>
           </a:xfrm>
           <a:prstGeom prst="straightConnector1">
             <a:avLst/>
@@ -12213,8 +13111,8 @@
         </p:nvSpPr>
         <p:spPr>
           <a:xfrm>
-            <a:off x="422382" y="987689"/>
-            <a:ext cx="2746554" cy="952514"/>
+            <a:off x="1554979" y="1024550"/>
+            <a:ext cx="2168039" cy="783177"/>
           </a:xfrm>
           <a:prstGeom prst="roundRect">
             <a:avLst/>
@@ -12248,7 +13146,7 @@
           <a:lstStyle/>
           <a:p>
             <a:pPr algn="ctr"/>
-            <a:endParaRPr lang="en-US" sz="2400"/>
+            <a:endParaRPr lang="en-US" sz="2000"/>
           </a:p>
         </p:txBody>
       </p:sp>
@@ -12308,6 +13206,87 @@
             <a:endParaRPr lang="en-US" sz="3800" dirty="0">
               <a:latin typeface="Calibri"/>
             </a:endParaRPr>
+          </a:p>
+        </p:txBody>
+      </p:sp>
+      <p:sp>
+        <p:nvSpPr>
+          <p:cNvPr id="22" name="Title 1">
+            <a:extLst>
+              <a:ext uri="{FF2B5EF4-FFF2-40B4-BE49-F238E27FC236}">
+                <a16:creationId xmlns:a16="http://schemas.microsoft.com/office/drawing/2014/main" id="{09B9B27F-6AA2-6F42-994D-B19CA356E8AF}"/>
+              </a:ext>
+            </a:extLst>
+          </p:cNvPr>
+          <p:cNvSpPr txBox="1">
+            <a:spLocks/>
+          </p:cNvSpPr>
+          <p:nvPr/>
+        </p:nvSpPr>
+        <p:spPr>
+          <a:xfrm>
+            <a:off x="270934" y="4834195"/>
+            <a:ext cx="11738919" cy="1143000"/>
+          </a:xfrm>
+          <a:prstGeom prst="rect">
+            <a:avLst/>
+          </a:prstGeom>
+        </p:spPr>
+        <p:txBody>
+          <a:bodyPr vert="horz" lIns="91440" tIns="45720" rIns="91440" bIns="45720" rtlCol="0" anchor="ctr">
+            <a:noAutofit/>
+          </a:bodyPr>
+          <a:lstStyle>
+            <a:lvl1pPr algn="ctr" defTabSz="457200" rtl="0" eaLnBrk="1" latinLnBrk="0" hangingPunct="1">
+              <a:spcBef>
+                <a:spcPct val="0"/>
+              </a:spcBef>
+              <a:buNone/>
+              <a:defRPr sz="4400" kern="1200">
+                <a:solidFill>
+                  <a:srgbClr val="0000FF"/>
+                </a:solidFill>
+                <a:latin typeface="+mj-lt"/>
+                <a:ea typeface="+mj-ea"/>
+                <a:cs typeface="+mj-cs"/>
+              </a:defRPr>
+            </a:lvl1pPr>
+          </a:lstStyle>
+          <a:p>
+            <a:pPr marL="342900" marR="0" lvl="0" indent="-342900" algn="l" defTabSz="457200" rtl="0" eaLnBrk="1" fontAlgn="auto" latinLnBrk="0" hangingPunct="1">
+              <a:lnSpc>
+                <a:spcPct val="100000"/>
+              </a:lnSpc>
+              <a:spcBef>
+                <a:spcPct val="0"/>
+              </a:spcBef>
+              <a:spcAft>
+                <a:spcPts val="0"/>
+              </a:spcAft>
+              <a:buClrTx/>
+              <a:buSzTx/>
+              <a:buFont typeface="Arial" panose="020B0604020202020204" pitchFamily="34" charset="0"/>
+              <a:buChar char="•"/>
+              <a:tabLst/>
+              <a:defRPr/>
+            </a:pPr>
+            <a:r>
+              <a:rPr kumimoji="0" lang="en-US" sz="2400" b="0" i="0" u="none" strike="noStrike" kern="1200" cap="none" spc="0" normalizeH="0" baseline="0" noProof="0" dirty="0">
+                <a:ln>
+                  <a:noFill/>
+                </a:ln>
+                <a:solidFill>
+                  <a:schemeClr val="tx1"/>
+                </a:solidFill>
+                <a:effectLst/>
+                <a:uLnTx/>
+                <a:uFillTx/>
+                <a:latin typeface="Calibri"/>
+                <a:ea typeface="+mj-ea"/>
+                <a:cs typeface="+mj-cs"/>
+              </a:rPr>
+              <a:t>Automatically generate programs which satisfy specification by providing the skeleton</a:t>
+            </a:r>
           </a:p>
         </p:txBody>
       </p:sp>
@@ -16549,6 +17528,93 @@
           </a:p>
         </p:txBody>
       </p:sp>
+      <p:sp>
+        <p:nvSpPr>
+          <p:cNvPr id="4" name="Title 1">
+            <a:extLst>
+              <a:ext uri="{FF2B5EF4-FFF2-40B4-BE49-F238E27FC236}">
+                <a16:creationId xmlns:a16="http://schemas.microsoft.com/office/drawing/2014/main" id="{C50C4329-BFD6-9E4E-AA76-7D5F16D0AC9D}"/>
+              </a:ext>
+            </a:extLst>
+          </p:cNvPr>
+          <p:cNvSpPr txBox="1">
+            <a:spLocks/>
+          </p:cNvSpPr>
+          <p:nvPr/>
+        </p:nvSpPr>
+        <p:spPr>
+          <a:xfrm>
+            <a:off x="3945924" y="3444060"/>
+            <a:ext cx="8089557" cy="1143000"/>
+          </a:xfrm>
+          <a:prstGeom prst="rect">
+            <a:avLst/>
+          </a:prstGeom>
+        </p:spPr>
+        <p:txBody>
+          <a:bodyPr vert="horz" lIns="91440" tIns="45720" rIns="91440" bIns="45720" rtlCol="0" anchor="ctr">
+            <a:noAutofit/>
+          </a:bodyPr>
+          <a:lstStyle>
+            <a:lvl1pPr algn="ctr" defTabSz="457200" rtl="0" eaLnBrk="1" latinLnBrk="0" hangingPunct="1">
+              <a:spcBef>
+                <a:spcPct val="0"/>
+              </a:spcBef>
+              <a:buNone/>
+              <a:defRPr sz="4400" kern="1200">
+                <a:solidFill>
+                  <a:srgbClr val="0000FF"/>
+                </a:solidFill>
+                <a:latin typeface="+mj-lt"/>
+                <a:ea typeface="+mj-ea"/>
+                <a:cs typeface="+mj-cs"/>
+              </a:defRPr>
+            </a:lvl1pPr>
+          </a:lstStyle>
+          <a:p>
+            <a:pPr marL="342900" marR="0" lvl="0" indent="-342900" algn="l" defTabSz="457200" rtl="0" eaLnBrk="1" fontAlgn="auto" latinLnBrk="0" hangingPunct="1">
+              <a:lnSpc>
+                <a:spcPct val="100000"/>
+              </a:lnSpc>
+              <a:spcBef>
+                <a:spcPct val="0"/>
+              </a:spcBef>
+              <a:spcAft>
+                <a:spcPts val="0"/>
+              </a:spcAft>
+              <a:buClrTx/>
+              <a:buSzTx/>
+              <a:buFont typeface="Arial" panose="020B0604020202020204" pitchFamily="34" charset="0"/>
+              <a:buChar char="•"/>
+              <a:tabLst/>
+              <a:defRPr/>
+            </a:pPr>
+            <a:r>
+              <a:rPr lang="en-US" sz="2400" dirty="0">
+                <a:solidFill>
+                  <a:schemeClr val="tx1"/>
+                </a:solidFill>
+                <a:latin typeface="Calibri"/>
+              </a:rPr>
+              <a:t>Manually create the stateless ALU to support arith operator, </a:t>
+            </a:r>
+            <a:endParaRPr kumimoji="0" lang="en-US" sz="2400" b="0" i="0" u="none" strike="noStrike" kern="1200" cap="none" spc="0" normalizeH="0" baseline="0" noProof="0" dirty="0">
+              <a:ln>
+                <a:noFill/>
+              </a:ln>
+              <a:solidFill>
+                <a:schemeClr val="tx1"/>
+              </a:solidFill>
+              <a:effectLst/>
+              <a:uLnTx/>
+              <a:uFillTx/>
+              <a:latin typeface="Calibri"/>
+              <a:ea typeface="+mj-ea"/>
+              <a:cs typeface="+mj-cs"/>
+            </a:endParaRPr>
+          </a:p>
+        </p:txBody>
+      </p:sp>
     </p:spTree>
     <p:extLst>
       <p:ext uri="{BB962C8B-B14F-4D97-AF65-F5344CB8AC3E}">
@@ -16753,7 +17819,7 @@
         <p:spPr>
           <a:xfrm>
             <a:off x="926757" y="2335427"/>
-            <a:ext cx="6932140" cy="2031325"/>
+            <a:ext cx="8958648" cy="2677656"/>
           </a:xfrm>
           <a:prstGeom prst="rect">
             <a:avLst/>
@@ -16771,7 +17837,11 @@
               <a:buChar char="•"/>
             </a:pPr>
             <a:r>
-              <a:rPr lang="en-US" b="1"/>
+              <a:rPr lang="en-US" sz="2400">
+                <a:latin typeface="Calibri"/>
+                <a:ea typeface="+mj-ea"/>
+                <a:cs typeface="+mj-cs"/>
+              </a:rPr>
               <a:t>Reduce the constant values</a:t>
             </a:r>
           </a:p>
@@ -16780,7 +17850,11 @@
               <a:buFont typeface="Arial" panose="020B0604020202020204" pitchFamily="34" charset="0"/>
               <a:buChar char="•"/>
             </a:pPr>
-            <a:endParaRPr lang="en-US" b="1"/>
+            <a:endParaRPr lang="en-US" sz="2400">
+              <a:latin typeface="Calibri"/>
+              <a:ea typeface="+mj-ea"/>
+              <a:cs typeface="+mj-cs"/>
+            </a:endParaRPr>
           </a:p>
           <a:p>
             <a:pPr marL="285750" indent="-285750">
@@ -16788,7 +17862,11 @@
               <a:buChar char="•"/>
             </a:pPr>
             <a:r>
-              <a:rPr lang="en-US" b="1"/>
+              <a:rPr lang="en-US" sz="2400">
+                <a:latin typeface="Calibri"/>
+                <a:ea typeface="+mj-ea"/>
+                <a:cs typeface="+mj-cs"/>
+              </a:rPr>
               <a:t>External counterexample mode vs hole-elimination mode</a:t>
             </a:r>
           </a:p>
@@ -16797,7 +17875,11 @@
               <a:buFont typeface="Arial" panose="020B0604020202020204" pitchFamily="34" charset="0"/>
               <a:buChar char="•"/>
             </a:pPr>
-            <a:endParaRPr lang="en-US" b="1"/>
+            <a:endParaRPr lang="en-US" sz="2400">
+              <a:latin typeface="Calibri"/>
+              <a:ea typeface="+mj-ea"/>
+              <a:cs typeface="+mj-cs"/>
+            </a:endParaRPr>
           </a:p>
           <a:p>
             <a:pPr marL="285750" indent="-285750">
@@ -16805,7 +17887,11 @@
               <a:buChar char="•"/>
             </a:pPr>
             <a:r>
-              <a:rPr lang="en-US" b="1"/>
+              <a:rPr lang="en-US" sz="2400">
+                <a:latin typeface="Calibri"/>
+                <a:ea typeface="+mj-ea"/>
+                <a:cs typeface="+mj-cs"/>
+              </a:rPr>
               <a:t>Canonicalized allocation vs synthesized allocation</a:t>
             </a:r>
           </a:p>
@@ -16814,7 +17900,11 @@
               <a:buFont typeface="Arial" panose="020B0604020202020204" pitchFamily="34" charset="0"/>
               <a:buChar char="•"/>
             </a:pPr>
-            <a:endParaRPr lang="en-US" b="1"/>
+            <a:endParaRPr lang="en-US" sz="2400">
+              <a:latin typeface="Calibri"/>
+              <a:ea typeface="+mj-ea"/>
+              <a:cs typeface="+mj-cs"/>
+            </a:endParaRPr>
           </a:p>
           <a:p>
             <a:pPr marL="285750" indent="-285750">
@@ -16822,7 +17912,11 @@
               <a:buChar char="•"/>
             </a:pPr>
             <a:r>
-              <a:rPr lang="en-US" b="1"/>
+              <a:rPr lang="en-US" sz="2400">
+                <a:latin typeface="Calibri"/>
+                <a:ea typeface="+mj-ea"/>
+                <a:cs typeface="+mj-cs"/>
+              </a:rPr>
               <a:t>Gradual search for stateless ALU</a:t>
             </a:r>
           </a:p>

</xml_diff>

<commit_message>
Add some notes in the first several slides
</commit_message>
<xml_diff>
--- a/HotNets_talk.pptx
+++ b/HotNets_talk.pptx
@@ -214,7 +214,7 @@
           </a:lstStyle>
           <a:p>
             <a:fld id="{33CB1762-D33B-2D4C-8BBE-0709F42BCBD5}" type="datetimeFigureOut">
-              <a:t>10/10/19</a:t>
+              <a:t>10/14/19</a:t>
             </a:fld>
             <a:endParaRPr lang="en-US"/>
           </a:p>
@@ -608,12 +608,338 @@
           <a:lstStyle/>
           <a:p>
             <a:r>
-              <a:rPr lang="en-US" dirty="0"/>
-              <a:t>Replace triangle with </a:t>
-            </a:r>
-            <a:r>
               <a:rPr lang="en-US"/>
-              <a:t>trapezoid in mux.</a:t>
+              <a:t>The program synthesis tool we used for generating fast Pack-processing code is SKETCH, which originated from Prof. Armando’s phD thesis work. </a:t>
+            </a:r>
+          </a:p>
+          <a:p>
+            <a:endParaRPr lang="en-US"/>
+          </a:p>
+          <a:p>
+            <a:r>
+              <a:rPr lang="en-US"/>
+              <a:t>The user will provide two programs: one is specification and the other one is partial program with holes in it. The goal is to find one kind of hole assignment</a:t>
+            </a:r>
+          </a:p>
+          <a:p>
+            <a:r>
+              <a:rPr lang="en-US"/>
+              <a:t>which guarantee that the specification program and the partial program can be semantically equivalent.</a:t>
+            </a:r>
+          </a:p>
+          <a:p>
+            <a:r>
+              <a:rPr lang="en-US"/>
+              <a:t>SKETCH here will use QBF solver to either fill in the hole values to make partial program become a full one if there is any feasible solutions or return false</a:t>
+            </a:r>
+          </a:p>
+          <a:p>
+            <a:r>
+              <a:rPr lang="en-US"/>
+              <a:t>if no possible hole assignment can satisfy semantical equivalence.</a:t>
+            </a:r>
+          </a:p>
+          <a:p>
+            <a:endParaRPr lang="en-US"/>
+          </a:p>
+          <a:p>
+            <a:r>
+              <a:rPr lang="en-US"/>
+              <a:t>Here is a concrete example where in spec program, we obtain the return value by multipling the input value by 5. ??(2) means the one of the integer value choosing from 0 to 2^2-1</a:t>
+            </a:r>
+          </a:p>
+          <a:p>
+            <a:r>
+              <a:rPr lang="en-US"/>
+              <a:t>which is 3. As for the first partial program, it is feasible because SKETCH can set ??(2) to be 2 while SKETCH cannot find the satisfying result for the second partial program.</a:t>
+            </a:r>
+          </a:p>
+          <a:p>
+            <a:endParaRPr lang="en-US"/>
+          </a:p>
+          <a:p>
+            <a:r>
+              <a:rPr lang="en-US"/>
+              <a:t>In our Chipmunk project, we will use developer’s program as the specification, use partial program to represent the structure of the substrate and use holes to represent</a:t>
+            </a:r>
+          </a:p>
+          <a:p>
+            <a:r>
+              <a:rPr lang="en-US"/>
+              <a:t>large but finite number of low-level hardware configurations and then use program synthesis to test its feasibility.</a:t>
+            </a:r>
+          </a:p>
+        </p:txBody>
+      </p:sp>
+      <p:sp>
+        <p:nvSpPr>
+          <p:cNvPr id="4" name="Slide Number Placeholder 3"/>
+          <p:cNvSpPr>
+            <a:spLocks noGrp="1"/>
+          </p:cNvSpPr>
+          <p:nvPr>
+            <p:ph type="sldNum" sz="quarter" idx="5"/>
+          </p:nvPr>
+        </p:nvSpPr>
+        <p:spPr/>
+        <p:txBody>
+          <a:bodyPr/>
+          <a:lstStyle/>
+          <a:p>
+            <a:fld id="{822DC16D-7BA6-C54C-A5EF-FE506FEBC1D6}" type="slidenum">
+              <a:rPr lang="en-US"/>
+              <a:t>4</a:t>
+            </a:fld>
+            <a:endParaRPr lang="en-US"/>
+          </a:p>
+        </p:txBody>
+      </p:sp>
+    </p:spTree>
+    <p:extLst>
+      <p:ext uri="{BB962C8B-B14F-4D97-AF65-F5344CB8AC3E}">
+        <p14:creationId xmlns:p14="http://schemas.microsoft.com/office/powerpoint/2010/main" val="2599891940"/>
+      </p:ext>
+    </p:extLst>
+  </p:cSld>
+  <p:clrMapOvr>
+    <a:masterClrMapping/>
+  </p:clrMapOvr>
+</p:notes>
+</file>
+
+<file path=ppt/notesSlides/notesSlide3.xml><?xml version="1.0" encoding="utf-8"?>
+<p:notes xmlns:a="http://schemas.openxmlformats.org/drawingml/2006/main" xmlns:r="http://schemas.openxmlformats.org/officeDocument/2006/relationships" xmlns:p="http://schemas.openxmlformats.org/presentationml/2006/main">
+  <p:cSld>
+    <p:spTree>
+      <p:nvGrpSpPr>
+        <p:cNvPr id="1" name=""/>
+        <p:cNvGrpSpPr/>
+        <p:nvPr/>
+      </p:nvGrpSpPr>
+      <p:grpSpPr>
+        <a:xfrm>
+          <a:off x="0" y="0"/>
+          <a:ext cx="0" cy="0"/>
+          <a:chOff x="0" y="0"/>
+          <a:chExt cx="0" cy="0"/>
+        </a:xfrm>
+      </p:grpSpPr>
+      <p:sp>
+        <p:nvSpPr>
+          <p:cNvPr id="2" name="Slide Image Placeholder 1"/>
+          <p:cNvSpPr>
+            <a:spLocks noGrp="1" noRot="1" noChangeAspect="1"/>
+          </p:cNvSpPr>
+          <p:nvPr>
+            <p:ph type="sldImg"/>
+          </p:nvPr>
+        </p:nvSpPr>
+        <p:spPr/>
+      </p:sp>
+      <p:sp>
+        <p:nvSpPr>
+          <p:cNvPr id="3" name="Notes Placeholder 2"/>
+          <p:cNvSpPr>
+            <a:spLocks noGrp="1"/>
+          </p:cNvSpPr>
+          <p:nvPr>
+            <p:ph type="body" idx="1"/>
+          </p:nvPr>
+        </p:nvSpPr>
+        <p:spPr/>
+        <p:txBody>
+          <a:bodyPr/>
+          <a:lstStyle/>
+          <a:p>
+            <a:r>
+              <a:rPr lang="en-US"/>
+              <a:t>SKETCH use CEGIS algorithm to do program synthesis. We call it internal cex mode.</a:t>
+            </a:r>
+          </a:p>
+          <a:p>
+            <a:endParaRPr lang="en-US"/>
+          </a:p>
+          <a:p>
+            <a:r>
+              <a:rPr lang="en-US"/>
+              <a:t>To be specific, SKETCH divides the whole program synthesis problem into two phases: synthesis phase and verification phase.</a:t>
+            </a:r>
+          </a:p>
+          <a:p>
+            <a:r>
+              <a:rPr lang="en-US"/>
+              <a:t>The synthesis phase will use try to solve holes’ value assignments to satisfy the ‘partial’ inputs and the verification phase will</a:t>
+            </a:r>
+          </a:p>
+          <a:p>
+            <a:r>
+              <a:rPr lang="en-US"/>
+              <a:t>verify the hole value assignments on all inputs which is specified by programmers.</a:t>
+            </a:r>
+          </a:p>
+          <a:p>
+            <a:endParaRPr lang="en-US"/>
+          </a:p>
+          <a:p>
+            <a:r>
+              <a:rPr lang="en-US"/>
+              <a:t>For example, if we set the input range to be 5 bits which is the default value of sketch. In the beginning, sketch will randomly choose</a:t>
+            </a:r>
+          </a:p>
+          <a:p>
+            <a:r>
+              <a:rPr lang="en-US"/>
+              <a:t>subset of all inputs to do the synthesis problem, if it fails it means there should be no feasible solutions for this partial program; if</a:t>
+            </a:r>
+          </a:p>
+          <a:p>
+            <a:r>
+              <a:rPr lang="en-US"/>
+              <a:t>it succeeds, it will continue to the verification stage to test more inputs. If we pass the verification, we are lucky enough to find the</a:t>
+            </a:r>
+          </a:p>
+          <a:p>
+            <a:r>
+              <a:rPr lang="en-US"/>
+              <a:t>final solution otherwise, there is at least one input making the current hole assignment fail to work. So we add this counterexample</a:t>
+            </a:r>
+          </a:p>
+          <a:p>
+            <a:r>
+              <a:rPr lang="en-US"/>
+              <a:t>Into the input set and repeat synthesis again. Back and forth until we get the final result</a:t>
+            </a:r>
+          </a:p>
+        </p:txBody>
+      </p:sp>
+      <p:sp>
+        <p:nvSpPr>
+          <p:cNvPr id="4" name="Slide Number Placeholder 3"/>
+          <p:cNvSpPr>
+            <a:spLocks noGrp="1"/>
+          </p:cNvSpPr>
+          <p:nvPr>
+            <p:ph type="sldNum" sz="quarter" idx="5"/>
+          </p:nvPr>
+        </p:nvSpPr>
+        <p:spPr/>
+        <p:txBody>
+          <a:bodyPr/>
+          <a:lstStyle/>
+          <a:p>
+            <a:fld id="{822DC16D-7BA6-C54C-A5EF-FE506FEBC1D6}" type="slidenum">
+              <a:rPr lang="en-US"/>
+              <a:t>5</a:t>
+            </a:fld>
+            <a:endParaRPr lang="en-US"/>
+          </a:p>
+        </p:txBody>
+      </p:sp>
+    </p:spTree>
+    <p:extLst>
+      <p:ext uri="{BB962C8B-B14F-4D97-AF65-F5344CB8AC3E}">
+        <p14:creationId xmlns:p14="http://schemas.microsoft.com/office/powerpoint/2010/main" val="3762648981"/>
+      </p:ext>
+    </p:extLst>
+  </p:cSld>
+  <p:clrMapOvr>
+    <a:masterClrMapping/>
+  </p:clrMapOvr>
+</p:notes>
+</file>
+
+<file path=ppt/notesSlides/notesSlide4.xml><?xml version="1.0" encoding="utf-8"?>
+<p:notes xmlns:a="http://schemas.openxmlformats.org/drawingml/2006/main" xmlns:r="http://schemas.openxmlformats.org/officeDocument/2006/relationships" xmlns:p="http://schemas.openxmlformats.org/presentationml/2006/main">
+  <p:cSld>
+    <p:spTree>
+      <p:nvGrpSpPr>
+        <p:cNvPr id="1" name=""/>
+        <p:cNvGrpSpPr/>
+        <p:nvPr/>
+      </p:nvGrpSpPr>
+      <p:grpSpPr>
+        <a:xfrm>
+          <a:off x="0" y="0"/>
+          <a:ext cx="0" cy="0"/>
+          <a:chOff x="0" y="0"/>
+          <a:chExt cx="0" cy="0"/>
+        </a:xfrm>
+      </p:grpSpPr>
+      <p:sp>
+        <p:nvSpPr>
+          <p:cNvPr id="2" name="Slide Image Placeholder 1"/>
+          <p:cNvSpPr>
+            <a:spLocks noGrp="1" noRot="1" noChangeAspect="1"/>
+          </p:cNvSpPr>
+          <p:nvPr>
+            <p:ph type="sldImg"/>
+          </p:nvPr>
+        </p:nvSpPr>
+        <p:spPr/>
+      </p:sp>
+      <p:sp>
+        <p:nvSpPr>
+          <p:cNvPr id="3" name="Notes Placeholder 2"/>
+          <p:cNvSpPr>
+            <a:spLocks noGrp="1"/>
+          </p:cNvSpPr>
+          <p:nvPr>
+            <p:ph type="body" idx="1"/>
+          </p:nvPr>
+        </p:nvSpPr>
+        <p:spPr/>
+        <p:txBody>
+          <a:bodyPr/>
+          <a:lstStyle/>
+          <a:p>
+            <a:r>
+              <a:rPr lang="en-US"/>
+              <a:t>All our benchmarks will be borrowed from benchmarks in Domino. Just as the program shown here, each program has</a:t>
+            </a:r>
+          </a:p>
+          <a:p>
+            <a:r>
+              <a:rPr lang="en-US"/>
+              <a:t>both state variables and packet field. We will modify the stateful variables in Stateful ALU in Banzai simulator while change</a:t>
+            </a:r>
+          </a:p>
+          <a:p>
+            <a:r>
+              <a:rPr lang="en-US"/>
+              <a:t>the value of packet field in stateless ALU</a:t>
+            </a:r>
+          </a:p>
+          <a:p>
+            <a:endParaRPr lang="en-US"/>
+          </a:p>
+          <a:p>
+            <a:r>
+              <a:rPr lang="en-US"/>
+              <a:t>The Banzai simulator model extends RMT with stateful computation, aiming at abstracting out a switch computation</a:t>
+            </a:r>
+          </a:p>
+          <a:p>
+            <a:r>
+              <a:rPr lang="en-US"/>
+              <a:t>Into a 2D grid of ALUs. The x axis represents pipeline stages (or we can call it depth) and the y axis represents</a:t>
+            </a:r>
+          </a:p>
+          <a:p>
+            <a:r>
+              <a:rPr lang="en-US"/>
+              <a:t>Parallel ALUs within a particular pipeline (or we can call it width). All packet fields values are stored in PHV (packet header vectors)</a:t>
+            </a:r>
+          </a:p>
+          <a:p>
+            <a:r>
+              <a:rPr lang="en-US"/>
+              <a:t>and all ALUs’ computations are atomic so that the next packet arriving at that ALU a clock cycle later will see the updated value</a:t>
+            </a:r>
+          </a:p>
+          <a:p>
+            <a:r>
+              <a:rPr lang="en-US"/>
+              <a:t>for stateful variables.</a:t>
             </a:r>
           </a:p>
         </p:txBody>
@@ -654,7 +980,7 @@
 </p:notes>
 </file>
 
-<file path=ppt/notesSlides/notesSlide3.xml><?xml version="1.0" encoding="utf-8"?>
+<file path=ppt/notesSlides/notesSlide5.xml><?xml version="1.0" encoding="utf-8"?>
 <p:notes xmlns:a="http://schemas.openxmlformats.org/drawingml/2006/main" xmlns:r="http://schemas.openxmlformats.org/officeDocument/2006/relationships" xmlns:p="http://schemas.openxmlformats.org/presentationml/2006/main">
   <p:cSld>
     <p:spTree>
@@ -884,7 +1210,7 @@
           <a:lstStyle/>
           <a:p>
             <a:fld id="{0A57F018-826C-CE4C-A706-F4FED366862D}" type="datetimeFigureOut">
-              <a:t>10/10/19</a:t>
+              <a:t>10/14/19</a:t>
             </a:fld>
             <a:endParaRPr lang="en-US"/>
           </a:p>
@@ -1080,7 +1406,7 @@
           <a:lstStyle/>
           <a:p>
             <a:fld id="{0A57F018-826C-CE4C-A706-F4FED366862D}" type="datetimeFigureOut">
-              <a:t>10/10/19</a:t>
+              <a:t>10/14/19</a:t>
             </a:fld>
             <a:endParaRPr lang="en-US"/>
           </a:p>
@@ -1286,7 +1612,7 @@
           <a:lstStyle/>
           <a:p>
             <a:fld id="{0A57F018-826C-CE4C-A706-F4FED366862D}" type="datetimeFigureOut">
-              <a:t>10/10/19</a:t>
+              <a:t>10/14/19</a:t>
             </a:fld>
             <a:endParaRPr lang="en-US"/>
           </a:p>
@@ -1482,7 +1808,7 @@
           <a:lstStyle/>
           <a:p>
             <a:fld id="{0A57F018-826C-CE4C-A706-F4FED366862D}" type="datetimeFigureOut">
-              <a:t>10/10/19</a:t>
+              <a:t>10/14/19</a:t>
             </a:fld>
             <a:endParaRPr lang="en-US"/>
           </a:p>
@@ -1755,7 +2081,7 @@
           <a:lstStyle/>
           <a:p>
             <a:fld id="{0A57F018-826C-CE4C-A706-F4FED366862D}" type="datetimeFigureOut">
-              <a:t>10/10/19</a:t>
+              <a:t>10/14/19</a:t>
             </a:fld>
             <a:endParaRPr lang="en-US"/>
           </a:p>
@@ -2018,7 +2344,7 @@
           <a:lstStyle/>
           <a:p>
             <a:fld id="{0A57F018-826C-CE4C-A706-F4FED366862D}" type="datetimeFigureOut">
-              <a:t>10/10/19</a:t>
+              <a:t>10/14/19</a:t>
             </a:fld>
             <a:endParaRPr lang="en-US"/>
           </a:p>
@@ -2428,7 +2754,7 @@
           <a:lstStyle/>
           <a:p>
             <a:fld id="{0A57F018-826C-CE4C-A706-F4FED366862D}" type="datetimeFigureOut">
-              <a:t>10/10/19</a:t>
+              <a:t>10/14/19</a:t>
             </a:fld>
             <a:endParaRPr lang="en-US"/>
           </a:p>
@@ -2567,7 +2893,7 @@
           <a:lstStyle/>
           <a:p>
             <a:fld id="{0A57F018-826C-CE4C-A706-F4FED366862D}" type="datetimeFigureOut">
-              <a:t>10/10/19</a:t>
+              <a:t>10/14/19</a:t>
             </a:fld>
             <a:endParaRPr lang="en-US"/>
           </a:p>
@@ -2678,7 +3004,7 @@
           <a:lstStyle/>
           <a:p>
             <a:fld id="{0A57F018-826C-CE4C-A706-F4FED366862D}" type="datetimeFigureOut">
-              <a:t>10/10/19</a:t>
+              <a:t>10/14/19</a:t>
             </a:fld>
             <a:endParaRPr lang="en-US"/>
           </a:p>
@@ -2987,7 +3313,7 @@
           <a:lstStyle/>
           <a:p>
             <a:fld id="{0A57F018-826C-CE4C-A706-F4FED366862D}" type="datetimeFigureOut">
-              <a:t>10/10/19</a:t>
+              <a:t>10/14/19</a:t>
             </a:fld>
             <a:endParaRPr lang="en-US"/>
           </a:p>
@@ -3273,7 +3599,7 @@
           <a:lstStyle/>
           <a:p>
             <a:fld id="{0A57F018-826C-CE4C-A706-F4FED366862D}" type="datetimeFigureOut">
-              <a:t>10/10/19</a:t>
+              <a:t>10/14/19</a:t>
             </a:fld>
             <a:endParaRPr lang="en-US"/>
           </a:p>
@@ -3512,7 +3838,7 @@
           </a:lstStyle>
           <a:p>
             <a:fld id="{0A57F018-826C-CE4C-A706-F4FED366862D}" type="datetimeFigureOut">
-              <a:t>10/10/19</a:t>
+              <a:t>10/14/19</a:t>
             </a:fld>
             <a:endParaRPr lang="en-US"/>
           </a:p>
@@ -11806,8 +12132,12 @@
           <a:lstStyle/>
           <a:p>
             <a:r>
+              <a:rPr lang="en-US" sz="3333" b="1" dirty="0"/>
+              <a:t>Feasible</a:t>
+            </a:r>
+            <a:r>
               <a:rPr lang="en-US" sz="3333" dirty="0"/>
-              <a:t>Feasible sketch with</a:t>
+              <a:t> sketch with</a:t>
             </a:r>
           </a:p>
           <a:p>
@@ -11832,7 +12162,7 @@
         </p:nvSpPr>
         <p:spPr>
           <a:xfrm>
-            <a:off x="7660697" y="3402226"/>
+            <a:off x="7660697" y="3534958"/>
             <a:ext cx="4536050" cy="1118127"/>
           </a:xfrm>
           <a:prstGeom prst="rect">
@@ -11847,8 +12177,12 @@
           <a:lstStyle/>
           <a:p>
             <a:r>
+              <a:rPr lang="en-US" sz="3333" b="1" dirty="0"/>
+              <a:t>Infeasible</a:t>
+            </a:r>
+            <a:r>
               <a:rPr lang="en-US" sz="3333" dirty="0"/>
-              <a:t>Infeasible sketch; no</a:t>
+              <a:t> sketch; no </a:t>
             </a:r>
           </a:p>
           <a:p>
@@ -12019,7 +12353,7 @@
         </p:nvSpPr>
         <p:spPr>
           <a:xfrm>
-            <a:off x="296562" y="274638"/>
+            <a:off x="296562" y="38668"/>
             <a:ext cx="11738919" cy="1143000"/>
           </a:xfrm>
           <a:prstGeom prst="rect">
@@ -12400,8 +12734,8 @@
           </a:p>
         </p:txBody>
       </p:sp>
-      <mc:AlternateContent xmlns:mc="http://schemas.openxmlformats.org/markup-compatibility/2006">
-        <mc:Choice xmlns:a14="http://schemas.microsoft.com/office/drawing/2010/main" Requires="a14">
+      <mc:AlternateContent xmlns:mc="http://schemas.openxmlformats.org/markup-compatibility/2006" xmlns:a14="http://schemas.microsoft.com/office/drawing/2010/main">
+        <mc:Choice Requires="a14">
           <p:sp>
             <p:nvSpPr>
               <p:cNvPr id="13" name="TextBox 12">
@@ -12453,7 +12787,7 @@
             </p:txBody>
           </p:sp>
         </mc:Choice>
-        <mc:Fallback>
+        <mc:Fallback xmlns="">
           <p:sp>
             <p:nvSpPr>
               <p:cNvPr id="13" name="TextBox 12">
@@ -12477,7 +12811,7 @@
                 <a:avLst/>
               </a:prstGeom>
               <a:blipFill>
-                <a:blip r:embed="rId2"/>
+                <a:blip r:embed="rId3"/>
                 <a:stretch>
                   <a:fillRect l="-1762" t="-5357" r="-3965" b="-14286"/>
                 </a:stretch>
@@ -12498,8 +12832,8 @@
           </p:sp>
         </mc:Fallback>
       </mc:AlternateContent>
-      <mc:AlternateContent xmlns:mc="http://schemas.openxmlformats.org/markup-compatibility/2006">
-        <mc:Choice xmlns:a14="http://schemas.microsoft.com/office/drawing/2010/main" Requires="a14">
+      <mc:AlternateContent xmlns:mc="http://schemas.openxmlformats.org/markup-compatibility/2006" xmlns:a14="http://schemas.microsoft.com/office/drawing/2010/main">
+        <mc:Choice Requires="a14">
           <p:sp>
             <p:nvSpPr>
               <p:cNvPr id="15" name="TextBox 14">
@@ -12548,7 +12882,7 @@
             </p:txBody>
           </p:sp>
         </mc:Choice>
-        <mc:Fallback>
+        <mc:Fallback xmlns="">
           <p:sp>
             <p:nvSpPr>
               <p:cNvPr id="15" name="TextBox 14">
@@ -12572,7 +12906,7 @@
                 <a:avLst/>
               </a:prstGeom>
               <a:blipFill>
-                <a:blip r:embed="rId3"/>
+                <a:blip r:embed="rId4"/>
                 <a:stretch>
                   <a:fillRect t="-3509" b="-14035"/>
                 </a:stretch>

</xml_diff>

<commit_message>
Add notes skeleton to every slides
</commit_message>
<xml_diff>
--- a/HotNets_talk.pptx
+++ b/HotNets_talk.pptx
@@ -563,6 +563,750 @@
 </p:notes>
 </file>
 
+<file path=ppt/notesSlides/notesSlide10.xml><?xml version="1.0" encoding="utf-8"?>
+<p:notes xmlns:a="http://schemas.openxmlformats.org/drawingml/2006/main" xmlns:r="http://schemas.openxmlformats.org/officeDocument/2006/relationships" xmlns:p="http://schemas.openxmlformats.org/presentationml/2006/main">
+  <p:cSld>
+    <p:spTree>
+      <p:nvGrpSpPr>
+        <p:cNvPr id="1" name=""/>
+        <p:cNvGrpSpPr/>
+        <p:nvPr/>
+      </p:nvGrpSpPr>
+      <p:grpSpPr>
+        <a:xfrm>
+          <a:off x="0" y="0"/>
+          <a:ext cx="0" cy="0"/>
+          <a:chOff x="0" y="0"/>
+          <a:chExt cx="0" cy="0"/>
+        </a:xfrm>
+      </p:grpSpPr>
+      <p:sp>
+        <p:nvSpPr>
+          <p:cNvPr id="2" name="Slide Image Placeholder 1"/>
+          <p:cNvSpPr>
+            <a:spLocks noGrp="1" noRot="1" noChangeAspect="1"/>
+          </p:cNvSpPr>
+          <p:nvPr>
+            <p:ph type="sldImg"/>
+          </p:nvPr>
+        </p:nvSpPr>
+        <p:spPr/>
+      </p:sp>
+      <p:sp>
+        <p:nvSpPr>
+          <p:cNvPr id="3" name="Notes Placeholder 2"/>
+          <p:cNvSpPr>
+            <a:spLocks noGrp="1"/>
+          </p:cNvSpPr>
+          <p:nvPr>
+            <p:ph type="body" idx="1"/>
+          </p:nvPr>
+        </p:nvSpPr>
+        <p:spPr/>
+        <p:txBody>
+          <a:bodyPr/>
+          <a:lstStyle/>
+          <a:p>
+            <a:r>
+              <a:rPr lang="en-US"/>
+              <a:t>In addition to modification in original program and our “own” external counterexample mode,</a:t>
+            </a:r>
+          </a:p>
+          <a:p>
+            <a:r>
+              <a:rPr lang="en-US"/>
+              <a:t>we want to add more constrain which not only conserves the function of Chipmunk but also</a:t>
+            </a:r>
+          </a:p>
+          <a:p>
+            <a:r>
+              <a:rPr lang="en-US"/>
+              <a:t>reduce the search space.</a:t>
+            </a:r>
+          </a:p>
+          <a:p>
+            <a:endParaRPr lang="en-US"/>
+          </a:p>
+          <a:p>
+            <a:r>
+              <a:rPr lang="en-US"/>
+              <a:t>In allocation case, we found that all possible position on the LHS can be mapped to one particular </a:t>
+            </a:r>
+          </a:p>
+          <a:p>
+            <a:r>
+              <a:rPr lang="en-US"/>
+              <a:t>way in the RHS, so there must be some benefit if we choose to remove the freedom to force </a:t>
+            </a:r>
+          </a:p>
+          <a:p>
+            <a:r>
+              <a:rPr lang="en-US"/>
+              <a:t>packet field to specific container.</a:t>
+            </a:r>
+          </a:p>
+        </p:txBody>
+      </p:sp>
+      <p:sp>
+        <p:nvSpPr>
+          <p:cNvPr id="4" name="Slide Number Placeholder 3"/>
+          <p:cNvSpPr>
+            <a:spLocks noGrp="1"/>
+          </p:cNvSpPr>
+          <p:nvPr>
+            <p:ph type="sldNum" sz="quarter" idx="5"/>
+          </p:nvPr>
+        </p:nvSpPr>
+        <p:spPr/>
+        <p:txBody>
+          <a:bodyPr/>
+          <a:lstStyle/>
+          <a:p>
+            <a:fld id="{822DC16D-7BA6-C54C-A5EF-FE506FEBC1D6}" type="slidenum">
+              <a:rPr lang="en-US"/>
+              <a:t>12</a:t>
+            </a:fld>
+            <a:endParaRPr lang="en-US"/>
+          </a:p>
+        </p:txBody>
+      </p:sp>
+    </p:spTree>
+    <p:extLst>
+      <p:ext uri="{BB962C8B-B14F-4D97-AF65-F5344CB8AC3E}">
+        <p14:creationId xmlns:p14="http://schemas.microsoft.com/office/powerpoint/2010/main" val="3845898922"/>
+      </p:ext>
+    </p:extLst>
+  </p:cSld>
+  <p:clrMapOvr>
+    <a:masterClrMapping/>
+  </p:clrMapOvr>
+</p:notes>
+</file>
+
+<file path=ppt/notesSlides/notesSlide11.xml><?xml version="1.0" encoding="utf-8"?>
+<p:notes xmlns:a="http://schemas.openxmlformats.org/drawingml/2006/main" xmlns:r="http://schemas.openxmlformats.org/officeDocument/2006/relationships" xmlns:p="http://schemas.openxmlformats.org/presentationml/2006/main">
+  <p:cSld>
+    <p:spTree>
+      <p:nvGrpSpPr>
+        <p:cNvPr id="1" name=""/>
+        <p:cNvGrpSpPr/>
+        <p:nvPr/>
+      </p:nvGrpSpPr>
+      <p:grpSpPr>
+        <a:xfrm>
+          <a:off x="0" y="0"/>
+          <a:ext cx="0" cy="0"/>
+          <a:chOff x="0" y="0"/>
+          <a:chExt cx="0" cy="0"/>
+        </a:xfrm>
+      </p:grpSpPr>
+      <p:sp>
+        <p:nvSpPr>
+          <p:cNvPr id="2" name="Slide Image Placeholder 1"/>
+          <p:cNvSpPr>
+            <a:spLocks noGrp="1" noRot="1" noChangeAspect="1"/>
+          </p:cNvSpPr>
+          <p:nvPr>
+            <p:ph type="sldImg"/>
+          </p:nvPr>
+        </p:nvSpPr>
+        <p:spPr/>
+      </p:sp>
+      <p:sp>
+        <p:nvSpPr>
+          <p:cNvPr id="3" name="Notes Placeholder 2"/>
+          <p:cNvSpPr>
+            <a:spLocks noGrp="1"/>
+          </p:cNvSpPr>
+          <p:nvPr>
+            <p:ph type="body" idx="1"/>
+          </p:nvPr>
+        </p:nvSpPr>
+        <p:spPr/>
+        <p:txBody>
+          <a:bodyPr/>
+          <a:lstStyle/>
+          <a:p>
+            <a:r>
+              <a:rPr lang="en-US"/>
+              <a:t>For some benchmarks, there are only some of the simple operation in packet fields, so we can</a:t>
+            </a:r>
+          </a:p>
+          <a:p>
+            <a:r>
+              <a:rPr lang="en-US"/>
+              <a:t>choose simpler stateless ALU so that the total hole numbers can get slighted decreased. But there</a:t>
+            </a:r>
+          </a:p>
+          <a:p>
+            <a:r>
+              <a:rPr lang="en-US"/>
+              <a:t>are still some disadvantages if we use simplied version of stateless ALU because it may convert</a:t>
+            </a:r>
+          </a:p>
+          <a:p>
+            <a:r>
+              <a:rPr lang="en-US"/>
+              <a:t>from success to failure.</a:t>
+            </a:r>
+          </a:p>
+          <a:p>
+            <a:endParaRPr lang="en-US"/>
+          </a:p>
+          <a:p>
+            <a:r>
+              <a:rPr lang="en-US"/>
+              <a:t>If permitted, we can make full use of the distributed system to run different stateless ALUs</a:t>
+            </a:r>
+          </a:p>
+          <a:p>
+            <a:r>
+              <a:rPr lang="en-US"/>
+              <a:t>In different machine and use optimal result. (fail from full stateless ALU or success from simplified stateless ALU)</a:t>
+            </a:r>
+          </a:p>
+        </p:txBody>
+      </p:sp>
+      <p:sp>
+        <p:nvSpPr>
+          <p:cNvPr id="4" name="Slide Number Placeholder 3"/>
+          <p:cNvSpPr>
+            <a:spLocks noGrp="1"/>
+          </p:cNvSpPr>
+          <p:nvPr>
+            <p:ph type="sldNum" sz="quarter" idx="5"/>
+          </p:nvPr>
+        </p:nvSpPr>
+        <p:spPr/>
+        <p:txBody>
+          <a:bodyPr/>
+          <a:lstStyle/>
+          <a:p>
+            <a:fld id="{822DC16D-7BA6-C54C-A5EF-FE506FEBC1D6}" type="slidenum">
+              <a:rPr lang="en-US"/>
+              <a:t>13</a:t>
+            </a:fld>
+            <a:endParaRPr lang="en-US"/>
+          </a:p>
+        </p:txBody>
+      </p:sp>
+    </p:spTree>
+    <p:extLst>
+      <p:ext uri="{BB962C8B-B14F-4D97-AF65-F5344CB8AC3E}">
+        <p14:creationId xmlns:p14="http://schemas.microsoft.com/office/powerpoint/2010/main" val="2404939733"/>
+      </p:ext>
+    </p:extLst>
+  </p:cSld>
+  <p:clrMapOvr>
+    <a:masterClrMapping/>
+  </p:clrMapOvr>
+</p:notes>
+</file>
+
+<file path=ppt/notesSlides/notesSlide12.xml><?xml version="1.0" encoding="utf-8"?>
+<p:notes xmlns:a="http://schemas.openxmlformats.org/drawingml/2006/main" xmlns:r="http://schemas.openxmlformats.org/officeDocument/2006/relationships" xmlns:p="http://schemas.openxmlformats.org/presentationml/2006/main">
+  <p:cSld>
+    <p:spTree>
+      <p:nvGrpSpPr>
+        <p:cNvPr id="1" name=""/>
+        <p:cNvGrpSpPr/>
+        <p:nvPr/>
+      </p:nvGrpSpPr>
+      <p:grpSpPr>
+        <a:xfrm>
+          <a:off x="0" y="0"/>
+          <a:ext cx="0" cy="0"/>
+          <a:chOff x="0" y="0"/>
+          <a:chExt cx="0" cy="0"/>
+        </a:xfrm>
+      </p:grpSpPr>
+      <p:sp>
+        <p:nvSpPr>
+          <p:cNvPr id="2" name="Slide Image Placeholder 1"/>
+          <p:cNvSpPr>
+            <a:spLocks noGrp="1" noRot="1" noChangeAspect="1"/>
+          </p:cNvSpPr>
+          <p:nvPr>
+            <p:ph type="sldImg"/>
+          </p:nvPr>
+        </p:nvSpPr>
+        <p:spPr/>
+      </p:sp>
+      <p:sp>
+        <p:nvSpPr>
+          <p:cNvPr id="3" name="Notes Placeholder 2"/>
+          <p:cNvSpPr>
+            <a:spLocks noGrp="1"/>
+          </p:cNvSpPr>
+          <p:nvPr>
+            <p:ph type="body" idx="1"/>
+          </p:nvPr>
+        </p:nvSpPr>
+        <p:spPr/>
+        <p:txBody>
+          <a:bodyPr/>
+          <a:lstStyle/>
+          <a:p>
+            <a:r>
+              <a:rPr lang="en-US"/>
+              <a:t>The reason why we come up with these way of mutatation is that</a:t>
+            </a:r>
+          </a:p>
+          <a:p>
+            <a:endParaRPr lang="en-US"/>
+          </a:p>
+          <a:p>
+            <a:r>
+              <a:rPr lang="en-US"/>
+              <a:t>We should get these from Domino Graph. Use the example</a:t>
+            </a:r>
+          </a:p>
+        </p:txBody>
+      </p:sp>
+      <p:sp>
+        <p:nvSpPr>
+          <p:cNvPr id="4" name="Slide Number Placeholder 3"/>
+          <p:cNvSpPr>
+            <a:spLocks noGrp="1"/>
+          </p:cNvSpPr>
+          <p:nvPr>
+            <p:ph type="sldNum" sz="quarter" idx="5"/>
+          </p:nvPr>
+        </p:nvSpPr>
+        <p:spPr/>
+        <p:txBody>
+          <a:bodyPr/>
+          <a:lstStyle/>
+          <a:p>
+            <a:fld id="{822DC16D-7BA6-C54C-A5EF-FE506FEBC1D6}" type="slidenum">
+              <a:rPr lang="en-US"/>
+              <a:t>14</a:t>
+            </a:fld>
+            <a:endParaRPr lang="en-US"/>
+          </a:p>
+        </p:txBody>
+      </p:sp>
+    </p:spTree>
+    <p:extLst>
+      <p:ext uri="{BB962C8B-B14F-4D97-AF65-F5344CB8AC3E}">
+        <p14:creationId xmlns:p14="http://schemas.microsoft.com/office/powerpoint/2010/main" val="1012706441"/>
+      </p:ext>
+    </p:extLst>
+  </p:cSld>
+  <p:clrMapOvr>
+    <a:masterClrMapping/>
+  </p:clrMapOvr>
+</p:notes>
+</file>
+
+<file path=ppt/notesSlides/notesSlide13.xml><?xml version="1.0" encoding="utf-8"?>
+<p:notes xmlns:a="http://schemas.openxmlformats.org/drawingml/2006/main" xmlns:r="http://schemas.openxmlformats.org/officeDocument/2006/relationships" xmlns:p="http://schemas.openxmlformats.org/presentationml/2006/main">
+  <p:cSld>
+    <p:spTree>
+      <p:nvGrpSpPr>
+        <p:cNvPr id="1" name=""/>
+        <p:cNvGrpSpPr/>
+        <p:nvPr/>
+      </p:nvGrpSpPr>
+      <p:grpSpPr>
+        <a:xfrm>
+          <a:off x="0" y="0"/>
+          <a:ext cx="0" cy="0"/>
+          <a:chOff x="0" y="0"/>
+          <a:chExt cx="0" cy="0"/>
+        </a:xfrm>
+      </p:grpSpPr>
+      <p:sp>
+        <p:nvSpPr>
+          <p:cNvPr id="2" name="Slide Image Placeholder 1"/>
+          <p:cNvSpPr>
+            <a:spLocks noGrp="1" noRot="1" noChangeAspect="1"/>
+          </p:cNvSpPr>
+          <p:nvPr>
+            <p:ph type="sldImg"/>
+          </p:nvPr>
+        </p:nvSpPr>
+        <p:spPr/>
+      </p:sp>
+      <p:sp>
+        <p:nvSpPr>
+          <p:cNvPr id="3" name="Notes Placeholder 2"/>
+          <p:cNvSpPr>
+            <a:spLocks noGrp="1"/>
+          </p:cNvSpPr>
+          <p:nvPr>
+            <p:ph type="body" idx="1"/>
+          </p:nvPr>
+        </p:nvSpPr>
+        <p:spPr/>
+        <p:txBody>
+          <a:bodyPr/>
+          <a:lstStyle/>
+          <a:p>
+            <a:r>
+              <a:rPr lang="en-US"/>
+              <a:t>In almost every benchmark, Chipmunk has better performance in compilation in their mutation files except flowlet switching</a:t>
+            </a:r>
+          </a:p>
+          <a:p>
+            <a:endParaRPr lang="en-US"/>
+          </a:p>
+          <a:p>
+            <a:r>
+              <a:rPr lang="en-US"/>
+              <a:t>The reason is that we set the timeout for program synthesis for each iteration is 30 minutes and they reach the timeout</a:t>
+            </a:r>
+          </a:p>
+          <a:p>
+            <a:r>
+              <a:rPr lang="en-US"/>
+              <a:t>boundary. If we provide enough time, they will finally provide the successful compilation result because we manually </a:t>
+            </a:r>
+          </a:p>
+          <a:p>
+            <a:r>
+              <a:rPr lang="en-US"/>
+              <a:t>plug in hole values generate by other benchmarks and run verification on it, it generate the result.</a:t>
+            </a:r>
+          </a:p>
+          <a:p>
+            <a:endParaRPr lang="en-US"/>
+          </a:p>
+          <a:p>
+            <a:r>
+              <a:rPr lang="en-US" b="1"/>
+              <a:t>Note: add the graph to show why theoratically, Chipmunk should work for every mutator</a:t>
+            </a:r>
+          </a:p>
+          <a:p>
+            <a:r>
+              <a:rPr lang="en-US" b="1"/>
+              <a:t>Note: </a:t>
+            </a:r>
+          </a:p>
+        </p:txBody>
+      </p:sp>
+      <p:sp>
+        <p:nvSpPr>
+          <p:cNvPr id="4" name="Slide Number Placeholder 3"/>
+          <p:cNvSpPr>
+            <a:spLocks noGrp="1"/>
+          </p:cNvSpPr>
+          <p:nvPr>
+            <p:ph type="sldNum" sz="quarter" idx="5"/>
+          </p:nvPr>
+        </p:nvSpPr>
+        <p:spPr/>
+        <p:txBody>
+          <a:bodyPr/>
+          <a:lstStyle/>
+          <a:p>
+            <a:fld id="{822DC16D-7BA6-C54C-A5EF-FE506FEBC1D6}" type="slidenum">
+              <a:rPr lang="en-US"/>
+              <a:t>16</a:t>
+            </a:fld>
+            <a:endParaRPr lang="en-US"/>
+          </a:p>
+        </p:txBody>
+      </p:sp>
+    </p:spTree>
+    <p:extLst>
+      <p:ext uri="{BB962C8B-B14F-4D97-AF65-F5344CB8AC3E}">
+        <p14:creationId xmlns:p14="http://schemas.microsoft.com/office/powerpoint/2010/main" val="2255699720"/>
+      </p:ext>
+    </p:extLst>
+  </p:cSld>
+  <p:clrMapOvr>
+    <a:masterClrMapping/>
+  </p:clrMapOvr>
+</p:notes>
+</file>
+
+<file path=ppt/notesSlides/notesSlide14.xml><?xml version="1.0" encoding="utf-8"?>
+<p:notes xmlns:a="http://schemas.openxmlformats.org/drawingml/2006/main" xmlns:r="http://schemas.openxmlformats.org/officeDocument/2006/relationships" xmlns:p="http://schemas.openxmlformats.org/presentationml/2006/main">
+  <p:cSld>
+    <p:spTree>
+      <p:nvGrpSpPr>
+        <p:cNvPr id="1" name=""/>
+        <p:cNvGrpSpPr/>
+        <p:nvPr/>
+      </p:nvGrpSpPr>
+      <p:grpSpPr>
+        <a:xfrm>
+          <a:off x="0" y="0"/>
+          <a:ext cx="0" cy="0"/>
+          <a:chOff x="0" y="0"/>
+          <a:chExt cx="0" cy="0"/>
+        </a:xfrm>
+      </p:grpSpPr>
+      <p:sp>
+        <p:nvSpPr>
+          <p:cNvPr id="2" name="Slide Image Placeholder 1"/>
+          <p:cNvSpPr>
+            <a:spLocks noGrp="1" noRot="1" noChangeAspect="1"/>
+          </p:cNvSpPr>
+          <p:nvPr>
+            <p:ph type="sldImg"/>
+          </p:nvPr>
+        </p:nvSpPr>
+        <p:spPr/>
+      </p:sp>
+      <p:sp>
+        <p:nvSpPr>
+          <p:cNvPr id="3" name="Notes Placeholder 2"/>
+          <p:cNvSpPr>
+            <a:spLocks noGrp="1"/>
+          </p:cNvSpPr>
+          <p:nvPr>
+            <p:ph type="body" idx="1"/>
+          </p:nvPr>
+        </p:nvSpPr>
+        <p:spPr/>
+        <p:txBody>
+          <a:bodyPr/>
+          <a:lstStyle/>
+          <a:p>
+            <a:r>
+              <a:rPr lang="en-US"/>
+              <a:t>Obivously, the average # of stage used in Chipmunk is smaller than that in Domino. However, this is not correct in </a:t>
+            </a:r>
+          </a:p>
+          <a:p>
+            <a:r>
+              <a:rPr lang="en-US"/>
+              <a:t>Average # of ALUs per stage used. The reason is that </a:t>
+            </a:r>
+          </a:p>
+          <a:p>
+            <a:pPr marL="228600" indent="-228600">
+              <a:buAutoNum type="arabicPeriod"/>
+            </a:pPr>
+            <a:r>
+              <a:rPr lang="en-US"/>
+              <a:t>We have to compare the output of all packet fields which make our widh &gt;= # of packet fields in program</a:t>
+            </a:r>
+          </a:p>
+          <a:p>
+            <a:pPr marL="228600" indent="-228600">
+              <a:buAutoNum type="arabicPeriod"/>
+            </a:pPr>
+            <a:r>
+              <a:rPr lang="en-US"/>
+              <a:t>In domino, we assume there is counteless PHVs per stage but in Chipmunk we only assume one PHV per stage</a:t>
+            </a:r>
+          </a:p>
+        </p:txBody>
+      </p:sp>
+      <p:sp>
+        <p:nvSpPr>
+          <p:cNvPr id="4" name="Slide Number Placeholder 3"/>
+          <p:cNvSpPr>
+            <a:spLocks noGrp="1"/>
+          </p:cNvSpPr>
+          <p:nvPr>
+            <p:ph type="sldNum" sz="quarter" idx="5"/>
+          </p:nvPr>
+        </p:nvSpPr>
+        <p:spPr/>
+        <p:txBody>
+          <a:bodyPr/>
+          <a:lstStyle/>
+          <a:p>
+            <a:fld id="{822DC16D-7BA6-C54C-A5EF-FE506FEBC1D6}" type="slidenum">
+              <a:rPr lang="en-US"/>
+              <a:t>17</a:t>
+            </a:fld>
+            <a:endParaRPr lang="en-US"/>
+          </a:p>
+        </p:txBody>
+      </p:sp>
+    </p:spTree>
+    <p:extLst>
+      <p:ext uri="{BB962C8B-B14F-4D97-AF65-F5344CB8AC3E}">
+        <p14:creationId xmlns:p14="http://schemas.microsoft.com/office/powerpoint/2010/main" val="61814747"/>
+      </p:ext>
+    </p:extLst>
+  </p:cSld>
+  <p:clrMapOvr>
+    <a:masterClrMapping/>
+  </p:clrMapOvr>
+</p:notes>
+</file>
+
+<file path=ppt/notesSlides/notesSlide15.xml><?xml version="1.0" encoding="utf-8"?>
+<p:notes xmlns:a="http://schemas.openxmlformats.org/drawingml/2006/main" xmlns:r="http://schemas.openxmlformats.org/officeDocument/2006/relationships" xmlns:p="http://schemas.openxmlformats.org/presentationml/2006/main">
+  <p:cSld>
+    <p:spTree>
+      <p:nvGrpSpPr>
+        <p:cNvPr id="1" name=""/>
+        <p:cNvGrpSpPr/>
+        <p:nvPr/>
+      </p:nvGrpSpPr>
+      <p:grpSpPr>
+        <a:xfrm>
+          <a:off x="0" y="0"/>
+          <a:ext cx="0" cy="0"/>
+          <a:chOff x="0" y="0"/>
+          <a:chExt cx="0" cy="0"/>
+        </a:xfrm>
+      </p:grpSpPr>
+      <p:sp>
+        <p:nvSpPr>
+          <p:cNvPr id="2" name="Slide Image Placeholder 1"/>
+          <p:cNvSpPr>
+            <a:spLocks noGrp="1" noRot="1" noChangeAspect="1"/>
+          </p:cNvSpPr>
+          <p:nvPr>
+            <p:ph type="sldImg"/>
+          </p:nvPr>
+        </p:nvSpPr>
+        <p:spPr/>
+      </p:sp>
+      <p:sp>
+        <p:nvSpPr>
+          <p:cNvPr id="3" name="Notes Placeholder 2"/>
+          <p:cNvSpPr>
+            <a:spLocks noGrp="1"/>
+          </p:cNvSpPr>
+          <p:nvPr>
+            <p:ph type="body" idx="1"/>
+          </p:nvPr>
+        </p:nvSpPr>
+        <p:spPr/>
+        <p:txBody>
+          <a:bodyPr/>
+          <a:lstStyle/>
+          <a:p>
+            <a:r>
+              <a:rPr lang="en-US"/>
+              <a:t>Emphasize the conclusion again and reiterate the benefit of Chipmunk and show why its result will be much better.</a:t>
+            </a:r>
+          </a:p>
+        </p:txBody>
+      </p:sp>
+      <p:sp>
+        <p:nvSpPr>
+          <p:cNvPr id="4" name="Slide Number Placeholder 3"/>
+          <p:cNvSpPr>
+            <a:spLocks noGrp="1"/>
+          </p:cNvSpPr>
+          <p:nvPr>
+            <p:ph type="sldNum" sz="quarter" idx="5"/>
+          </p:nvPr>
+        </p:nvSpPr>
+        <p:spPr/>
+        <p:txBody>
+          <a:bodyPr/>
+          <a:lstStyle/>
+          <a:p>
+            <a:fld id="{822DC16D-7BA6-C54C-A5EF-FE506FEBC1D6}" type="slidenum">
+              <a:rPr lang="en-US"/>
+              <a:t>18</a:t>
+            </a:fld>
+            <a:endParaRPr lang="en-US"/>
+          </a:p>
+        </p:txBody>
+      </p:sp>
+    </p:spTree>
+    <p:extLst>
+      <p:ext uri="{BB962C8B-B14F-4D97-AF65-F5344CB8AC3E}">
+        <p14:creationId xmlns:p14="http://schemas.microsoft.com/office/powerpoint/2010/main" val="3047903257"/>
+      </p:ext>
+    </p:extLst>
+  </p:cSld>
+  <p:clrMapOvr>
+    <a:masterClrMapping/>
+  </p:clrMapOvr>
+</p:notes>
+</file>
+
+<file path=ppt/notesSlides/notesSlide16.xml><?xml version="1.0" encoding="utf-8"?>
+<p:notes xmlns:a="http://schemas.openxmlformats.org/drawingml/2006/main" xmlns:r="http://schemas.openxmlformats.org/officeDocument/2006/relationships" xmlns:p="http://schemas.openxmlformats.org/presentationml/2006/main">
+  <p:cSld>
+    <p:spTree>
+      <p:nvGrpSpPr>
+        <p:cNvPr id="1" name=""/>
+        <p:cNvGrpSpPr/>
+        <p:nvPr/>
+      </p:nvGrpSpPr>
+      <p:grpSpPr>
+        <a:xfrm>
+          <a:off x="0" y="0"/>
+          <a:ext cx="0" cy="0"/>
+          <a:chOff x="0" y="0"/>
+          <a:chExt cx="0" cy="0"/>
+        </a:xfrm>
+      </p:grpSpPr>
+      <p:sp>
+        <p:nvSpPr>
+          <p:cNvPr id="2" name="Slide Image Placeholder 1"/>
+          <p:cNvSpPr>
+            <a:spLocks noGrp="1" noRot="1" noChangeAspect="1"/>
+          </p:cNvSpPr>
+          <p:nvPr>
+            <p:ph type="sldImg"/>
+          </p:nvPr>
+        </p:nvSpPr>
+        <p:spPr/>
+      </p:sp>
+      <p:sp>
+        <p:nvSpPr>
+          <p:cNvPr id="3" name="Notes Placeholder 2"/>
+          <p:cNvSpPr>
+            <a:spLocks noGrp="1"/>
+          </p:cNvSpPr>
+          <p:nvPr>
+            <p:ph type="body" idx="1"/>
+          </p:nvPr>
+        </p:nvSpPr>
+        <p:spPr/>
+        <p:txBody>
+          <a:bodyPr/>
+          <a:lstStyle/>
+          <a:p>
+            <a:r>
+              <a:rPr lang="en-US"/>
+              <a:t>This part we can refer from Part2 in HotNets paper. Research Questions.</a:t>
+            </a:r>
+          </a:p>
+        </p:txBody>
+      </p:sp>
+      <p:sp>
+        <p:nvSpPr>
+          <p:cNvPr id="4" name="Slide Number Placeholder 3"/>
+          <p:cNvSpPr>
+            <a:spLocks noGrp="1"/>
+          </p:cNvSpPr>
+          <p:nvPr>
+            <p:ph type="sldNum" sz="quarter" idx="5"/>
+          </p:nvPr>
+        </p:nvSpPr>
+        <p:spPr/>
+        <p:txBody>
+          <a:bodyPr/>
+          <a:lstStyle/>
+          <a:p>
+            <a:fld id="{822DC16D-7BA6-C54C-A5EF-FE506FEBC1D6}" type="slidenum">
+              <a:rPr lang="en-US"/>
+              <a:t>19</a:t>
+            </a:fld>
+            <a:endParaRPr lang="en-US"/>
+          </a:p>
+        </p:txBody>
+      </p:sp>
+    </p:spTree>
+    <p:extLst>
+      <p:ext uri="{BB962C8B-B14F-4D97-AF65-F5344CB8AC3E}">
+        <p14:creationId xmlns:p14="http://schemas.microsoft.com/office/powerpoint/2010/main" val="909584412"/>
+      </p:ext>
+    </p:extLst>
+  </p:cSld>
+  <p:clrMapOvr>
+    <a:masterClrMapping/>
+  </p:clrMapOvr>
+</p:notes>
+</file>
+
 <file path=ppt/notesSlides/notesSlide2.xml><?xml version="1.0" encoding="utf-8"?>
 <p:notes xmlns:a="http://schemas.openxmlformats.org/drawingml/2006/main" xmlns:r="http://schemas.openxmlformats.org/officeDocument/2006/relationships" xmlns:p="http://schemas.openxmlformats.org/presentationml/2006/main">
   <p:cSld>
@@ -1055,6 +1799,450 @@
     <p:extLst>
       <p:ext uri="{BB962C8B-B14F-4D97-AF65-F5344CB8AC3E}">
         <p14:creationId xmlns:p14="http://schemas.microsoft.com/office/powerpoint/2010/main" val="3533069519"/>
+      </p:ext>
+    </p:extLst>
+  </p:cSld>
+  <p:clrMapOvr>
+    <a:masterClrMapping/>
+  </p:clrMapOvr>
+</p:notes>
+</file>
+
+<file path=ppt/notesSlides/notesSlide6.xml><?xml version="1.0" encoding="utf-8"?>
+<p:notes xmlns:a="http://schemas.openxmlformats.org/drawingml/2006/main" xmlns:r="http://schemas.openxmlformats.org/officeDocument/2006/relationships" xmlns:p="http://schemas.openxmlformats.org/presentationml/2006/main">
+  <p:cSld>
+    <p:spTree>
+      <p:nvGrpSpPr>
+        <p:cNvPr id="1" name=""/>
+        <p:cNvGrpSpPr/>
+        <p:nvPr/>
+      </p:nvGrpSpPr>
+      <p:grpSpPr>
+        <a:xfrm>
+          <a:off x="0" y="0"/>
+          <a:ext cx="0" cy="0"/>
+          <a:chOff x="0" y="0"/>
+          <a:chExt cx="0" cy="0"/>
+        </a:xfrm>
+      </p:grpSpPr>
+      <p:sp>
+        <p:nvSpPr>
+          <p:cNvPr id="2" name="Slide Image Placeholder 1"/>
+          <p:cNvSpPr>
+            <a:spLocks noGrp="1" noRot="1" noChangeAspect="1"/>
+          </p:cNvSpPr>
+          <p:nvPr>
+            <p:ph type="sldImg"/>
+          </p:nvPr>
+        </p:nvSpPr>
+        <p:spPr/>
+      </p:sp>
+      <p:sp>
+        <p:nvSpPr>
+          <p:cNvPr id="3" name="Notes Placeholder 2"/>
+          <p:cNvSpPr>
+            <a:spLocks noGrp="1"/>
+          </p:cNvSpPr>
+          <p:nvPr>
+            <p:ph type="body" idx="1"/>
+          </p:nvPr>
+        </p:nvSpPr>
+        <p:spPr/>
+        <p:txBody>
+          <a:bodyPr/>
+          <a:lstStyle/>
+          <a:p>
+            <a:endParaRPr lang="en-US"/>
+          </a:p>
+        </p:txBody>
+      </p:sp>
+      <p:sp>
+        <p:nvSpPr>
+          <p:cNvPr id="4" name="Slide Number Placeholder 3"/>
+          <p:cNvSpPr>
+            <a:spLocks noGrp="1"/>
+          </p:cNvSpPr>
+          <p:nvPr>
+            <p:ph type="sldNum" sz="quarter" idx="5"/>
+          </p:nvPr>
+        </p:nvSpPr>
+        <p:spPr/>
+        <p:txBody>
+          <a:bodyPr/>
+          <a:lstStyle/>
+          <a:p>
+            <a:fld id="{822DC16D-7BA6-C54C-A5EF-FE506FEBC1D6}" type="slidenum">
+              <a:rPr lang="en-US"/>
+              <a:t>8</a:t>
+            </a:fld>
+            <a:endParaRPr lang="en-US"/>
+          </a:p>
+        </p:txBody>
+      </p:sp>
+    </p:spTree>
+    <p:extLst>
+      <p:ext uri="{BB962C8B-B14F-4D97-AF65-F5344CB8AC3E}">
+        <p14:creationId xmlns:p14="http://schemas.microsoft.com/office/powerpoint/2010/main" val="2714818222"/>
+      </p:ext>
+    </p:extLst>
+  </p:cSld>
+  <p:clrMapOvr>
+    <a:masterClrMapping/>
+  </p:clrMapOvr>
+</p:notes>
+</file>
+
+<file path=ppt/notesSlides/notesSlide7.xml><?xml version="1.0" encoding="utf-8"?>
+<p:notes xmlns:a="http://schemas.openxmlformats.org/drawingml/2006/main" xmlns:r="http://schemas.openxmlformats.org/officeDocument/2006/relationships" xmlns:p="http://schemas.openxmlformats.org/presentationml/2006/main">
+  <p:cSld>
+    <p:spTree>
+      <p:nvGrpSpPr>
+        <p:cNvPr id="1" name=""/>
+        <p:cNvGrpSpPr/>
+        <p:nvPr/>
+      </p:nvGrpSpPr>
+      <p:grpSpPr>
+        <a:xfrm>
+          <a:off x="0" y="0"/>
+          <a:ext cx="0" cy="0"/>
+          <a:chOff x="0" y="0"/>
+          <a:chExt cx="0" cy="0"/>
+        </a:xfrm>
+      </p:grpSpPr>
+      <p:sp>
+        <p:nvSpPr>
+          <p:cNvPr id="2" name="Slide Image Placeholder 1"/>
+          <p:cNvSpPr>
+            <a:spLocks noGrp="1" noRot="1" noChangeAspect="1"/>
+          </p:cNvSpPr>
+          <p:nvPr>
+            <p:ph type="sldImg"/>
+          </p:nvPr>
+        </p:nvSpPr>
+        <p:spPr/>
+      </p:sp>
+      <p:sp>
+        <p:nvSpPr>
+          <p:cNvPr id="3" name="Notes Placeholder 2"/>
+          <p:cNvSpPr>
+            <a:spLocks noGrp="1"/>
+          </p:cNvSpPr>
+          <p:nvPr>
+            <p:ph type="body" idx="1"/>
+          </p:nvPr>
+        </p:nvSpPr>
+        <p:spPr/>
+        <p:txBody>
+          <a:bodyPr/>
+          <a:lstStyle/>
+          <a:p>
+            <a:r>
+              <a:rPr lang="en-US"/>
+              <a:t>Chipmunk can beat Domino in almost every aspects at the sacrifice of compilation time. Because the program synthesis problem is a QBF problem</a:t>
+            </a:r>
+          </a:p>
+          <a:p>
+            <a:r>
+              <a:rPr lang="en-US"/>
+              <a:t>whose total time increases exponentially as the number of holes increase. For example, if there are n holes, then the search space will be as large as 2^n </a:t>
+            </a:r>
+          </a:p>
+          <a:p>
+            <a:r>
+              <a:rPr lang="en-US"/>
+              <a:t>and most of our benchmarks generate 200 holes.</a:t>
+            </a:r>
+          </a:p>
+          <a:p>
+            <a:endParaRPr lang="en-US"/>
+          </a:p>
+          <a:p>
+            <a:r>
+              <a:rPr lang="en-US"/>
+              <a:t>Therefore, we come up with four main ideas listed above to speed up synthesis problem. Later, I will discuss them one by one.</a:t>
+            </a:r>
+          </a:p>
+          <a:p>
+            <a:endParaRPr lang="en-US"/>
+          </a:p>
+          <a:p>
+            <a:endParaRPr lang="en-US"/>
+          </a:p>
+        </p:txBody>
+      </p:sp>
+      <p:sp>
+        <p:nvSpPr>
+          <p:cNvPr id="4" name="Slide Number Placeholder 3"/>
+          <p:cNvSpPr>
+            <a:spLocks noGrp="1"/>
+          </p:cNvSpPr>
+          <p:nvPr>
+            <p:ph type="sldNum" sz="quarter" idx="5"/>
+          </p:nvPr>
+        </p:nvSpPr>
+        <p:spPr/>
+        <p:txBody>
+          <a:bodyPr/>
+          <a:lstStyle/>
+          <a:p>
+            <a:fld id="{822DC16D-7BA6-C54C-A5EF-FE506FEBC1D6}" type="slidenum">
+              <a:rPr lang="en-US"/>
+              <a:t>9</a:t>
+            </a:fld>
+            <a:endParaRPr lang="en-US"/>
+          </a:p>
+        </p:txBody>
+      </p:sp>
+    </p:spTree>
+    <p:extLst>
+      <p:ext uri="{BB962C8B-B14F-4D97-AF65-F5344CB8AC3E}">
+        <p14:creationId xmlns:p14="http://schemas.microsoft.com/office/powerpoint/2010/main" val="1503665285"/>
+      </p:ext>
+    </p:extLst>
+  </p:cSld>
+  <p:clrMapOvr>
+    <a:masterClrMapping/>
+  </p:clrMapOvr>
+</p:notes>
+</file>
+
+<file path=ppt/notesSlides/notesSlide8.xml><?xml version="1.0" encoding="utf-8"?>
+<p:notes xmlns:a="http://schemas.openxmlformats.org/drawingml/2006/main" xmlns:r="http://schemas.openxmlformats.org/officeDocument/2006/relationships" xmlns:p="http://schemas.openxmlformats.org/presentationml/2006/main">
+  <p:cSld>
+    <p:spTree>
+      <p:nvGrpSpPr>
+        <p:cNvPr id="1" name=""/>
+        <p:cNvGrpSpPr/>
+        <p:nvPr/>
+      </p:nvGrpSpPr>
+      <p:grpSpPr>
+        <a:xfrm>
+          <a:off x="0" y="0"/>
+          <a:ext cx="0" cy="0"/>
+          <a:chOff x="0" y="0"/>
+          <a:chExt cx="0" cy="0"/>
+        </a:xfrm>
+      </p:grpSpPr>
+      <p:sp>
+        <p:nvSpPr>
+          <p:cNvPr id="2" name="Slide Image Placeholder 1"/>
+          <p:cNvSpPr>
+            <a:spLocks noGrp="1" noRot="1" noChangeAspect="1"/>
+          </p:cNvSpPr>
+          <p:nvPr>
+            <p:ph type="sldImg"/>
+          </p:nvPr>
+        </p:nvSpPr>
+        <p:spPr/>
+      </p:sp>
+      <p:sp>
+        <p:nvSpPr>
+          <p:cNvPr id="3" name="Notes Placeholder 2"/>
+          <p:cNvSpPr>
+            <a:spLocks noGrp="1"/>
+          </p:cNvSpPr>
+          <p:nvPr>
+            <p:ph type="body" idx="1"/>
+          </p:nvPr>
+        </p:nvSpPr>
+        <p:spPr/>
+        <p:txBody>
+          <a:bodyPr/>
+          <a:lstStyle/>
+          <a:p>
+            <a:r>
+              <a:rPr lang="en-US"/>
+              <a:t>The first part is to reduce the constant values appearing in benchmarks. </a:t>
+            </a:r>
+          </a:p>
+          <a:p>
+            <a:endParaRPr lang="en-US"/>
+          </a:p>
+          <a:p>
+            <a:r>
+              <a:rPr lang="en-US"/>
+              <a:t>For example, the example shown in the slides is blue_decrease.c in Domino program. We manually scan the program and downgrade all constants</a:t>
+            </a:r>
+          </a:p>
+          <a:p>
+            <a:r>
+              <a:rPr lang="en-US"/>
+              <a:t>appearing in program into constants within 2-bit range. Here, we replace 10 by 2.</a:t>
+            </a:r>
+          </a:p>
+          <a:p>
+            <a:endParaRPr lang="en-US"/>
+          </a:p>
+          <a:p>
+            <a:r>
+              <a:rPr lang="en-US"/>
+              <a:t>The benefit of this transformation is that all constant/immediate holes appear in Chipmunk will only be 2-bit range which can dramatically reduce the</a:t>
+            </a:r>
+          </a:p>
+          <a:p>
+            <a:r>
+              <a:rPr lang="en-US"/>
+              <a:t>total number of holes. Although we slightly change the semantics of some of benchmarks, but for these case, we only focus on the compilation result</a:t>
+            </a:r>
+          </a:p>
+          <a:p>
+            <a:r>
+              <a:rPr lang="en-US"/>
+              <a:t>so this change is reasonable. </a:t>
+            </a:r>
+          </a:p>
+          <a:p>
+            <a:endParaRPr lang="en-US"/>
+          </a:p>
+          <a:p>
+            <a:r>
+              <a:rPr lang="en-US"/>
+              <a:t>In future work, we will try to add constant synthesis algorithm to avoid semantic modification.</a:t>
+            </a:r>
+          </a:p>
+        </p:txBody>
+      </p:sp>
+      <p:sp>
+        <p:nvSpPr>
+          <p:cNvPr id="4" name="Slide Number Placeholder 3"/>
+          <p:cNvSpPr>
+            <a:spLocks noGrp="1"/>
+          </p:cNvSpPr>
+          <p:nvPr>
+            <p:ph type="sldNum" sz="quarter" idx="5"/>
+          </p:nvPr>
+        </p:nvSpPr>
+        <p:spPr/>
+        <p:txBody>
+          <a:bodyPr/>
+          <a:lstStyle/>
+          <a:p>
+            <a:fld id="{822DC16D-7BA6-C54C-A5EF-FE506FEBC1D6}" type="slidenum">
+              <a:rPr lang="en-US"/>
+              <a:t>10</a:t>
+            </a:fld>
+            <a:endParaRPr lang="en-US"/>
+          </a:p>
+        </p:txBody>
+      </p:sp>
+    </p:spTree>
+    <p:extLst>
+      <p:ext uri="{BB962C8B-B14F-4D97-AF65-F5344CB8AC3E}">
+        <p14:creationId xmlns:p14="http://schemas.microsoft.com/office/powerpoint/2010/main" val="1485151952"/>
+      </p:ext>
+    </p:extLst>
+  </p:cSld>
+  <p:clrMapOvr>
+    <a:masterClrMapping/>
+  </p:clrMapOvr>
+</p:notes>
+</file>
+
+<file path=ppt/notesSlides/notesSlide9.xml><?xml version="1.0" encoding="utf-8"?>
+<p:notes xmlns:a="http://schemas.openxmlformats.org/drawingml/2006/main" xmlns:r="http://schemas.openxmlformats.org/officeDocument/2006/relationships" xmlns:p="http://schemas.openxmlformats.org/presentationml/2006/main">
+  <p:cSld>
+    <p:spTree>
+      <p:nvGrpSpPr>
+        <p:cNvPr id="1" name=""/>
+        <p:cNvGrpSpPr/>
+        <p:nvPr/>
+      </p:nvGrpSpPr>
+      <p:grpSpPr>
+        <a:xfrm>
+          <a:off x="0" y="0"/>
+          <a:ext cx="0" cy="0"/>
+          <a:chOff x="0" y="0"/>
+          <a:chExt cx="0" cy="0"/>
+        </a:xfrm>
+      </p:grpSpPr>
+      <p:sp>
+        <p:nvSpPr>
+          <p:cNvPr id="2" name="Slide Image Placeholder 1"/>
+          <p:cNvSpPr>
+            <a:spLocks noGrp="1" noRot="1" noChangeAspect="1"/>
+          </p:cNvSpPr>
+          <p:nvPr>
+            <p:ph type="sldImg"/>
+          </p:nvPr>
+        </p:nvSpPr>
+        <p:spPr/>
+      </p:sp>
+      <p:sp>
+        <p:nvSpPr>
+          <p:cNvPr id="3" name="Notes Placeholder 2"/>
+          <p:cNvSpPr>
+            <a:spLocks noGrp="1"/>
+          </p:cNvSpPr>
+          <p:nvPr>
+            <p:ph type="body" idx="1"/>
+          </p:nvPr>
+        </p:nvSpPr>
+        <p:spPr/>
+        <p:txBody>
+          <a:bodyPr/>
+          <a:lstStyle/>
+          <a:p>
+            <a:r>
+              <a:rPr lang="en-US"/>
+              <a:t>Previously, we introduce the CEGIS algorithm implemented in SKETCH. We call that internal counterexample mode program synthesis mode.</a:t>
+            </a:r>
+          </a:p>
+          <a:p>
+            <a:endParaRPr lang="en-US"/>
+          </a:p>
+          <a:p>
+            <a:r>
+              <a:rPr lang="en-US"/>
+              <a:t>We referred from that idea to develop our own version of CEGIS, we call it external counterexample mode. Instead of throwing the whole </a:t>
+            </a:r>
+          </a:p>
+          <a:p>
+            <a:r>
+              <a:rPr lang="en-US"/>
+              <a:t>synthesis problem with 10-bit input into sketch, we divide into two parts: synthesis &amp; verification in 2-bit input; -&gt; verification in 10-bit inputs</a:t>
+            </a:r>
+          </a:p>
+          <a:p>
+            <a:r>
+              <a:rPr lang="en-US"/>
+              <a:t>-&gt; if failed then add the counterexample in synthesis part so the synthesis step will be all 2-bit input + counterexample; else we are lucky</a:t>
+            </a:r>
+          </a:p>
+          <a:p>
+            <a:r>
+              <a:rPr lang="en-US"/>
+              <a:t>enough to find a sol in smaller input range which satisfies 10-bit input</a:t>
+            </a:r>
+          </a:p>
+        </p:txBody>
+      </p:sp>
+      <p:sp>
+        <p:nvSpPr>
+          <p:cNvPr id="4" name="Slide Number Placeholder 3"/>
+          <p:cNvSpPr>
+            <a:spLocks noGrp="1"/>
+          </p:cNvSpPr>
+          <p:nvPr>
+            <p:ph type="sldNum" sz="quarter" idx="5"/>
+          </p:nvPr>
+        </p:nvSpPr>
+        <p:spPr/>
+        <p:txBody>
+          <a:bodyPr/>
+          <a:lstStyle/>
+          <a:p>
+            <a:fld id="{822DC16D-7BA6-C54C-A5EF-FE506FEBC1D6}" type="slidenum">
+              <a:rPr lang="en-US"/>
+              <a:t>11</a:t>
+            </a:fld>
+            <a:endParaRPr lang="en-US"/>
+          </a:p>
+        </p:txBody>
+      </p:sp>
+    </p:spTree>
+    <p:extLst>
+      <p:ext uri="{BB962C8B-B14F-4D97-AF65-F5344CB8AC3E}">
+        <p14:creationId xmlns:p14="http://schemas.microsoft.com/office/powerpoint/2010/main" val="1382264559"/>
       </p:ext>
     </p:extLst>
   </p:cSld>
@@ -4888,6 +6076,84 @@
           </a:p>
         </p:txBody>
       </p:sp>
+      <p:cxnSp>
+        <p:nvCxnSpPr>
+          <p:cNvPr id="6" name="Straight Arrow Connector 5">
+            <a:extLst>
+              <a:ext uri="{FF2B5EF4-FFF2-40B4-BE49-F238E27FC236}">
+                <a16:creationId xmlns:a16="http://schemas.microsoft.com/office/drawing/2014/main" id="{103BC683-70F8-3D4F-8D0B-6409C4E2ED81}"/>
+              </a:ext>
+            </a:extLst>
+          </p:cNvPr>
+          <p:cNvCxnSpPr/>
+          <p:nvPr/>
+        </p:nvCxnSpPr>
+        <p:spPr>
+          <a:xfrm>
+            <a:off x="3244645" y="1298965"/>
+            <a:ext cx="914400" cy="2594609"/>
+          </a:xfrm>
+          <a:prstGeom prst="straightConnector1">
+            <a:avLst/>
+          </a:prstGeom>
+          <a:ln>
+            <a:tailEnd type="triangle"/>
+          </a:ln>
+        </p:spPr>
+        <p:style>
+          <a:lnRef idx="1">
+            <a:schemeClr val="accent1"/>
+          </a:lnRef>
+          <a:fillRef idx="0">
+            <a:schemeClr val="accent1"/>
+          </a:fillRef>
+          <a:effectRef idx="0">
+            <a:schemeClr val="accent1"/>
+          </a:effectRef>
+          <a:fontRef idx="minor">
+            <a:schemeClr val="tx1"/>
+          </a:fontRef>
+        </p:style>
+      </p:cxnSp>
+      <p:cxnSp>
+        <p:nvCxnSpPr>
+          <p:cNvPr id="12" name="Straight Arrow Connector 11">
+            <a:extLst>
+              <a:ext uri="{FF2B5EF4-FFF2-40B4-BE49-F238E27FC236}">
+                <a16:creationId xmlns:a16="http://schemas.microsoft.com/office/drawing/2014/main" id="{449B3DDB-6285-B641-996E-2E0875DFC874}"/>
+              </a:ext>
+            </a:extLst>
+          </p:cNvPr>
+          <p:cNvCxnSpPr/>
+          <p:nvPr/>
+        </p:nvCxnSpPr>
+        <p:spPr>
+          <a:xfrm>
+            <a:off x="8445394" y="1298965"/>
+            <a:ext cx="914400" cy="2594609"/>
+          </a:xfrm>
+          <a:prstGeom prst="straightConnector1">
+            <a:avLst/>
+          </a:prstGeom>
+          <a:ln>
+            <a:tailEnd type="triangle"/>
+          </a:ln>
+        </p:spPr>
+        <p:style>
+          <a:lnRef idx="1">
+            <a:schemeClr val="accent1"/>
+          </a:lnRef>
+          <a:fillRef idx="0">
+            <a:schemeClr val="accent1"/>
+          </a:fillRef>
+          <a:effectRef idx="0">
+            <a:schemeClr val="accent1"/>
+          </a:effectRef>
+          <a:fontRef idx="minor">
+            <a:schemeClr val="tx1"/>
+          </a:fontRef>
+        </p:style>
+      </p:cxnSp>
     </p:spTree>
     <p:extLst>
       <p:ext uri="{BB962C8B-B14F-4D97-AF65-F5344CB8AC3E}">
@@ -5361,7 +6627,7 @@
           <p:nvPr/>
         </p:nvPicPr>
         <p:blipFill>
-          <a:blip r:embed="rId2"/>
+          <a:blip r:embed="rId3"/>
           <a:stretch>
             <a:fillRect/>
           </a:stretch>
@@ -5482,7 +6748,7 @@
           <p:nvPr/>
         </p:nvPicPr>
         <p:blipFill>
-          <a:blip r:embed="rId2"/>
+          <a:blip r:embed="rId3"/>
           <a:stretch>
             <a:fillRect/>
           </a:stretch>
@@ -5634,7 +6900,7 @@
           <p:nvPr/>
         </p:nvPicPr>
         <p:blipFill>
-          <a:blip r:embed="rId2"/>
+          <a:blip r:embed="rId3"/>
           <a:stretch>
             <a:fillRect/>
           </a:stretch>
@@ -5738,7 +7004,7 @@
           <p:nvPr/>
         </p:nvPicPr>
         <p:blipFill>
-          <a:blip r:embed="rId2"/>
+          <a:blip r:embed="rId3"/>
           <a:stretch>
             <a:fillRect/>
           </a:stretch>
@@ -6074,6 +7340,42 @@
             <a:r>
               <a:rPr lang="en-US" sz="2400" dirty="0"/>
               <a:t>Constrain the input into 2-bit range for synthesis</a:t>
+            </a:r>
+          </a:p>
+        </p:txBody>
+      </p:sp>
+      <p:sp>
+        <p:nvSpPr>
+          <p:cNvPr id="30" name="TextBox 29">
+            <a:extLst>
+              <a:ext uri="{FF2B5EF4-FFF2-40B4-BE49-F238E27FC236}">
+                <a16:creationId xmlns:a16="http://schemas.microsoft.com/office/drawing/2014/main" id="{22385064-C11A-2A4D-B32E-1F4ABA0D5874}"/>
+              </a:ext>
+            </a:extLst>
+          </p:cNvPr>
+          <p:cNvSpPr txBox="1"/>
+          <p:nvPr/>
+        </p:nvSpPr>
+        <p:spPr>
+          <a:xfrm>
+            <a:off x="9347820" y="3320724"/>
+            <a:ext cx="1147610" cy="323165"/>
+          </a:xfrm>
+          <a:prstGeom prst="rect">
+            <a:avLst/>
+          </a:prstGeom>
+          <a:noFill/>
+        </p:spPr>
+        <p:txBody>
+          <a:bodyPr wrap="square" rtlCol="0">
+            <a:spAutoFit/>
+          </a:bodyPr>
+          <a:lstStyle/>
+          <a:p>
+            <a:pPr algn="ctr"/>
+            <a:r>
+              <a:rPr lang="en-US" sz="1500" b="1" dirty="0"/>
+              <a:t>Z3</a:t>
             </a:r>
           </a:p>
         </p:txBody>
@@ -9822,7 +11124,7 @@
           <p:nvPr>
             <p:extLst>
               <p:ext uri="{D42A27DB-BD31-4B8C-83A1-F6EECF244321}">
-                <p14:modId xmlns:p14="http://schemas.microsoft.com/office/powerpoint/2010/main" val="368308635"/>
+                <p14:modId xmlns:p14="http://schemas.microsoft.com/office/powerpoint/2010/main" val="1269483137"/>
               </p:ext>
             </p:extLst>
           </p:nvPr>
@@ -10351,7 +11653,7 @@
                     <a:p>
                       <a:r>
                         <a:rPr lang="en-US" altLang="zh-CN"/>
-                        <a:t>10.7</a:t>
+                        <a:t>52.5</a:t>
                       </a:r>
                       <a:endParaRPr lang="en-US"/>
                     </a:p>
@@ -10428,7 +11730,7 @@
                     <a:p>
                       <a:r>
                         <a:rPr lang="en-US" altLang="zh-CN"/>
-                        <a:t>52.5</a:t>
+                        <a:t>3648</a:t>
                       </a:r>
                       <a:endParaRPr lang="en-US"/>
                     </a:p>
@@ -10522,7 +11824,7 @@
                     <a:p>
                       <a:r>
                         <a:rPr lang="en-US" altLang="zh-CN"/>
-                        <a:t>3648</a:t>
+                        <a:t>7.7</a:t>
                       </a:r>
                       <a:endParaRPr lang="en-US"/>
                     </a:p>
@@ -10616,7 +11918,7 @@
                     <a:p>
                       <a:r>
                         <a:rPr lang="en-US" altLang="zh-CN"/>
-                        <a:t>7.78.3</a:t>
+                        <a:t>8.3</a:t>
                       </a:r>
                       <a:endParaRPr lang="en-US"/>
                     </a:p>
@@ -11136,7 +12438,7 @@
           <p:nvPr/>
         </p:nvPicPr>
         <p:blipFill>
-          <a:blip r:embed="rId2"/>
+          <a:blip r:embed="rId3"/>
           <a:stretch>
             <a:fillRect/>
           </a:stretch>
@@ -11166,7 +12468,7 @@
           <p:nvPr/>
         </p:nvPicPr>
         <p:blipFill>
-          <a:blip r:embed="rId3"/>
+          <a:blip r:embed="rId4"/>
           <a:stretch>
             <a:fillRect/>
           </a:stretch>
@@ -14194,8 +15496,8 @@
         </p:nvSpPr>
         <p:spPr>
           <a:xfrm>
-            <a:off x="3138820" y="3353645"/>
-            <a:ext cx="1185241" cy="1015663"/>
+            <a:off x="2988187" y="3265157"/>
+            <a:ext cx="1265589" cy="707886"/>
           </a:xfrm>
           <a:prstGeom prst="rect">
             <a:avLst/>
@@ -17235,6 +18537,139 @@
               <a:ea typeface="+mj-ea"/>
               <a:cs typeface="+mj-cs"/>
             </a:endParaRPr>
+          </a:p>
+        </p:txBody>
+      </p:sp>
+      <p:sp>
+        <p:nvSpPr>
+          <p:cNvPr id="80" name="Title 1">
+            <a:extLst>
+              <a:ext uri="{FF2B5EF4-FFF2-40B4-BE49-F238E27FC236}">
+                <a16:creationId xmlns:a16="http://schemas.microsoft.com/office/drawing/2014/main" id="{1AA4D9DC-7FEC-594B-9213-43FA6F69D331}"/>
+              </a:ext>
+            </a:extLst>
+          </p:cNvPr>
+          <p:cNvSpPr txBox="1">
+            <a:spLocks/>
+          </p:cNvSpPr>
+          <p:nvPr/>
+        </p:nvSpPr>
+        <p:spPr>
+          <a:xfrm>
+            <a:off x="255313" y="5275124"/>
+            <a:ext cx="11738919" cy="1143000"/>
+          </a:xfrm>
+          <a:prstGeom prst="rect">
+            <a:avLst/>
+          </a:prstGeom>
+        </p:spPr>
+        <p:txBody>
+          <a:bodyPr vert="horz" lIns="91440" tIns="45720" rIns="91440" bIns="45720" rtlCol="0" anchor="ctr">
+            <a:noAutofit/>
+          </a:bodyPr>
+          <a:lstStyle>
+            <a:lvl1pPr algn="ctr" defTabSz="457200" rtl="0" eaLnBrk="1" latinLnBrk="0" hangingPunct="1">
+              <a:spcBef>
+                <a:spcPct val="0"/>
+              </a:spcBef>
+              <a:buNone/>
+              <a:defRPr sz="4400" kern="1200">
+                <a:solidFill>
+                  <a:srgbClr val="0000FF"/>
+                </a:solidFill>
+                <a:latin typeface="+mj-lt"/>
+                <a:ea typeface="+mj-ea"/>
+                <a:cs typeface="+mj-cs"/>
+              </a:defRPr>
+            </a:lvl1pPr>
+          </a:lstStyle>
+          <a:p>
+            <a:pPr marL="342900" marR="0" lvl="0" indent="-342900" algn="l" defTabSz="457200" rtl="0" eaLnBrk="1" fontAlgn="auto" latinLnBrk="0" hangingPunct="1">
+              <a:lnSpc>
+                <a:spcPct val="100000"/>
+              </a:lnSpc>
+              <a:spcBef>
+                <a:spcPct val="0"/>
+              </a:spcBef>
+              <a:spcAft>
+                <a:spcPts val="0"/>
+              </a:spcAft>
+              <a:buClrTx/>
+              <a:buSzTx/>
+              <a:buFont typeface="Arial" panose="020B0604020202020204" pitchFamily="34" charset="0"/>
+              <a:buChar char="•"/>
+              <a:tabLst/>
+              <a:defRPr/>
+            </a:pPr>
+            <a:r>
+              <a:rPr lang="en-US" sz="2400" dirty="0">
+                <a:solidFill>
+                  <a:schemeClr val="tx1"/>
+                </a:solidFill>
+                <a:latin typeface="Calibri"/>
+              </a:rPr>
+              <a:t>State variable </a:t>
+            </a:r>
+            <a:r>
+              <a:rPr lang="en-US" sz="2400" dirty="0">
+                <a:solidFill>
+                  <a:schemeClr val="tx1"/>
+                </a:solidFill>
+                <a:latin typeface="Calibri"/>
+                <a:sym typeface="Wingdings" pitchFamily="2" charset="2"/>
+              </a:rPr>
+              <a:t> Stateful ALU; Packet field  Stateless ALU</a:t>
+            </a:r>
+            <a:endParaRPr kumimoji="0" lang="en-US" sz="2400" b="0" i="0" u="none" strike="noStrike" kern="1200" cap="none" spc="0" normalizeH="0" baseline="0" noProof="0" dirty="0">
+              <a:ln>
+                <a:noFill/>
+              </a:ln>
+              <a:solidFill>
+                <a:schemeClr val="tx1"/>
+              </a:solidFill>
+              <a:effectLst/>
+              <a:uLnTx/>
+              <a:uFillTx/>
+              <a:latin typeface="Calibri"/>
+              <a:ea typeface="+mj-ea"/>
+              <a:cs typeface="+mj-cs"/>
+            </a:endParaRPr>
+          </a:p>
+          <a:p>
+            <a:pPr marL="342900" marR="0" lvl="0" indent="-342900" algn="l" defTabSz="457200" rtl="0" eaLnBrk="1" fontAlgn="auto" latinLnBrk="0" hangingPunct="1">
+              <a:lnSpc>
+                <a:spcPct val="100000"/>
+              </a:lnSpc>
+              <a:spcBef>
+                <a:spcPct val="0"/>
+              </a:spcBef>
+              <a:spcAft>
+                <a:spcPts val="0"/>
+              </a:spcAft>
+              <a:buClrTx/>
+              <a:buSzTx/>
+              <a:buFont typeface="Arial" panose="020B0604020202020204" pitchFamily="34" charset="0"/>
+              <a:buChar char="•"/>
+              <a:tabLst/>
+              <a:defRPr/>
+            </a:pPr>
+            <a:r>
+              <a:rPr kumimoji="0" lang="en-US" sz="2400" b="0" i="0" u="none" strike="noStrike" kern="1200" cap="none" spc="0" normalizeH="0" baseline="0" noProof="0" dirty="0">
+                <a:ln>
+                  <a:noFill/>
+                </a:ln>
+                <a:solidFill>
+                  <a:schemeClr val="tx1"/>
+                </a:solidFill>
+                <a:effectLst/>
+                <a:uLnTx/>
+                <a:uFillTx/>
+                <a:latin typeface="Calibri"/>
+                <a:ea typeface="+mj-ea"/>
+                <a:cs typeface="+mj-cs"/>
+              </a:rPr>
+              <a:t>Abstract out a switch computation flow into a 2D grid of ALU</a:t>
+            </a:r>
           </a:p>
         </p:txBody>
       </p:sp>

</xml_diff>